<commit_message>
edit powerpoint to add resource links and correct a few missing titles, typos
</commit_message>
<xml_diff>
--- a/Introduction to ggplot.pptx
+++ b/Introduction to ggplot.pptx
@@ -5,12 +5,12 @@
     <p:sldMasterId id="2147483679" r:id="rId4"/>
   </p:sldMasterIdLst>
   <p:notesMasterIdLst>
-    <p:notesMasterId r:id="rId29"/>
+    <p:notesMasterId r:id="rId30"/>
   </p:notesMasterIdLst>
   <p:sldIdLst>
     <p:sldId id="257" r:id="rId5"/>
-    <p:sldId id="260" r:id="rId6"/>
-    <p:sldId id="263" r:id="rId7"/>
+    <p:sldId id="263" r:id="rId6"/>
+    <p:sldId id="260" r:id="rId7"/>
     <p:sldId id="258" r:id="rId8"/>
     <p:sldId id="259" r:id="rId9"/>
     <p:sldId id="261" r:id="rId10"/>
@@ -32,6 +32,7 @@
     <p:sldId id="278" r:id="rId26"/>
     <p:sldId id="279" r:id="rId27"/>
     <p:sldId id="280" r:id="rId28"/>
+    <p:sldId id="281" r:id="rId29"/>
   </p:sldIdLst>
   <p:sldSz cx="12192000" cy="6858000"/>
   <p:notesSz cx="6858000" cy="9144000"/>
@@ -220,7 +221,7 @@
           <a:p>
             <a:fld id="{E326FCFE-7176-4740-B8A4-BE7D6F546224}" type="datetimeFigureOut">
               <a:rPr lang="en-GB" smtClean="0"/>
-              <a:t>02/12/2022</a:t>
+              <a:t>15/02/2023</a:t>
             </a:fld>
             <a:endParaRPr lang="en-GB"/>
           </a:p>
@@ -3116,7 +3117,10 @@
           <a:bodyPr/>
           <a:lstStyle/>
           <a:p>
-            <a:endParaRPr lang="en-GB" dirty="0"/>
+            <a:r>
+              <a:rPr lang="en-GB" dirty="0"/>
+              <a:t>Aesthetic mapping options</a:t>
+            </a:r>
           </a:p>
         </p:txBody>
       </p:sp>
@@ -6044,7 +6048,7 @@
           <p:cNvPr id="2" name="Title 1">
             <a:extLst>
               <a:ext uri="{FF2B5EF4-FFF2-40B4-BE49-F238E27FC236}">
-                <a16:creationId xmlns:a16="http://schemas.microsoft.com/office/drawing/2014/main" id="{D403470E-64BD-48E6-8DDA-37BB4933A521}"/>
+                <a16:creationId xmlns:a16="http://schemas.microsoft.com/office/drawing/2014/main" id="{018D23F0-5235-4EF4-B6DA-3DDAE5471B47}"/>
               </a:ext>
             </a:extLst>
           </p:cNvPr>
@@ -6072,7 +6076,7 @@
           <p:cNvPr id="3" name="Content Placeholder 2">
             <a:extLst>
               <a:ext uri="{FF2B5EF4-FFF2-40B4-BE49-F238E27FC236}">
-                <a16:creationId xmlns:a16="http://schemas.microsoft.com/office/drawing/2014/main" id="{D847CE8F-9CD3-41F3-9633-11F0650A8B60}"/>
+                <a16:creationId xmlns:a16="http://schemas.microsoft.com/office/drawing/2014/main" id="{2CF3AB9C-74F0-4013-B8B4-166520545EB4}"/>
               </a:ext>
             </a:extLst>
           </p:cNvPr>
@@ -6083,74 +6087,53 @@
             <p:ph idx="1"/>
           </p:nvPr>
         </p:nvSpPr>
-        <p:spPr>
-          <a:xfrm>
-            <a:off x="838200" y="1825625"/>
-            <a:ext cx="4023049" cy="4351338"/>
-          </a:xfrm>
-        </p:spPr>
+        <p:spPr/>
         <p:txBody>
           <a:bodyPr/>
           <a:lstStyle/>
           <a:p>
             <a:r>
               <a:rPr lang="en-GB" dirty="0"/>
-              <a:t>These datasets all have the same mean, median, standard deviation</a:t>
-            </a:r>
+              <a:t>A picture is worth  1000 words…. </a:t>
+            </a:r>
+          </a:p>
+          <a:p>
+            <a:pPr lvl="1"/>
+            <a:r>
+              <a:rPr lang="en-GB" dirty="0"/>
+              <a:t>Reveals things the stats might not</a:t>
+            </a:r>
+          </a:p>
+          <a:p>
+            <a:pPr lvl="1"/>
+            <a:r>
+              <a:rPr lang="en-GB" dirty="0"/>
+              <a:t>Easier to grasp for many people</a:t>
+            </a:r>
+          </a:p>
+          <a:p>
+            <a:pPr lvl="1"/>
+            <a:r>
+              <a:rPr lang="en-GB" dirty="0"/>
+              <a:t>Quickly identify main features, anomalies</a:t>
+            </a:r>
+          </a:p>
+          <a:p>
+            <a:pPr lvl="1"/>
+            <a:r>
+              <a:rPr lang="en-GB" dirty="0"/>
+              <a:t>Holds an audiences interest more than a wall of text/numbers</a:t>
+            </a:r>
+          </a:p>
+          <a:p>
+            <a:endParaRPr lang="en-GB" dirty="0"/>
           </a:p>
         </p:txBody>
       </p:sp>
-      <p:pic>
-        <p:nvPicPr>
-          <p:cNvPr id="2050" name="Picture 2" descr="The Datasaurus Dozen">
-            <a:extLst>
-              <a:ext uri="{FF2B5EF4-FFF2-40B4-BE49-F238E27FC236}">
-                <a16:creationId xmlns:a16="http://schemas.microsoft.com/office/drawing/2014/main" id="{BC4BE49D-BF8E-4D5A-8862-BFF17BE81044}"/>
-              </a:ext>
-            </a:extLst>
-          </p:cNvPr>
-          <p:cNvPicPr>
-            <a:picLocks noChangeAspect="1" noChangeArrowheads="1"/>
-          </p:cNvPicPr>
-          <p:nvPr/>
-        </p:nvPicPr>
-        <p:blipFill>
-          <a:blip r:embed="rId2" cstate="print">
-            <a:extLst>
-              <a:ext uri="{28A0092B-C50C-407E-A947-70E740481C1C}">
-                <a14:useLocalDpi xmlns:a14="http://schemas.microsoft.com/office/drawing/2010/main" val="0"/>
-              </a:ext>
-            </a:extLst>
-          </a:blip>
-          <a:srcRect/>
-          <a:stretch>
-            <a:fillRect/>
-          </a:stretch>
-        </p:blipFill>
-        <p:spPr bwMode="auto">
-          <a:xfrm>
-            <a:off x="5507523" y="1690691"/>
-            <a:ext cx="5909780" cy="4128436"/>
-          </a:xfrm>
-          <a:prstGeom prst="rect">
-            <a:avLst/>
-          </a:prstGeom>
-          <a:noFill/>
-          <a:extLst>
-            <a:ext uri="{909E8E84-426E-40DD-AFC4-6F175D3DCCD1}">
-              <a14:hiddenFill xmlns:a14="http://schemas.microsoft.com/office/drawing/2010/main">
-                <a:solidFill>
-                  <a:srgbClr val="FFFFFF"/>
-                </a:solidFill>
-              </a14:hiddenFill>
-            </a:ext>
-          </a:extLst>
-        </p:spPr>
-      </p:pic>
     </p:spTree>
     <p:extLst>
       <p:ext uri="{BB962C8B-B14F-4D97-AF65-F5344CB8AC3E}">
-        <p14:creationId xmlns:p14="http://schemas.microsoft.com/office/powerpoint/2010/main" val="4068945455"/>
+        <p14:creationId xmlns:p14="http://schemas.microsoft.com/office/powerpoint/2010/main" val="2811039333"/>
       </p:ext>
     </p:extLst>
   </p:cSld>
@@ -9938,7 +9921,10 @@
           <a:bodyPr/>
           <a:lstStyle/>
           <a:p>
-            <a:endParaRPr lang="en-GB" dirty="0"/>
+            <a:r>
+              <a:rPr lang="en-GB" dirty="0"/>
+              <a:t>Exercise 4</a:t>
+            </a:r>
           </a:p>
         </p:txBody>
       </p:sp>
@@ -9946,6 +9932,172 @@
     <p:extLst>
       <p:ext uri="{BB962C8B-B14F-4D97-AF65-F5344CB8AC3E}">
         <p14:creationId xmlns:p14="http://schemas.microsoft.com/office/powerpoint/2010/main" val="4055025767"/>
+      </p:ext>
+    </p:extLst>
+  </p:cSld>
+  <p:clrMapOvr>
+    <a:masterClrMapping/>
+  </p:clrMapOvr>
+</p:sld>
+</file>
+
+<file path=ppt/slides/slide25.xml><?xml version="1.0" encoding="utf-8"?>
+<p:sld xmlns:a="http://schemas.openxmlformats.org/drawingml/2006/main" xmlns:r="http://schemas.openxmlformats.org/officeDocument/2006/relationships" xmlns:p="http://schemas.openxmlformats.org/presentationml/2006/main">
+  <p:cSld>
+    <p:spTree>
+      <p:nvGrpSpPr>
+        <p:cNvPr id="1" name=""/>
+        <p:cNvGrpSpPr/>
+        <p:nvPr/>
+      </p:nvGrpSpPr>
+      <p:grpSpPr>
+        <a:xfrm>
+          <a:off x="0" y="0"/>
+          <a:ext cx="0" cy="0"/>
+          <a:chOff x="0" y="0"/>
+          <a:chExt cx="0" cy="0"/>
+        </a:xfrm>
+      </p:grpSpPr>
+      <p:sp>
+        <p:nvSpPr>
+          <p:cNvPr id="2" name="Title 1">
+            <a:extLst>
+              <a:ext uri="{FF2B5EF4-FFF2-40B4-BE49-F238E27FC236}">
+                <a16:creationId xmlns:a16="http://schemas.microsoft.com/office/drawing/2014/main" id="{65257F4D-890C-2146-861E-FAD6C999E263}"/>
+              </a:ext>
+            </a:extLst>
+          </p:cNvPr>
+          <p:cNvSpPr>
+            <a:spLocks noGrp="1"/>
+          </p:cNvSpPr>
+          <p:nvPr>
+            <p:ph type="title"/>
+          </p:nvPr>
+        </p:nvSpPr>
+        <p:spPr/>
+        <p:txBody>
+          <a:bodyPr/>
+          <a:lstStyle/>
+          <a:p>
+            <a:r>
+              <a:rPr lang="en-GB" dirty="0"/>
+              <a:t>Resources</a:t>
+            </a:r>
+          </a:p>
+        </p:txBody>
+      </p:sp>
+      <p:sp>
+        <p:nvSpPr>
+          <p:cNvPr id="3" name="Content Placeholder 2">
+            <a:extLst>
+              <a:ext uri="{FF2B5EF4-FFF2-40B4-BE49-F238E27FC236}">
+                <a16:creationId xmlns:a16="http://schemas.microsoft.com/office/drawing/2014/main" id="{46E8AD10-7712-FFB9-4306-D0BE98075808}"/>
+              </a:ext>
+            </a:extLst>
+          </p:cNvPr>
+          <p:cNvSpPr>
+            <a:spLocks noGrp="1"/>
+          </p:cNvSpPr>
+          <p:nvPr>
+            <p:ph idx="1"/>
+          </p:nvPr>
+        </p:nvSpPr>
+        <p:spPr/>
+        <p:txBody>
+          <a:bodyPr/>
+          <a:lstStyle/>
+          <a:p>
+            <a:r>
+              <a:rPr lang="en-GB" dirty="0">
+                <a:solidFill>
+                  <a:srgbClr val="0563C1"/>
+                </a:solidFill>
+                <a:hlinkClick r:id="rId2">
+                  <a:extLst>
+                    <a:ext uri="{A12FA001-AC4F-418D-AE19-62706E023703}">
+                      <ahyp:hlinkClr xmlns:ahyp="http://schemas.microsoft.com/office/drawing/2018/hyperlinkcolor" val="tx"/>
+                    </a:ext>
+                  </a:extLst>
+                </a:hlinkClick>
+              </a:rPr>
+              <a:t>https://www.data-to-viz.com/ </a:t>
+            </a:r>
+          </a:p>
+          <a:p>
+            <a:pPr marL="0" indent="0">
+              <a:buNone/>
+            </a:pPr>
+            <a:r>
+              <a:rPr lang="en-GB" dirty="0"/>
+              <a:t>Information to help you decide on the most appropriate graph for your data. Common errors to avoid. Links to code</a:t>
+            </a:r>
+          </a:p>
+          <a:p>
+            <a:r>
+              <a:rPr lang="en-GB" dirty="0">
+                <a:solidFill>
+                  <a:srgbClr val="0563C1"/>
+                </a:solidFill>
+                <a:hlinkClick r:id="rId2">
+                  <a:extLst>
+                    <a:ext uri="{A12FA001-AC4F-418D-AE19-62706E023703}">
+                      <ahyp:hlinkClr xmlns:ahyp="http://schemas.microsoft.com/office/drawing/2018/hyperlinkcolor" val="tx"/>
+                    </a:ext>
+                  </a:extLst>
+                </a:hlinkClick>
+              </a:rPr>
+              <a:t>https://r-graph-gallery.com/</a:t>
+            </a:r>
+            <a:endParaRPr lang="en-GB" dirty="0"/>
+          </a:p>
+          <a:p>
+            <a:pPr marL="0" indent="0">
+              <a:buNone/>
+            </a:pPr>
+            <a:r>
+              <a:rPr lang="en-GB" dirty="0"/>
+              <a:t>Examples of different graph types with code</a:t>
+            </a:r>
+          </a:p>
+          <a:p>
+            <a:pPr marL="0" indent="0">
+              <a:buNone/>
+            </a:pPr>
+            <a:endParaRPr lang="en-GB" dirty="0"/>
+          </a:p>
+          <a:p>
+            <a:pPr marL="0" indent="0">
+              <a:buNone/>
+            </a:pPr>
+            <a:endParaRPr lang="en-GB" dirty="0"/>
+          </a:p>
+          <a:p>
+            <a:pPr marL="0" indent="0">
+              <a:buNone/>
+            </a:pPr>
+            <a:r>
+              <a:rPr lang="en-GB" dirty="0">
+                <a:hlinkClick r:id="rId3"/>
+              </a:rPr>
+              <a:t>R for Data Science (2e) - 2  Data visualization (hadley.nz)</a:t>
+            </a:r>
+            <a:r>
+              <a:rPr lang="en-GB" dirty="0"/>
+              <a:t> – book chapter with code, reproducible examples and exercises.</a:t>
+            </a:r>
+          </a:p>
+          <a:p>
+            <a:pPr marL="0" indent="0">
+              <a:buNone/>
+            </a:pPr>
+            <a:endParaRPr lang="en-GB" dirty="0"/>
+          </a:p>
+        </p:txBody>
+      </p:sp>
+    </p:spTree>
+    <p:extLst>
+      <p:ext uri="{BB962C8B-B14F-4D97-AF65-F5344CB8AC3E}">
+        <p14:creationId xmlns:p14="http://schemas.microsoft.com/office/powerpoint/2010/main" val="1468387104"/>
       </p:ext>
     </p:extLst>
   </p:cSld>
@@ -9977,7 +10129,7 @@
           <p:cNvPr id="2" name="Title 1">
             <a:extLst>
               <a:ext uri="{FF2B5EF4-FFF2-40B4-BE49-F238E27FC236}">
-                <a16:creationId xmlns:a16="http://schemas.microsoft.com/office/drawing/2014/main" id="{018D23F0-5235-4EF4-B6DA-3DDAE5471B47}"/>
+                <a16:creationId xmlns:a16="http://schemas.microsoft.com/office/drawing/2014/main" id="{D403470E-64BD-48E6-8DDA-37BB4933A521}"/>
               </a:ext>
             </a:extLst>
           </p:cNvPr>
@@ -10005,7 +10157,7 @@
           <p:cNvPr id="3" name="Content Placeholder 2">
             <a:extLst>
               <a:ext uri="{FF2B5EF4-FFF2-40B4-BE49-F238E27FC236}">
-                <a16:creationId xmlns:a16="http://schemas.microsoft.com/office/drawing/2014/main" id="{2CF3AB9C-74F0-4013-B8B4-166520545EB4}"/>
+                <a16:creationId xmlns:a16="http://schemas.microsoft.com/office/drawing/2014/main" id="{D847CE8F-9CD3-41F3-9633-11F0650A8B60}"/>
               </a:ext>
             </a:extLst>
           </p:cNvPr>
@@ -10016,53 +10168,74 @@
             <p:ph idx="1"/>
           </p:nvPr>
         </p:nvSpPr>
-        <p:spPr/>
+        <p:spPr>
+          <a:xfrm>
+            <a:off x="838200" y="1825625"/>
+            <a:ext cx="4023049" cy="4351338"/>
+          </a:xfrm>
+        </p:spPr>
         <p:txBody>
           <a:bodyPr/>
           <a:lstStyle/>
           <a:p>
             <a:r>
               <a:rPr lang="en-GB" dirty="0"/>
-              <a:t>A picture is worth  1000 words…. </a:t>
-            </a:r>
-          </a:p>
-          <a:p>
-            <a:pPr lvl="1"/>
-            <a:r>
-              <a:rPr lang="en-GB" dirty="0"/>
-              <a:t>Reveals things the stats might not</a:t>
-            </a:r>
-          </a:p>
-          <a:p>
-            <a:pPr lvl="1"/>
-            <a:r>
-              <a:rPr lang="en-GB" dirty="0"/>
-              <a:t>Easier to grasp for many people</a:t>
-            </a:r>
-          </a:p>
-          <a:p>
-            <a:pPr lvl="1"/>
-            <a:r>
-              <a:rPr lang="en-GB" dirty="0"/>
-              <a:t>Quickly identify main features, anomalies</a:t>
-            </a:r>
-          </a:p>
-          <a:p>
-            <a:pPr lvl="1"/>
-            <a:r>
-              <a:rPr lang="en-GB" dirty="0"/>
-              <a:t>Holds an audiences interest more than a wall of text/numbers</a:t>
-            </a:r>
-          </a:p>
-          <a:p>
-            <a:endParaRPr lang="en-GB" dirty="0"/>
+              <a:t>These datasets all have the same mean, median, standard deviation</a:t>
+            </a:r>
           </a:p>
         </p:txBody>
       </p:sp>
+      <p:pic>
+        <p:nvPicPr>
+          <p:cNvPr id="2050" name="Picture 2" descr="The Datasaurus Dozen">
+            <a:extLst>
+              <a:ext uri="{FF2B5EF4-FFF2-40B4-BE49-F238E27FC236}">
+                <a16:creationId xmlns:a16="http://schemas.microsoft.com/office/drawing/2014/main" id="{BC4BE49D-BF8E-4D5A-8862-BFF17BE81044}"/>
+              </a:ext>
+            </a:extLst>
+          </p:cNvPr>
+          <p:cNvPicPr>
+            <a:picLocks noChangeAspect="1" noChangeArrowheads="1"/>
+          </p:cNvPicPr>
+          <p:nvPr/>
+        </p:nvPicPr>
+        <p:blipFill>
+          <a:blip r:embed="rId2" cstate="print">
+            <a:extLst>
+              <a:ext uri="{28A0092B-C50C-407E-A947-70E740481C1C}">
+                <a14:useLocalDpi xmlns:a14="http://schemas.microsoft.com/office/drawing/2010/main" val="0"/>
+              </a:ext>
+            </a:extLst>
+          </a:blip>
+          <a:srcRect/>
+          <a:stretch>
+            <a:fillRect/>
+          </a:stretch>
+        </p:blipFill>
+        <p:spPr bwMode="auto">
+          <a:xfrm>
+            <a:off x="5507523" y="1690691"/>
+            <a:ext cx="5909780" cy="4128436"/>
+          </a:xfrm>
+          <a:prstGeom prst="rect">
+            <a:avLst/>
+          </a:prstGeom>
+          <a:noFill/>
+          <a:extLst>
+            <a:ext uri="{909E8E84-426E-40DD-AFC4-6F175D3DCCD1}">
+              <a14:hiddenFill xmlns:a14="http://schemas.microsoft.com/office/drawing/2010/main">
+                <a:solidFill>
+                  <a:srgbClr val="FFFFFF"/>
+                </a:solidFill>
+              </a14:hiddenFill>
+            </a:ext>
+          </a:extLst>
+        </p:spPr>
+      </p:pic>
     </p:spTree>
     <p:extLst>
       <p:ext uri="{BB962C8B-B14F-4D97-AF65-F5344CB8AC3E}">
-        <p14:creationId xmlns:p14="http://schemas.microsoft.com/office/powerpoint/2010/main" val="2811039333"/>
+        <p14:creationId xmlns:p14="http://schemas.microsoft.com/office/powerpoint/2010/main" val="4068945455"/>
       </p:ext>
     </p:extLst>
   </p:cSld>
@@ -11217,7 +11390,7 @@
         </p:nvSpPr>
         <p:spPr>
           <a:xfrm>
-            <a:off x="944564" y="4453752"/>
+            <a:off x="915067" y="4414372"/>
             <a:ext cx="5002160" cy="1474837"/>
           </a:xfrm>
           <a:prstGeom prst="rect">
@@ -11271,7 +11444,7 @@
         </p:nvSpPr>
         <p:spPr>
           <a:xfrm>
-            <a:off x="2575487" y="4104658"/>
+            <a:off x="2540970" y="4114490"/>
             <a:ext cx="356419" cy="299882"/>
           </a:xfrm>
           <a:prstGeom prst="rect">

</xml_diff>

<commit_message>
amendments to ppt, add phs themes to examples
</commit_message>
<xml_diff>
--- a/Introduction to ggplot.pptx
+++ b/Introduction to ggplot.pptx
@@ -18,17 +18,17 @@
     <p:sldId id="265" r:id="rId12"/>
     <p:sldId id="266" r:id="rId13"/>
     <p:sldId id="262" r:id="rId14"/>
-    <p:sldId id="267" r:id="rId15"/>
-    <p:sldId id="269" r:id="rId16"/>
-    <p:sldId id="270" r:id="rId17"/>
-    <p:sldId id="271" r:id="rId18"/>
-    <p:sldId id="268" r:id="rId19"/>
-    <p:sldId id="272" r:id="rId20"/>
-    <p:sldId id="273" r:id="rId21"/>
-    <p:sldId id="276" r:id="rId22"/>
-    <p:sldId id="274" r:id="rId23"/>
-    <p:sldId id="275" r:id="rId24"/>
-    <p:sldId id="277" r:id="rId25"/>
+    <p:sldId id="274" r:id="rId15"/>
+    <p:sldId id="275" r:id="rId16"/>
+    <p:sldId id="277" r:id="rId17"/>
+    <p:sldId id="267" r:id="rId18"/>
+    <p:sldId id="269" r:id="rId19"/>
+    <p:sldId id="270" r:id="rId20"/>
+    <p:sldId id="271" r:id="rId21"/>
+    <p:sldId id="268" r:id="rId22"/>
+    <p:sldId id="272" r:id="rId23"/>
+    <p:sldId id="273" r:id="rId24"/>
+    <p:sldId id="276" r:id="rId25"/>
     <p:sldId id="278" r:id="rId26"/>
     <p:sldId id="279" r:id="rId27"/>
     <p:sldId id="280" r:id="rId28"/>
@@ -221,7 +221,7 @@
           <a:p>
             <a:fld id="{E326FCFE-7176-4740-B8A4-BE7D6F546224}" type="datetimeFigureOut">
               <a:rPr lang="en-GB" smtClean="0"/>
-              <a:t>15/02/2023</a:t>
+              <a:t>16/02/2023</a:t>
             </a:fld>
             <a:endParaRPr lang="en-GB"/>
           </a:p>
@@ -660,7 +660,7 @@
           <a:p>
             <a:fld id="{32F30A6C-8B7B-4BC2-B46E-03E01B6F7999}" type="slidenum">
               <a:rPr lang="en-GB" smtClean="0"/>
-              <a:t>16</a:t>
+              <a:t>19</a:t>
             </a:fld>
             <a:endParaRPr lang="en-GB"/>
           </a:p>
@@ -755,7 +755,7 @@
           <a:p>
             <a:fld id="{32F30A6C-8B7B-4BC2-B46E-03E01B6F7999}" type="slidenum">
               <a:rPr lang="en-GB" smtClean="0"/>
-              <a:t>18</a:t>
+              <a:t>21</a:t>
             </a:fld>
             <a:endParaRPr lang="en-GB"/>
           </a:p>
@@ -2674,6 +2674,1848 @@
           <p:cNvPr id="2" name="Title 1">
             <a:extLst>
               <a:ext uri="{FF2B5EF4-FFF2-40B4-BE49-F238E27FC236}">
+                <a16:creationId xmlns:a16="http://schemas.microsoft.com/office/drawing/2014/main" id="{DC6C9B58-EE8B-43B7-9EA7-4FB5C0C89F6C}"/>
+              </a:ext>
+            </a:extLst>
+          </p:cNvPr>
+          <p:cNvSpPr>
+            <a:spLocks noGrp="1"/>
+          </p:cNvSpPr>
+          <p:nvPr>
+            <p:ph type="title"/>
+          </p:nvPr>
+        </p:nvSpPr>
+        <p:spPr/>
+        <p:txBody>
+          <a:bodyPr/>
+          <a:lstStyle/>
+          <a:p>
+            <a:r>
+              <a:rPr lang="en-GB" dirty="0"/>
+              <a:t>Geometry layers</a:t>
+            </a:r>
+          </a:p>
+        </p:txBody>
+      </p:sp>
+      <p:sp>
+        <p:nvSpPr>
+          <p:cNvPr id="3" name="Content Placeholder 2">
+            <a:extLst>
+              <a:ext uri="{FF2B5EF4-FFF2-40B4-BE49-F238E27FC236}">
+                <a16:creationId xmlns:a16="http://schemas.microsoft.com/office/drawing/2014/main" id="{CF0EAE4F-AEB3-4AC6-B3CF-78C925F99AFB}"/>
+              </a:ext>
+            </a:extLst>
+          </p:cNvPr>
+          <p:cNvSpPr>
+            <a:spLocks noGrp="1"/>
+          </p:cNvSpPr>
+          <p:nvPr>
+            <p:ph idx="1"/>
+          </p:nvPr>
+        </p:nvSpPr>
+        <p:spPr/>
+        <p:txBody>
+          <a:bodyPr/>
+          <a:lstStyle/>
+          <a:p>
+            <a:r>
+              <a:rPr lang="en-GB" dirty="0"/>
+              <a:t>These are the </a:t>
+            </a:r>
+            <a:r>
+              <a:rPr lang="en-GB" dirty="0" err="1"/>
+              <a:t>geom</a:t>
+            </a:r>
+            <a:r>
+              <a:rPr lang="en-GB" dirty="0"/>
+              <a:t> layers we have already used: </a:t>
+            </a:r>
+            <a:r>
+              <a:rPr lang="en-GB" dirty="0" err="1"/>
+              <a:t>gemo_bar</a:t>
+            </a:r>
+            <a:r>
+              <a:rPr lang="en-GB" dirty="0"/>
+              <a:t>, </a:t>
+            </a:r>
+            <a:r>
+              <a:rPr lang="en-GB" dirty="0" err="1"/>
+              <a:t>geom_line</a:t>
+            </a:r>
+            <a:r>
+              <a:rPr lang="en-GB" dirty="0"/>
+              <a:t> etc.</a:t>
+            </a:r>
+          </a:p>
+          <a:p>
+            <a:pPr lvl="1"/>
+            <a:r>
+              <a:rPr lang="en-GB" dirty="0"/>
+              <a:t>There are ~50 options! </a:t>
+            </a:r>
+          </a:p>
+          <a:p>
+            <a:pPr lvl="1"/>
+            <a:r>
+              <a:rPr lang="en-GB" dirty="0"/>
+              <a:t>You will probably only use a few of these frequently</a:t>
+            </a:r>
+          </a:p>
+        </p:txBody>
+      </p:sp>
+    </p:spTree>
+    <p:extLst>
+      <p:ext uri="{BB962C8B-B14F-4D97-AF65-F5344CB8AC3E}">
+        <p14:creationId xmlns:p14="http://schemas.microsoft.com/office/powerpoint/2010/main" val="2747122656"/>
+      </p:ext>
+    </p:extLst>
+  </p:cSld>
+  <p:clrMapOvr>
+    <a:masterClrMapping/>
+  </p:clrMapOvr>
+</p:sld>
+</file>
+
+<file path=ppt/slides/slide12.xml><?xml version="1.0" encoding="utf-8"?>
+<p:sld xmlns:a="http://schemas.openxmlformats.org/drawingml/2006/main" xmlns:r="http://schemas.openxmlformats.org/officeDocument/2006/relationships" xmlns:p="http://schemas.openxmlformats.org/presentationml/2006/main">
+  <p:cSld>
+    <p:spTree>
+      <p:nvGrpSpPr>
+        <p:cNvPr id="1" name=""/>
+        <p:cNvGrpSpPr/>
+        <p:nvPr/>
+      </p:nvGrpSpPr>
+      <p:grpSpPr>
+        <a:xfrm>
+          <a:off x="0" y="0"/>
+          <a:ext cx="0" cy="0"/>
+          <a:chOff x="0" y="0"/>
+          <a:chExt cx="0" cy="0"/>
+        </a:xfrm>
+      </p:grpSpPr>
+      <p:sp>
+        <p:nvSpPr>
+          <p:cNvPr id="2" name="Title 1">
+            <a:extLst>
+              <a:ext uri="{FF2B5EF4-FFF2-40B4-BE49-F238E27FC236}">
+                <a16:creationId xmlns:a16="http://schemas.microsoft.com/office/drawing/2014/main" id="{DC6C9B58-EE8B-43B7-9EA7-4FB5C0C89F6C}"/>
+              </a:ext>
+            </a:extLst>
+          </p:cNvPr>
+          <p:cNvSpPr>
+            <a:spLocks noGrp="1"/>
+          </p:cNvSpPr>
+          <p:nvPr>
+            <p:ph type="title"/>
+          </p:nvPr>
+        </p:nvSpPr>
+        <p:spPr/>
+        <p:txBody>
+          <a:bodyPr/>
+          <a:lstStyle/>
+          <a:p>
+            <a:r>
+              <a:rPr lang="en-GB" dirty="0"/>
+              <a:t>Geometry layers – some examples</a:t>
+            </a:r>
+          </a:p>
+        </p:txBody>
+      </p:sp>
+      <p:graphicFrame>
+        <p:nvGraphicFramePr>
+          <p:cNvPr id="6" name="Table 5">
+            <a:extLst>
+              <a:ext uri="{FF2B5EF4-FFF2-40B4-BE49-F238E27FC236}">
+                <a16:creationId xmlns:a16="http://schemas.microsoft.com/office/drawing/2014/main" id="{D8408E5E-02B9-4AC0-8449-8D5364E00E7B}"/>
+              </a:ext>
+            </a:extLst>
+          </p:cNvPr>
+          <p:cNvGraphicFramePr>
+            <a:graphicFrameLocks noGrp="1"/>
+          </p:cNvGraphicFramePr>
+          <p:nvPr>
+            <p:extLst>
+              <p:ext uri="{D42A27DB-BD31-4B8C-83A1-F6EECF244321}">
+                <p14:modId xmlns:p14="http://schemas.microsoft.com/office/powerpoint/2010/main" val="1458261592"/>
+              </p:ext>
+            </p:extLst>
+          </p:nvPr>
+        </p:nvGraphicFramePr>
+        <p:xfrm>
+          <a:off x="1069258" y="1497787"/>
+          <a:ext cx="10660626" cy="4636533"/>
+        </p:xfrm>
+        <a:graphic>
+          <a:graphicData uri="http://schemas.openxmlformats.org/drawingml/2006/table">
+            <a:tbl>
+              <a:tblPr/>
+              <a:tblGrid>
+                <a:gridCol w="1408471">
+                  <a:extLst>
+                    <a:ext uri="{9D8B030D-6E8A-4147-A177-3AD203B41FA5}">
+                      <a16:colId xmlns:a16="http://schemas.microsoft.com/office/drawing/2014/main" val="1152714497"/>
+                    </a:ext>
+                  </a:extLst>
+                </a:gridCol>
+                <a:gridCol w="1858297">
+                  <a:extLst>
+                    <a:ext uri="{9D8B030D-6E8A-4147-A177-3AD203B41FA5}">
+                      <a16:colId xmlns:a16="http://schemas.microsoft.com/office/drawing/2014/main" val="752761264"/>
+                    </a:ext>
+                  </a:extLst>
+                </a:gridCol>
+                <a:gridCol w="7393858">
+                  <a:extLst>
+                    <a:ext uri="{9D8B030D-6E8A-4147-A177-3AD203B41FA5}">
+                      <a16:colId xmlns:a16="http://schemas.microsoft.com/office/drawing/2014/main" val="1489400548"/>
+                    </a:ext>
+                  </a:extLst>
+                </a:gridCol>
+              </a:tblGrid>
+              <a:tr h="318868">
+                <a:tc>
+                  <a:txBody>
+                    <a:bodyPr/>
+                    <a:lstStyle/>
+                    <a:p>
+                      <a:pPr algn="l" fontAlgn="b"/>
+                      <a:r>
+                        <a:rPr lang="en-GB" sz="1400" b="1" dirty="0">
+                          <a:solidFill>
+                            <a:srgbClr val="666666"/>
+                          </a:solidFill>
+                          <a:effectLst/>
+                          <a:latin typeface="Open Sans" panose="020B0606030504020204" pitchFamily="34" charset="0"/>
+                        </a:rPr>
+                        <a:t>Group</a:t>
+                      </a:r>
+                    </a:p>
+                  </a:txBody>
+                  <a:tcPr marL="28978" marR="28978" marT="57956" marB="57956" anchor="b">
+                    <a:lnL>
+                      <a:noFill/>
+                    </a:lnL>
+                    <a:lnR>
+                      <a:noFill/>
+                    </a:lnR>
+                    <a:lnT>
+                      <a:noFill/>
+                    </a:lnT>
+                    <a:lnB>
+                      <a:noFill/>
+                    </a:lnB>
+                  </a:tcPr>
+                </a:tc>
+                <a:tc>
+                  <a:txBody>
+                    <a:bodyPr/>
+                    <a:lstStyle/>
+                    <a:p>
+                      <a:pPr algn="l" fontAlgn="b"/>
+                      <a:r>
+                        <a:rPr lang="en-GB" sz="1400" b="1">
+                          <a:solidFill>
+                            <a:srgbClr val="666666"/>
+                          </a:solidFill>
+                          <a:effectLst/>
+                          <a:latin typeface="Open Sans" panose="020B0606030504020204" pitchFamily="34" charset="0"/>
+                        </a:rPr>
+                        <a:t>Function</a:t>
+                      </a:r>
+                    </a:p>
+                  </a:txBody>
+                  <a:tcPr marL="28978" marR="28978" marT="57956" marB="57956" anchor="b">
+                    <a:lnL>
+                      <a:noFill/>
+                    </a:lnL>
+                    <a:lnR>
+                      <a:noFill/>
+                    </a:lnR>
+                    <a:lnT>
+                      <a:noFill/>
+                    </a:lnT>
+                    <a:lnB>
+                      <a:noFill/>
+                    </a:lnB>
+                  </a:tcPr>
+                </a:tc>
+                <a:tc>
+                  <a:txBody>
+                    <a:bodyPr/>
+                    <a:lstStyle/>
+                    <a:p>
+                      <a:pPr algn="l" fontAlgn="b"/>
+                      <a:r>
+                        <a:rPr lang="en-GB" sz="1400" b="1" dirty="0">
+                          <a:solidFill>
+                            <a:srgbClr val="666666"/>
+                          </a:solidFill>
+                          <a:effectLst/>
+                          <a:latin typeface="Open Sans" panose="020B0606030504020204" pitchFamily="34" charset="0"/>
+                        </a:rPr>
+                        <a:t>Description</a:t>
+                      </a:r>
+                    </a:p>
+                  </a:txBody>
+                  <a:tcPr marL="28978" marR="28978" marT="57956" marB="57956" anchor="b">
+                    <a:lnL>
+                      <a:noFill/>
+                    </a:lnL>
+                    <a:lnR>
+                      <a:noFill/>
+                    </a:lnR>
+                    <a:lnT>
+                      <a:noFill/>
+                    </a:lnT>
+                    <a:lnB>
+                      <a:noFill/>
+                    </a:lnB>
+                  </a:tcPr>
+                </a:tc>
+                <a:extLst>
+                  <a:ext uri="{0D108BD9-81ED-4DB2-BD59-A6C34878D82A}">
+                    <a16:rowId xmlns:a16="http://schemas.microsoft.com/office/drawing/2014/main" val="3173409864"/>
+                  </a:ext>
+                </a:extLst>
+              </a:tr>
+              <a:tr h="788854">
+                <a:tc rowSpan="3">
+                  <a:txBody>
+                    <a:bodyPr/>
+                    <a:lstStyle/>
+                    <a:p>
+                      <a:pPr algn="l" fontAlgn="ctr"/>
+                      <a:r>
+                        <a:rPr lang="en-GB" sz="1400" dirty="0">
+                          <a:effectLst/>
+                          <a:latin typeface="Open Sans" panose="020B0606030504020204" pitchFamily="34" charset="0"/>
+                        </a:rPr>
+                        <a:t>Scatter</a:t>
+                      </a:r>
+                    </a:p>
+                  </a:txBody>
+                  <a:tcPr marL="28978" marR="28978" marT="40569" marB="40569" anchor="ctr">
+                    <a:lnL>
+                      <a:noFill/>
+                    </a:lnL>
+                    <a:lnR>
+                      <a:noFill/>
+                    </a:lnR>
+                    <a:lnT>
+                      <a:noFill/>
+                    </a:lnT>
+                    <a:lnB>
+                      <a:noFill/>
+                    </a:lnB>
+                  </a:tcPr>
+                </a:tc>
+                <a:tc>
+                  <a:txBody>
+                    <a:bodyPr/>
+                    <a:lstStyle/>
+                    <a:p>
+                      <a:pPr algn="l" fontAlgn="ctr"/>
+                      <a:r>
+                        <a:rPr lang="en-GB" sz="1400" b="1" dirty="0" err="1">
+                          <a:effectLst/>
+                          <a:latin typeface="Open Sans" panose="020B0606030504020204" pitchFamily="34" charset="0"/>
+                        </a:rPr>
+                        <a:t>geom_point</a:t>
+                      </a:r>
+                      <a:r>
+                        <a:rPr lang="en-GB" sz="1400" b="1" dirty="0">
+                          <a:effectLst/>
+                          <a:latin typeface="Open Sans" panose="020B0606030504020204" pitchFamily="34" charset="0"/>
+                        </a:rPr>
+                        <a:t>()</a:t>
+                      </a:r>
+                      <a:endParaRPr lang="en-GB" sz="1400" dirty="0">
+                        <a:effectLst/>
+                        <a:latin typeface="Open Sans" panose="020B0606030504020204" pitchFamily="34" charset="0"/>
+                      </a:endParaRPr>
+                    </a:p>
+                  </a:txBody>
+                  <a:tcPr marL="28978" marR="28978" marT="40569" marB="40569" anchor="ctr">
+                    <a:lnL>
+                      <a:noFill/>
+                    </a:lnL>
+                    <a:lnR>
+                      <a:noFill/>
+                    </a:lnR>
+                    <a:lnT>
+                      <a:noFill/>
+                    </a:lnT>
+                    <a:lnB>
+                      <a:noFill/>
+                    </a:lnB>
+                  </a:tcPr>
+                </a:tc>
+                <a:tc>
+                  <a:txBody>
+                    <a:bodyPr/>
+                    <a:lstStyle/>
+                    <a:p>
+                      <a:pPr algn="l" fontAlgn="ctr"/>
+                      <a:r>
+                        <a:rPr lang="en-GB" sz="1400" dirty="0">
+                          <a:effectLst/>
+                          <a:latin typeface="Open Sans" panose="020B0606030504020204" pitchFamily="34" charset="0"/>
+                        </a:rPr>
+                        <a:t>This is the foundation for the next 2 variations. Scatterplots are the most useful for displaying the relationship between 2 continuous variables. You can map another variable to size which will create a bubble chart from this.</a:t>
+                      </a:r>
+                    </a:p>
+                  </a:txBody>
+                  <a:tcPr marL="28978" marR="28978" marT="40569" marB="40569" anchor="ctr">
+                    <a:lnL>
+                      <a:noFill/>
+                    </a:lnL>
+                    <a:lnR>
+                      <a:noFill/>
+                    </a:lnR>
+                    <a:lnT>
+                      <a:noFill/>
+                    </a:lnT>
+                    <a:lnB>
+                      <a:noFill/>
+                    </a:lnB>
+                  </a:tcPr>
+                </a:tc>
+                <a:extLst>
+                  <a:ext uri="{0D108BD9-81ED-4DB2-BD59-A6C34878D82A}">
+                    <a16:rowId xmlns:a16="http://schemas.microsoft.com/office/drawing/2014/main" val="2296354270"/>
+                  </a:ext>
+                </a:extLst>
+              </a:tr>
+              <a:tr h="653750">
+                <a:tc vMerge="1">
+                  <a:txBody>
+                    <a:bodyPr/>
+                    <a:lstStyle/>
+                    <a:p>
+                      <a:endParaRPr lang="en-GB"/>
+                    </a:p>
+                  </a:txBody>
+                  <a:tcPr/>
+                </a:tc>
+                <a:tc>
+                  <a:txBody>
+                    <a:bodyPr/>
+                    <a:lstStyle/>
+                    <a:p>
+                      <a:pPr algn="l" fontAlgn="ctr"/>
+                      <a:r>
+                        <a:rPr lang="en-GB" sz="1400" b="1" dirty="0" err="1">
+                          <a:effectLst/>
+                          <a:latin typeface="Open Sans" panose="020B0606030504020204" pitchFamily="34" charset="0"/>
+                        </a:rPr>
+                        <a:t>geom_jitter</a:t>
+                      </a:r>
+                      <a:r>
+                        <a:rPr lang="en-GB" sz="1400" b="1" dirty="0">
+                          <a:effectLst/>
+                          <a:latin typeface="Open Sans" panose="020B0606030504020204" pitchFamily="34" charset="0"/>
+                        </a:rPr>
+                        <a:t>()</a:t>
+                      </a:r>
+                      <a:endParaRPr lang="en-GB" sz="1400" dirty="0">
+                        <a:effectLst/>
+                        <a:latin typeface="Open Sans" panose="020B0606030504020204" pitchFamily="34" charset="0"/>
+                      </a:endParaRPr>
+                    </a:p>
+                  </a:txBody>
+                  <a:tcPr marL="28978" marR="28978" marT="40569" marB="40569" anchor="ctr">
+                    <a:lnL>
+                      <a:noFill/>
+                    </a:lnL>
+                    <a:lnR>
+                      <a:noFill/>
+                    </a:lnR>
+                    <a:lnT>
+                      <a:noFill/>
+                    </a:lnT>
+                    <a:lnB>
+                      <a:noFill/>
+                    </a:lnB>
+                  </a:tcPr>
+                </a:tc>
+                <a:tc>
+                  <a:txBody>
+                    <a:bodyPr/>
+                    <a:lstStyle/>
+                    <a:p>
+                      <a:pPr algn="l" fontAlgn="ctr"/>
+                      <a:r>
+                        <a:rPr lang="en-GB" sz="1400" dirty="0">
+                          <a:effectLst/>
+                          <a:latin typeface="Open Sans" panose="020B0606030504020204" pitchFamily="34" charset="0"/>
+                        </a:rPr>
+                        <a:t>A convenient shortcut for specifying jitter as the position. Adding a small amount of random variation to the location of points, useful for handling overplotting.</a:t>
+                      </a:r>
+                    </a:p>
+                  </a:txBody>
+                  <a:tcPr marL="28978" marR="28978" marT="40569" marB="40569" anchor="ctr">
+                    <a:lnL>
+                      <a:noFill/>
+                    </a:lnL>
+                    <a:lnR>
+                      <a:noFill/>
+                    </a:lnR>
+                    <a:lnT>
+                      <a:noFill/>
+                    </a:lnT>
+                    <a:lnB>
+                      <a:noFill/>
+                    </a:lnB>
+                  </a:tcPr>
+                </a:tc>
+                <a:extLst>
+                  <a:ext uri="{0D108BD9-81ED-4DB2-BD59-A6C34878D82A}">
+                    <a16:rowId xmlns:a16="http://schemas.microsoft.com/office/drawing/2014/main" val="3025231216"/>
+                  </a:ext>
+                </a:extLst>
+              </a:tr>
+              <a:tr h="285193">
+                <a:tc vMerge="1">
+                  <a:txBody>
+                    <a:bodyPr/>
+                    <a:lstStyle/>
+                    <a:p>
+                      <a:endParaRPr lang="en-GB"/>
+                    </a:p>
+                  </a:txBody>
+                  <a:tcPr/>
+                </a:tc>
+                <a:tc>
+                  <a:txBody>
+                    <a:bodyPr/>
+                    <a:lstStyle/>
+                    <a:p>
+                      <a:pPr algn="l" fontAlgn="ctr"/>
+                      <a:r>
+                        <a:rPr lang="en-GB" sz="1400" b="1">
+                          <a:effectLst/>
+                          <a:latin typeface="Open Sans" panose="020B0606030504020204" pitchFamily="34" charset="0"/>
+                        </a:rPr>
+                        <a:t>geom_count()</a:t>
+                      </a:r>
+                      <a:endParaRPr lang="en-GB" sz="1400">
+                        <a:effectLst/>
+                        <a:latin typeface="Open Sans" panose="020B0606030504020204" pitchFamily="34" charset="0"/>
+                      </a:endParaRPr>
+                    </a:p>
+                  </a:txBody>
+                  <a:tcPr marL="28978" marR="28978" marT="40569" marB="40569" anchor="ctr">
+                    <a:lnL>
+                      <a:noFill/>
+                    </a:lnL>
+                    <a:lnR>
+                      <a:noFill/>
+                    </a:lnR>
+                    <a:lnT>
+                      <a:noFill/>
+                    </a:lnT>
+                    <a:lnB w="12700" cap="flat" cmpd="sng" algn="ctr">
+                      <a:solidFill>
+                        <a:schemeClr val="tx1"/>
+                      </a:solidFill>
+                      <a:prstDash val="solid"/>
+                      <a:round/>
+                      <a:headEnd type="none" w="med" len="med"/>
+                      <a:tailEnd type="none" w="med" len="med"/>
+                    </a:lnB>
+                  </a:tcPr>
+                </a:tc>
+                <a:tc>
+                  <a:txBody>
+                    <a:bodyPr/>
+                    <a:lstStyle/>
+                    <a:p>
+                      <a:pPr algn="l" fontAlgn="ctr"/>
+                      <a:r>
+                        <a:rPr lang="en-GB" sz="1400" dirty="0">
+                          <a:effectLst/>
+                          <a:latin typeface="Open Sans" panose="020B0606030504020204" pitchFamily="34" charset="0"/>
+                        </a:rPr>
+                        <a:t>Counting the number of observations at each location.</a:t>
+                      </a:r>
+                    </a:p>
+                  </a:txBody>
+                  <a:tcPr marL="28978" marR="28978" marT="40569" marB="40569" anchor="ctr">
+                    <a:lnL>
+                      <a:noFill/>
+                    </a:lnL>
+                    <a:lnR>
+                      <a:noFill/>
+                    </a:lnR>
+                    <a:lnT>
+                      <a:noFill/>
+                    </a:lnT>
+                    <a:lnB w="12700" cap="flat" cmpd="sng" algn="ctr">
+                      <a:solidFill>
+                        <a:schemeClr val="tx1"/>
+                      </a:solidFill>
+                      <a:prstDash val="solid"/>
+                      <a:round/>
+                      <a:headEnd type="none" w="med" len="med"/>
+                      <a:tailEnd type="none" w="med" len="med"/>
+                    </a:lnB>
+                  </a:tcPr>
+                </a:tc>
+                <a:extLst>
+                  <a:ext uri="{0D108BD9-81ED-4DB2-BD59-A6C34878D82A}">
+                    <a16:rowId xmlns:a16="http://schemas.microsoft.com/office/drawing/2014/main" val="4234896019"/>
+                  </a:ext>
+                </a:extLst>
+              </a:tr>
+              <a:tr h="508011">
+                <a:tc rowSpan="3">
+                  <a:txBody>
+                    <a:bodyPr/>
+                    <a:lstStyle/>
+                    <a:p>
+                      <a:pPr algn="l" fontAlgn="ctr"/>
+                      <a:r>
+                        <a:rPr lang="en-GB" sz="1400" dirty="0">
+                          <a:effectLst/>
+                          <a:latin typeface="Open Sans" panose="020B0606030504020204" pitchFamily="34" charset="0"/>
+                        </a:rPr>
+                        <a:t>Bar</a:t>
+                      </a:r>
+                    </a:p>
+                  </a:txBody>
+                  <a:tcPr marL="28978" marR="28978" marT="40569" marB="40569" anchor="ctr">
+                    <a:lnL>
+                      <a:noFill/>
+                    </a:lnL>
+                    <a:lnR>
+                      <a:noFill/>
+                    </a:lnR>
+                    <a:lnT>
+                      <a:noFill/>
+                    </a:lnT>
+                    <a:lnB>
+                      <a:noFill/>
+                    </a:lnB>
+                  </a:tcPr>
+                </a:tc>
+                <a:tc>
+                  <a:txBody>
+                    <a:bodyPr/>
+                    <a:lstStyle/>
+                    <a:p>
+                      <a:pPr algn="l" fontAlgn="ctr"/>
+                      <a:r>
+                        <a:rPr lang="en-GB" sz="1400" b="1" dirty="0" err="1">
+                          <a:effectLst/>
+                          <a:latin typeface="Open Sans" panose="020B0606030504020204" pitchFamily="34" charset="0"/>
+                        </a:rPr>
+                        <a:t>geom_histogram</a:t>
+                      </a:r>
+                      <a:r>
+                        <a:rPr lang="en-GB" sz="1400" b="1" dirty="0">
+                          <a:effectLst/>
+                          <a:latin typeface="Open Sans" panose="020B0606030504020204" pitchFamily="34" charset="0"/>
+                        </a:rPr>
+                        <a:t>()</a:t>
+                      </a:r>
+                      <a:endParaRPr lang="en-GB" sz="1400" dirty="0">
+                        <a:effectLst/>
+                        <a:latin typeface="Open Sans" panose="020B0606030504020204" pitchFamily="34" charset="0"/>
+                      </a:endParaRPr>
+                    </a:p>
+                  </a:txBody>
+                  <a:tcPr marL="28978" marR="28978" marT="40569" marB="40569" anchor="ctr">
+                    <a:lnL>
+                      <a:noFill/>
+                    </a:lnL>
+                    <a:lnR>
+                      <a:noFill/>
+                    </a:lnR>
+                    <a:lnT w="12700" cap="flat" cmpd="sng" algn="ctr">
+                      <a:solidFill>
+                        <a:schemeClr val="tx1"/>
+                      </a:solidFill>
+                      <a:prstDash val="solid"/>
+                      <a:round/>
+                      <a:headEnd type="none" w="med" len="med"/>
+                      <a:tailEnd type="none" w="med" len="med"/>
+                    </a:lnT>
+                    <a:lnB>
+                      <a:noFill/>
+                    </a:lnB>
+                  </a:tcPr>
+                </a:tc>
+                <a:tc>
+                  <a:txBody>
+                    <a:bodyPr/>
+                    <a:lstStyle/>
+                    <a:p>
+                      <a:pPr algn="l" fontAlgn="ctr"/>
+                      <a:r>
+                        <a:rPr lang="en-GB" sz="1400" dirty="0">
+                          <a:effectLst/>
+                          <a:latin typeface="Open Sans" panose="020B0606030504020204" pitchFamily="34" charset="0"/>
+                        </a:rPr>
+                        <a:t>A specialised version of bar plots. Showing the binned distribution of a continuous variable.</a:t>
+                      </a:r>
+                    </a:p>
+                  </a:txBody>
+                  <a:tcPr marL="28978" marR="28978" marT="40569" marB="40569" anchor="ctr">
+                    <a:lnL>
+                      <a:noFill/>
+                    </a:lnL>
+                    <a:lnR>
+                      <a:noFill/>
+                    </a:lnR>
+                    <a:lnT w="12700" cap="flat" cmpd="sng" algn="ctr">
+                      <a:solidFill>
+                        <a:schemeClr val="tx1"/>
+                      </a:solidFill>
+                      <a:prstDash val="solid"/>
+                      <a:round/>
+                      <a:headEnd type="none" w="med" len="med"/>
+                      <a:tailEnd type="none" w="med" len="med"/>
+                    </a:lnT>
+                    <a:lnB>
+                      <a:noFill/>
+                    </a:lnB>
+                  </a:tcPr>
+                </a:tc>
+                <a:extLst>
+                  <a:ext uri="{0D108BD9-81ED-4DB2-BD59-A6C34878D82A}">
+                    <a16:rowId xmlns:a16="http://schemas.microsoft.com/office/drawing/2014/main" val="3699880814"/>
+                  </a:ext>
+                </a:extLst>
+              </a:tr>
+              <a:tr h="320848">
+                <a:tc vMerge="1">
+                  <a:txBody>
+                    <a:bodyPr/>
+                    <a:lstStyle/>
+                    <a:p>
+                      <a:endParaRPr lang="en-GB"/>
+                    </a:p>
+                  </a:txBody>
+                  <a:tcPr/>
+                </a:tc>
+                <a:tc>
+                  <a:txBody>
+                    <a:bodyPr/>
+                    <a:lstStyle/>
+                    <a:p>
+                      <a:pPr algn="l" fontAlgn="ctr"/>
+                      <a:r>
+                        <a:rPr lang="en-GB" sz="1400" b="1">
+                          <a:effectLst/>
+                          <a:latin typeface="Open Sans" panose="020B0606030504020204" pitchFamily="34" charset="0"/>
+                        </a:rPr>
+                        <a:t>geom_bar()</a:t>
+                      </a:r>
+                      <a:endParaRPr lang="en-GB" sz="1400">
+                        <a:effectLst/>
+                        <a:latin typeface="Open Sans" panose="020B0606030504020204" pitchFamily="34" charset="0"/>
+                      </a:endParaRPr>
+                    </a:p>
+                  </a:txBody>
+                  <a:tcPr marL="28978" marR="28978" marT="40569" marB="40569" anchor="ctr">
+                    <a:lnL>
+                      <a:noFill/>
+                    </a:lnL>
+                    <a:lnR>
+                      <a:noFill/>
+                    </a:lnR>
+                    <a:lnT>
+                      <a:noFill/>
+                    </a:lnT>
+                    <a:lnB>
+                      <a:noFill/>
+                    </a:lnB>
+                  </a:tcPr>
+                </a:tc>
+                <a:tc>
+                  <a:txBody>
+                    <a:bodyPr/>
+                    <a:lstStyle/>
+                    <a:p>
+                      <a:pPr algn="l" fontAlgn="ctr"/>
+                      <a:r>
+                        <a:rPr lang="en-GB" sz="1400" dirty="0">
+                          <a:effectLst/>
+                          <a:latin typeface="Open Sans" panose="020B0606030504020204" pitchFamily="34" charset="0"/>
+                        </a:rPr>
+                        <a:t>A bar with the height proportional to the number of cases in each group.</a:t>
+                      </a:r>
+                    </a:p>
+                  </a:txBody>
+                  <a:tcPr marL="28978" marR="28978" marT="40569" marB="40569" anchor="ctr">
+                    <a:lnL>
+                      <a:noFill/>
+                    </a:lnL>
+                    <a:lnR>
+                      <a:noFill/>
+                    </a:lnR>
+                    <a:lnT>
+                      <a:noFill/>
+                    </a:lnT>
+                    <a:lnB>
+                      <a:noFill/>
+                    </a:lnB>
+                  </a:tcPr>
+                </a:tc>
+                <a:extLst>
+                  <a:ext uri="{0D108BD9-81ED-4DB2-BD59-A6C34878D82A}">
+                    <a16:rowId xmlns:a16="http://schemas.microsoft.com/office/drawing/2014/main" val="3674227604"/>
+                  </a:ext>
+                </a:extLst>
+              </a:tr>
+              <a:tr h="338674">
+                <a:tc vMerge="1">
+                  <a:txBody>
+                    <a:bodyPr/>
+                    <a:lstStyle/>
+                    <a:p>
+                      <a:endParaRPr lang="en-GB"/>
+                    </a:p>
+                  </a:txBody>
+                  <a:tcPr/>
+                </a:tc>
+                <a:tc>
+                  <a:txBody>
+                    <a:bodyPr/>
+                    <a:lstStyle/>
+                    <a:p>
+                      <a:pPr algn="l" fontAlgn="ctr"/>
+                      <a:r>
+                        <a:rPr lang="en-GB" sz="1400" b="1">
+                          <a:effectLst/>
+                          <a:latin typeface="Open Sans" panose="020B0606030504020204" pitchFamily="34" charset="0"/>
+                        </a:rPr>
+                        <a:t>geom_col()</a:t>
+                      </a:r>
+                      <a:endParaRPr lang="en-GB" sz="1400">
+                        <a:effectLst/>
+                        <a:latin typeface="Open Sans" panose="020B0606030504020204" pitchFamily="34" charset="0"/>
+                      </a:endParaRPr>
+                    </a:p>
+                  </a:txBody>
+                  <a:tcPr marL="28978" marR="28978" marT="40569" marB="40569" anchor="ctr">
+                    <a:lnL>
+                      <a:noFill/>
+                    </a:lnL>
+                    <a:lnR>
+                      <a:noFill/>
+                    </a:lnR>
+                    <a:lnT>
+                      <a:noFill/>
+                    </a:lnT>
+                    <a:lnB w="12700" cap="flat" cmpd="sng" algn="ctr">
+                      <a:solidFill>
+                        <a:schemeClr val="tx1"/>
+                      </a:solidFill>
+                      <a:prstDash val="solid"/>
+                      <a:round/>
+                      <a:headEnd type="none" w="med" len="med"/>
+                      <a:tailEnd type="none" w="med" len="med"/>
+                    </a:lnB>
+                  </a:tcPr>
+                </a:tc>
+                <a:tc>
+                  <a:txBody>
+                    <a:bodyPr/>
+                    <a:lstStyle/>
+                    <a:p>
+                      <a:pPr algn="l" fontAlgn="ctr"/>
+                      <a:r>
+                        <a:rPr lang="en-GB" sz="1400" dirty="0">
+                          <a:effectLst/>
+                          <a:latin typeface="Open Sans" panose="020B0606030504020204" pitchFamily="34" charset="0"/>
+                        </a:rPr>
+                        <a:t>A bar with the height representing values in the data.</a:t>
+                      </a:r>
+                    </a:p>
+                  </a:txBody>
+                  <a:tcPr marL="28978" marR="28978" marT="40569" marB="40569" anchor="ctr">
+                    <a:lnL>
+                      <a:noFill/>
+                    </a:lnL>
+                    <a:lnR>
+                      <a:noFill/>
+                    </a:lnR>
+                    <a:lnT>
+                      <a:noFill/>
+                    </a:lnT>
+                    <a:lnB w="12700" cap="flat" cmpd="sng" algn="ctr">
+                      <a:solidFill>
+                        <a:schemeClr val="tx1"/>
+                      </a:solidFill>
+                      <a:prstDash val="solid"/>
+                      <a:round/>
+                      <a:headEnd type="none" w="med" len="med"/>
+                      <a:tailEnd type="none" w="med" len="med"/>
+                    </a:lnB>
+                  </a:tcPr>
+                </a:tc>
+                <a:extLst>
+                  <a:ext uri="{0D108BD9-81ED-4DB2-BD59-A6C34878D82A}">
+                    <a16:rowId xmlns:a16="http://schemas.microsoft.com/office/drawing/2014/main" val="3722422891"/>
+                  </a:ext>
+                </a:extLst>
+              </a:tr>
+              <a:tr h="285193">
+                <a:tc rowSpan="2">
+                  <a:txBody>
+                    <a:bodyPr/>
+                    <a:lstStyle/>
+                    <a:p>
+                      <a:pPr algn="l" fontAlgn="ctr"/>
+                      <a:r>
+                        <a:rPr lang="en-GB" sz="1400" dirty="0">
+                          <a:effectLst/>
+                          <a:latin typeface="Open Sans" panose="020B0606030504020204" pitchFamily="34" charset="0"/>
+                        </a:rPr>
+                        <a:t>Line</a:t>
+                      </a:r>
+                    </a:p>
+                  </a:txBody>
+                  <a:tcPr marL="28978" marR="28978" marT="40569" marB="40569" anchor="ctr">
+                    <a:lnL>
+                      <a:noFill/>
+                    </a:lnL>
+                    <a:lnR>
+                      <a:noFill/>
+                    </a:lnR>
+                    <a:lnT>
+                      <a:noFill/>
+                    </a:lnT>
+                    <a:lnB>
+                      <a:noFill/>
+                    </a:lnB>
+                  </a:tcPr>
+                </a:tc>
+                <a:tc>
+                  <a:txBody>
+                    <a:bodyPr/>
+                    <a:lstStyle/>
+                    <a:p>
+                      <a:pPr algn="l" fontAlgn="ctr"/>
+                      <a:r>
+                        <a:rPr lang="en-GB" sz="1400" b="1" dirty="0" err="1">
+                          <a:effectLst/>
+                          <a:latin typeface="Open Sans" panose="020B0606030504020204" pitchFamily="34" charset="0"/>
+                        </a:rPr>
+                        <a:t>geom_line</a:t>
+                      </a:r>
+                      <a:r>
+                        <a:rPr lang="en-GB" sz="1400" b="1" dirty="0">
+                          <a:effectLst/>
+                          <a:latin typeface="Open Sans" panose="020B0606030504020204" pitchFamily="34" charset="0"/>
+                        </a:rPr>
+                        <a:t>()</a:t>
+                      </a:r>
+                      <a:endParaRPr lang="en-GB" sz="1400" dirty="0">
+                        <a:effectLst/>
+                        <a:latin typeface="Open Sans" panose="020B0606030504020204" pitchFamily="34" charset="0"/>
+                      </a:endParaRPr>
+                    </a:p>
+                  </a:txBody>
+                  <a:tcPr marL="28978" marR="28978" marT="40569" marB="40569" anchor="ctr">
+                    <a:lnL>
+                      <a:noFill/>
+                    </a:lnL>
+                    <a:lnR>
+                      <a:noFill/>
+                    </a:lnR>
+                    <a:lnT w="12700" cap="flat" cmpd="sng" algn="ctr">
+                      <a:solidFill>
+                        <a:schemeClr val="tx1"/>
+                      </a:solidFill>
+                      <a:prstDash val="solid"/>
+                      <a:round/>
+                      <a:headEnd type="none" w="med" len="med"/>
+                      <a:tailEnd type="none" w="med" len="med"/>
+                    </a:lnT>
+                    <a:lnB>
+                      <a:noFill/>
+                    </a:lnB>
+                  </a:tcPr>
+                </a:tc>
+                <a:tc>
+                  <a:txBody>
+                    <a:bodyPr/>
+                    <a:lstStyle/>
+                    <a:p>
+                      <a:pPr algn="l" fontAlgn="ctr"/>
+                      <a:r>
+                        <a:rPr lang="en-GB" sz="1400">
+                          <a:effectLst/>
+                          <a:latin typeface="Open Sans" panose="020B0606030504020204" pitchFamily="34" charset="0"/>
+                        </a:rPr>
+                        <a:t>Connect observations based on the order on the x-axis.</a:t>
+                      </a:r>
+                    </a:p>
+                  </a:txBody>
+                  <a:tcPr marL="28978" marR="28978" marT="40569" marB="40569" anchor="ctr">
+                    <a:lnL>
+                      <a:noFill/>
+                    </a:lnL>
+                    <a:lnR>
+                      <a:noFill/>
+                    </a:lnR>
+                    <a:lnT w="12700" cap="flat" cmpd="sng" algn="ctr">
+                      <a:solidFill>
+                        <a:schemeClr val="tx1"/>
+                      </a:solidFill>
+                      <a:prstDash val="solid"/>
+                      <a:round/>
+                      <a:headEnd type="none" w="med" len="med"/>
+                      <a:tailEnd type="none" w="med" len="med"/>
+                    </a:lnT>
+                    <a:lnB>
+                      <a:noFill/>
+                    </a:lnB>
+                  </a:tcPr>
+                </a:tc>
+                <a:extLst>
+                  <a:ext uri="{0D108BD9-81ED-4DB2-BD59-A6C34878D82A}">
+                    <a16:rowId xmlns:a16="http://schemas.microsoft.com/office/drawing/2014/main" val="2573069041"/>
+                  </a:ext>
+                </a:extLst>
+              </a:tr>
+              <a:tr h="285193">
+                <a:tc vMerge="1">
+                  <a:txBody>
+                    <a:bodyPr/>
+                    <a:lstStyle/>
+                    <a:p>
+                      <a:endParaRPr lang="en-GB"/>
+                    </a:p>
+                  </a:txBody>
+                  <a:tcPr/>
+                </a:tc>
+                <a:tc>
+                  <a:txBody>
+                    <a:bodyPr/>
+                    <a:lstStyle/>
+                    <a:p>
+                      <a:pPr algn="l" fontAlgn="ctr"/>
+                      <a:r>
+                        <a:rPr lang="en-GB" sz="1400" b="1" dirty="0" err="1">
+                          <a:effectLst/>
+                          <a:latin typeface="Open Sans" panose="020B0606030504020204" pitchFamily="34" charset="0"/>
+                        </a:rPr>
+                        <a:t>geom_path</a:t>
+                      </a:r>
+                      <a:r>
+                        <a:rPr lang="en-GB" sz="1400" b="1" dirty="0">
+                          <a:effectLst/>
+                          <a:latin typeface="Open Sans" panose="020B0606030504020204" pitchFamily="34" charset="0"/>
+                        </a:rPr>
+                        <a:t>()</a:t>
+                      </a:r>
+                      <a:endParaRPr lang="en-GB" sz="1400" dirty="0">
+                        <a:effectLst/>
+                        <a:latin typeface="Open Sans" panose="020B0606030504020204" pitchFamily="34" charset="0"/>
+                      </a:endParaRPr>
+                    </a:p>
+                  </a:txBody>
+                  <a:tcPr marL="28978" marR="28978" marT="40569" marB="40569" anchor="ctr">
+                    <a:lnL>
+                      <a:noFill/>
+                    </a:lnL>
+                    <a:lnR>
+                      <a:noFill/>
+                    </a:lnR>
+                    <a:lnT>
+                      <a:noFill/>
+                    </a:lnT>
+                    <a:lnB w="12700" cap="flat" cmpd="sng" algn="ctr">
+                      <a:solidFill>
+                        <a:schemeClr val="tx1"/>
+                      </a:solidFill>
+                      <a:prstDash val="solid"/>
+                      <a:round/>
+                      <a:headEnd type="none" w="med" len="med"/>
+                      <a:tailEnd type="none" w="med" len="med"/>
+                    </a:lnB>
+                  </a:tcPr>
+                </a:tc>
+                <a:tc>
+                  <a:txBody>
+                    <a:bodyPr/>
+                    <a:lstStyle/>
+                    <a:p>
+                      <a:pPr algn="l" fontAlgn="ctr"/>
+                      <a:r>
+                        <a:rPr lang="en-GB" sz="1400" dirty="0">
+                          <a:effectLst/>
+                          <a:latin typeface="Open Sans" panose="020B0606030504020204" pitchFamily="34" charset="0"/>
+                        </a:rPr>
+                        <a:t>Connect observations based on the order which they appear in the data.</a:t>
+                      </a:r>
+                    </a:p>
+                  </a:txBody>
+                  <a:tcPr marL="28978" marR="28978" marT="40569" marB="40569" anchor="ctr">
+                    <a:lnL>
+                      <a:noFill/>
+                    </a:lnL>
+                    <a:lnR>
+                      <a:noFill/>
+                    </a:lnR>
+                    <a:lnT>
+                      <a:noFill/>
+                    </a:lnT>
+                    <a:lnB w="12700" cap="flat" cmpd="sng" algn="ctr">
+                      <a:solidFill>
+                        <a:schemeClr val="tx1"/>
+                      </a:solidFill>
+                      <a:prstDash val="solid"/>
+                      <a:round/>
+                      <a:headEnd type="none" w="med" len="med"/>
+                      <a:tailEnd type="none" w="med" len="med"/>
+                    </a:lnB>
+                  </a:tcPr>
+                </a:tc>
+                <a:extLst>
+                  <a:ext uri="{0D108BD9-81ED-4DB2-BD59-A6C34878D82A}">
+                    <a16:rowId xmlns:a16="http://schemas.microsoft.com/office/drawing/2014/main" val="2122322100"/>
+                  </a:ext>
+                </a:extLst>
+              </a:tr>
+              <a:tr h="813630">
+                <a:tc>
+                  <a:txBody>
+                    <a:bodyPr/>
+                    <a:lstStyle/>
+                    <a:p>
+                      <a:pPr algn="l" fontAlgn="ctr"/>
+                      <a:r>
+                        <a:rPr lang="en-GB" sz="1400">
+                          <a:effectLst/>
+                          <a:latin typeface="Open Sans" panose="020B0606030504020204" pitchFamily="34" charset="0"/>
+                        </a:rPr>
+                        <a:t>Other</a:t>
+                      </a:r>
+                    </a:p>
+                  </a:txBody>
+                  <a:tcPr marL="28978" marR="28978" marT="40569" marB="40569" anchor="ctr">
+                    <a:lnL>
+                      <a:noFill/>
+                    </a:lnL>
+                    <a:lnR>
+                      <a:noFill/>
+                    </a:lnR>
+                    <a:lnT>
+                      <a:noFill/>
+                    </a:lnT>
+                    <a:lnB>
+                      <a:noFill/>
+                    </a:lnB>
+                  </a:tcPr>
+                </a:tc>
+                <a:tc>
+                  <a:txBody>
+                    <a:bodyPr/>
+                    <a:lstStyle/>
+                    <a:p>
+                      <a:pPr algn="l" fontAlgn="ctr"/>
+                      <a:r>
+                        <a:rPr lang="en-GB" sz="1400" b="1" dirty="0" err="1">
+                          <a:effectLst/>
+                          <a:latin typeface="Open Sans" panose="020B0606030504020204" pitchFamily="34" charset="0"/>
+                        </a:rPr>
+                        <a:t>geom_smooth</a:t>
+                      </a:r>
+                      <a:r>
+                        <a:rPr lang="en-GB" sz="1400" b="1" dirty="0">
+                          <a:effectLst/>
+                          <a:latin typeface="Open Sans" panose="020B0606030504020204" pitchFamily="34" charset="0"/>
+                        </a:rPr>
+                        <a:t>()</a:t>
+                      </a:r>
+                      <a:endParaRPr lang="en-GB" sz="1400" dirty="0">
+                        <a:effectLst/>
+                        <a:latin typeface="Open Sans" panose="020B0606030504020204" pitchFamily="34" charset="0"/>
+                      </a:endParaRPr>
+                    </a:p>
+                  </a:txBody>
+                  <a:tcPr marL="28978" marR="28978" marT="40569" marB="40569" anchor="ctr">
+                    <a:lnL>
+                      <a:noFill/>
+                    </a:lnL>
+                    <a:lnR>
+                      <a:noFill/>
+                    </a:lnR>
+                    <a:lnT w="12700" cap="flat" cmpd="sng" algn="ctr">
+                      <a:solidFill>
+                        <a:schemeClr val="tx1"/>
+                      </a:solidFill>
+                      <a:prstDash val="solid"/>
+                      <a:round/>
+                      <a:headEnd type="none" w="med" len="med"/>
+                      <a:tailEnd type="none" w="med" len="med"/>
+                    </a:lnT>
+                    <a:lnB>
+                      <a:noFill/>
+                    </a:lnB>
+                  </a:tcPr>
+                </a:tc>
+                <a:tc>
+                  <a:txBody>
+                    <a:bodyPr/>
+                    <a:lstStyle/>
+                    <a:p>
+                      <a:pPr algn="l" fontAlgn="ctr"/>
+                      <a:r>
+                        <a:rPr lang="en-GB" sz="1400" dirty="0">
+                          <a:effectLst/>
+                          <a:latin typeface="Open Sans" panose="020B0606030504020204" pitchFamily="34" charset="0"/>
+                        </a:rPr>
+                        <a:t>Aiding in the visualisation of patterns/smoothed models where overplotting (large numbers of data points overlapping in a single area) is an issue.</a:t>
+                      </a:r>
+                    </a:p>
+                  </a:txBody>
+                  <a:tcPr marL="28978" marR="28978" marT="40569" marB="40569" anchor="ctr">
+                    <a:lnL>
+                      <a:noFill/>
+                    </a:lnL>
+                    <a:lnR>
+                      <a:noFill/>
+                    </a:lnR>
+                    <a:lnT w="12700" cap="flat" cmpd="sng" algn="ctr">
+                      <a:solidFill>
+                        <a:schemeClr val="tx1"/>
+                      </a:solidFill>
+                      <a:prstDash val="solid"/>
+                      <a:round/>
+                      <a:headEnd type="none" w="med" len="med"/>
+                      <a:tailEnd type="none" w="med" len="med"/>
+                    </a:lnT>
+                    <a:lnB>
+                      <a:noFill/>
+                    </a:lnB>
+                  </a:tcPr>
+                </a:tc>
+                <a:extLst>
+                  <a:ext uri="{0D108BD9-81ED-4DB2-BD59-A6C34878D82A}">
+                    <a16:rowId xmlns:a16="http://schemas.microsoft.com/office/drawing/2014/main" val="1081080904"/>
+                  </a:ext>
+                </a:extLst>
+              </a:tr>
+            </a:tbl>
+          </a:graphicData>
+        </a:graphic>
+      </p:graphicFrame>
+    </p:spTree>
+    <p:extLst>
+      <p:ext uri="{BB962C8B-B14F-4D97-AF65-F5344CB8AC3E}">
+        <p14:creationId xmlns:p14="http://schemas.microsoft.com/office/powerpoint/2010/main" val="2359373971"/>
+      </p:ext>
+    </p:extLst>
+  </p:cSld>
+  <p:clrMapOvr>
+    <a:masterClrMapping/>
+  </p:clrMapOvr>
+</p:sld>
+</file>
+
+<file path=ppt/slides/slide13.xml><?xml version="1.0" encoding="utf-8"?>
+<p:sld xmlns:a="http://schemas.openxmlformats.org/drawingml/2006/main" xmlns:r="http://schemas.openxmlformats.org/officeDocument/2006/relationships" xmlns:p="http://schemas.openxmlformats.org/presentationml/2006/main">
+  <p:cSld>
+    <p:spTree>
+      <p:nvGrpSpPr>
+        <p:cNvPr id="1" name=""/>
+        <p:cNvGrpSpPr/>
+        <p:nvPr/>
+      </p:nvGrpSpPr>
+      <p:grpSpPr>
+        <a:xfrm>
+          <a:off x="0" y="0"/>
+          <a:ext cx="0" cy="0"/>
+          <a:chOff x="0" y="0"/>
+          <a:chExt cx="0" cy="0"/>
+        </a:xfrm>
+      </p:grpSpPr>
+      <p:sp>
+        <p:nvSpPr>
+          <p:cNvPr id="2" name="Title 1">
+            <a:extLst>
+              <a:ext uri="{FF2B5EF4-FFF2-40B4-BE49-F238E27FC236}">
+                <a16:creationId xmlns:a16="http://schemas.microsoft.com/office/drawing/2014/main" id="{DC6C9B58-EE8B-43B7-9EA7-4FB5C0C89F6C}"/>
+              </a:ext>
+            </a:extLst>
+          </p:cNvPr>
+          <p:cNvSpPr>
+            <a:spLocks noGrp="1"/>
+          </p:cNvSpPr>
+          <p:nvPr>
+            <p:ph type="title"/>
+          </p:nvPr>
+        </p:nvSpPr>
+        <p:spPr/>
+        <p:txBody>
+          <a:bodyPr/>
+          <a:lstStyle/>
+          <a:p>
+            <a:r>
+              <a:rPr lang="en-GB" dirty="0"/>
+              <a:t>Geometry layers</a:t>
+            </a:r>
+          </a:p>
+        </p:txBody>
+      </p:sp>
+      <p:sp>
+        <p:nvSpPr>
+          <p:cNvPr id="3" name="Content Placeholder 2">
+            <a:extLst>
+              <a:ext uri="{FF2B5EF4-FFF2-40B4-BE49-F238E27FC236}">
+                <a16:creationId xmlns:a16="http://schemas.microsoft.com/office/drawing/2014/main" id="{CF0EAE4F-AEB3-4AC6-B3CF-78C925F99AFB}"/>
+              </a:ext>
+            </a:extLst>
+          </p:cNvPr>
+          <p:cNvSpPr>
+            <a:spLocks noGrp="1"/>
+          </p:cNvSpPr>
+          <p:nvPr>
+            <p:ph idx="1"/>
+          </p:nvPr>
+        </p:nvSpPr>
+        <p:spPr/>
+        <p:txBody>
+          <a:bodyPr/>
+          <a:lstStyle/>
+          <a:p>
+            <a:r>
+              <a:rPr lang="en-GB" dirty="0"/>
+              <a:t>Can add multiple </a:t>
+            </a:r>
+            <a:r>
+              <a:rPr lang="en-GB" dirty="0" err="1"/>
+              <a:t>geom</a:t>
+            </a:r>
+            <a:r>
+              <a:rPr lang="en-GB" dirty="0"/>
+              <a:t> layers to one plot: </a:t>
+            </a:r>
+          </a:p>
+        </p:txBody>
+      </p:sp>
+      <p:sp>
+        <p:nvSpPr>
+          <p:cNvPr id="5" name="Rectangle 3">
+            <a:extLst>
+              <a:ext uri="{FF2B5EF4-FFF2-40B4-BE49-F238E27FC236}">
+                <a16:creationId xmlns:a16="http://schemas.microsoft.com/office/drawing/2014/main" id="{8E0B1421-B71B-4A45-8B58-546B01F768DE}"/>
+              </a:ext>
+            </a:extLst>
+          </p:cNvPr>
+          <p:cNvSpPr>
+            <a:spLocks noChangeArrowheads="1"/>
+          </p:cNvSpPr>
+          <p:nvPr/>
+        </p:nvSpPr>
+        <p:spPr bwMode="auto">
+          <a:xfrm>
+            <a:off x="511278" y="2633596"/>
+            <a:ext cx="5132438" cy="1295206"/>
+          </a:xfrm>
+          <a:prstGeom prst="rect">
+            <a:avLst/>
+          </a:prstGeom>
+          <a:solidFill>
+            <a:srgbClr val="F5F5F5"/>
+          </a:solidFill>
+          <a:ln>
+            <a:noFill/>
+          </a:ln>
+          <a:effectLst/>
+          <a:extLst>
+            <a:ext uri="{91240B29-F687-4F45-9708-019B960494DF}">
+              <a14:hiddenLine xmlns:a14="http://schemas.microsoft.com/office/drawing/2010/main" w="9525">
+                <a:solidFill>
+                  <a:schemeClr val="tx1"/>
+                </a:solidFill>
+                <a:miter lim="800000"/>
+                <a:headEnd/>
+                <a:tailEnd/>
+              </a14:hiddenLine>
+            </a:ext>
+            <a:ext uri="{AF507438-7753-43E0-B8FC-AC1667EBCBE1}">
+              <a14:hiddenEffects xmlns:a14="http://schemas.microsoft.com/office/drawing/2010/main">
+                <a:effectLst>
+                  <a:outerShdw dist="35921" dir="2700000" algn="ctr" rotWithShape="0">
+                    <a:schemeClr val="bg2"/>
+                  </a:outerShdw>
+                </a:effectLst>
+              </a14:hiddenEffects>
+            </a:ext>
+          </a:extLst>
+        </p:spPr>
+        <p:txBody>
+          <a:bodyPr vert="horz" wrap="square" lIns="0" tIns="0" rIns="0" bIns="63480" numCol="1" anchor="ctr" anchorCtr="0" compatLnSpc="1">
+            <a:prstTxWarp prst="textNoShape">
+              <a:avLst/>
+            </a:prstTxWarp>
+            <a:spAutoFit/>
+          </a:bodyPr>
+          <a:lstStyle/>
+          <a:p>
+            <a:pPr marL="0" marR="0" lvl="0" indent="0" algn="l" defTabSz="914400" rtl="0" eaLnBrk="0" fontAlgn="base" latinLnBrk="0" hangingPunct="0">
+              <a:lnSpc>
+                <a:spcPct val="100000"/>
+              </a:lnSpc>
+              <a:spcBef>
+                <a:spcPct val="0"/>
+              </a:spcBef>
+              <a:spcAft>
+                <a:spcPct val="0"/>
+              </a:spcAft>
+              <a:buClrTx/>
+              <a:buSzTx/>
+              <a:buFontTx/>
+              <a:buNone/>
+              <a:tabLst/>
+            </a:pPr>
+            <a:r>
+              <a:rPr kumimoji="0" lang="en-US" altLang="en-US" sz="1600" b="0" i="0" u="none" strike="noStrike" cap="none" normalizeH="0" baseline="0" dirty="0" err="1">
+                <a:ln>
+                  <a:noFill/>
+                </a:ln>
+                <a:solidFill>
+                  <a:srgbClr val="333333"/>
+                </a:solidFill>
+                <a:effectLst/>
+                <a:latin typeface="Courier New" panose="02070309020205020404" pitchFamily="49" charset="0"/>
+                <a:cs typeface="Courier New" panose="02070309020205020404" pitchFamily="49" charset="0"/>
+              </a:rPr>
+              <a:t>ggplot</a:t>
+            </a:r>
+            <a:r>
+              <a:rPr kumimoji="0" lang="en-US" altLang="en-US" sz="1600" b="0" i="0" u="none" strike="noStrike" cap="none" normalizeH="0" baseline="0" dirty="0">
+                <a:ln>
+                  <a:noFill/>
+                </a:ln>
+                <a:solidFill>
+                  <a:srgbClr val="333333"/>
+                </a:solidFill>
+                <a:effectLst/>
+                <a:latin typeface="Courier New" panose="02070309020205020404" pitchFamily="49" charset="0"/>
+                <a:cs typeface="Courier New" panose="02070309020205020404" pitchFamily="49" charset="0"/>
+              </a:rPr>
+              <a:t>(data = </a:t>
+            </a:r>
+            <a:r>
+              <a:rPr kumimoji="0" lang="en-US" altLang="en-US" sz="1600" b="0" i="0" u="none" strike="noStrike" cap="none" normalizeH="0" baseline="0" dirty="0" err="1">
+                <a:ln>
+                  <a:noFill/>
+                </a:ln>
+                <a:solidFill>
+                  <a:srgbClr val="333333"/>
+                </a:solidFill>
+                <a:effectLst/>
+                <a:latin typeface="Courier New" panose="02070309020205020404" pitchFamily="49" charset="0"/>
+                <a:cs typeface="Courier New" panose="02070309020205020404" pitchFamily="49" charset="0"/>
+              </a:rPr>
+              <a:t>car_data</a:t>
+            </a:r>
+            <a:r>
+              <a:rPr kumimoji="0" lang="en-US" altLang="en-US" sz="1600" b="0" i="0" u="none" strike="noStrike" cap="none" normalizeH="0" baseline="0" dirty="0">
+                <a:ln>
+                  <a:noFill/>
+                </a:ln>
+                <a:solidFill>
+                  <a:srgbClr val="333333"/>
+                </a:solidFill>
+                <a:effectLst/>
+                <a:latin typeface="Courier New" panose="02070309020205020404" pitchFamily="49" charset="0"/>
+                <a:cs typeface="Courier New" panose="02070309020205020404" pitchFamily="49" charset="0"/>
+              </a:rPr>
+              <a:t>, mapping = </a:t>
+            </a:r>
+          </a:p>
+          <a:p>
+            <a:pPr marL="0" marR="0" lvl="0" indent="0" algn="l" defTabSz="914400" rtl="0" eaLnBrk="0" fontAlgn="base" latinLnBrk="0" hangingPunct="0">
+              <a:lnSpc>
+                <a:spcPct val="100000"/>
+              </a:lnSpc>
+              <a:spcBef>
+                <a:spcPct val="0"/>
+              </a:spcBef>
+              <a:spcAft>
+                <a:spcPct val="0"/>
+              </a:spcAft>
+              <a:buClrTx/>
+              <a:buSzTx/>
+              <a:buFontTx/>
+              <a:buNone/>
+              <a:tabLst/>
+            </a:pPr>
+            <a:r>
+              <a:rPr kumimoji="0" lang="en-US" altLang="en-US" sz="1600" b="0" i="0" u="none" strike="noStrike" cap="none" normalizeH="0" baseline="0" dirty="0">
+                <a:ln>
+                  <a:noFill/>
+                </a:ln>
+                <a:solidFill>
+                  <a:srgbClr val="333333"/>
+                </a:solidFill>
+                <a:effectLst/>
+                <a:latin typeface="Courier New" panose="02070309020205020404" pitchFamily="49" charset="0"/>
+                <a:cs typeface="Courier New" panose="02070309020205020404" pitchFamily="49" charset="0"/>
+              </a:rPr>
+              <a:t>	</a:t>
+            </a:r>
+            <a:r>
+              <a:rPr kumimoji="0" lang="en-US" altLang="en-US" sz="1600" b="0" i="0" u="none" strike="noStrike" cap="none" normalizeH="0" baseline="0" dirty="0" err="1">
+                <a:ln>
+                  <a:noFill/>
+                </a:ln>
+                <a:solidFill>
+                  <a:srgbClr val="333333"/>
+                </a:solidFill>
+                <a:effectLst/>
+                <a:latin typeface="Courier New" panose="02070309020205020404" pitchFamily="49" charset="0"/>
+                <a:cs typeface="Courier New" panose="02070309020205020404" pitchFamily="49" charset="0"/>
+              </a:rPr>
+              <a:t>aes</a:t>
+            </a:r>
+            <a:r>
+              <a:rPr kumimoji="0" lang="en-US" altLang="en-US" sz="1600" b="0" i="0" u="none" strike="noStrike" cap="none" normalizeH="0" baseline="0" dirty="0">
+                <a:ln>
+                  <a:noFill/>
+                </a:ln>
+                <a:solidFill>
+                  <a:srgbClr val="333333"/>
+                </a:solidFill>
+                <a:effectLst/>
+                <a:latin typeface="Courier New" panose="02070309020205020404" pitchFamily="49" charset="0"/>
+                <a:cs typeface="Courier New" panose="02070309020205020404" pitchFamily="49" charset="0"/>
+              </a:rPr>
+              <a:t>(x = </a:t>
+            </a:r>
+            <a:r>
+              <a:rPr kumimoji="0" lang="en-US" altLang="en-US" sz="1600" b="0" i="0" u="none" strike="noStrike" cap="none" normalizeH="0" baseline="0" dirty="0" err="1">
+                <a:ln>
+                  <a:noFill/>
+                </a:ln>
+                <a:solidFill>
+                  <a:srgbClr val="333333"/>
+                </a:solidFill>
+                <a:effectLst/>
+                <a:latin typeface="Courier New" panose="02070309020205020404" pitchFamily="49" charset="0"/>
+                <a:cs typeface="Courier New" panose="02070309020205020404" pitchFamily="49" charset="0"/>
+              </a:rPr>
+              <a:t>displ</a:t>
+            </a:r>
+            <a:r>
+              <a:rPr kumimoji="0" lang="en-US" altLang="en-US" sz="1600" b="0" i="0" u="none" strike="noStrike" cap="none" normalizeH="0" baseline="0" dirty="0">
+                <a:ln>
+                  <a:noFill/>
+                </a:ln>
+                <a:solidFill>
+                  <a:srgbClr val="333333"/>
+                </a:solidFill>
+                <a:effectLst/>
+                <a:latin typeface="Courier New" panose="02070309020205020404" pitchFamily="49" charset="0"/>
+                <a:cs typeface="Courier New" panose="02070309020205020404" pitchFamily="49" charset="0"/>
+              </a:rPr>
+              <a:t>, y = </a:t>
+            </a:r>
+            <a:r>
+              <a:rPr kumimoji="0" lang="en-US" altLang="en-US" sz="1600" b="0" i="0" u="none" strike="noStrike" cap="none" normalizeH="0" baseline="0" dirty="0" err="1">
+                <a:ln>
+                  <a:noFill/>
+                </a:ln>
+                <a:solidFill>
+                  <a:srgbClr val="333333"/>
+                </a:solidFill>
+                <a:effectLst/>
+                <a:latin typeface="Courier New" panose="02070309020205020404" pitchFamily="49" charset="0"/>
+                <a:cs typeface="Courier New" panose="02070309020205020404" pitchFamily="49" charset="0"/>
+              </a:rPr>
+              <a:t>hwy</a:t>
+            </a:r>
+            <a:r>
+              <a:rPr kumimoji="0" lang="en-US" altLang="en-US" sz="1600" b="0" i="0" u="none" strike="noStrike" cap="none" normalizeH="0" baseline="0" dirty="0">
+                <a:ln>
+                  <a:noFill/>
+                </a:ln>
+                <a:solidFill>
+                  <a:srgbClr val="333333"/>
+                </a:solidFill>
+                <a:effectLst/>
+                <a:latin typeface="Courier New" panose="02070309020205020404" pitchFamily="49" charset="0"/>
+                <a:cs typeface="Courier New" panose="02070309020205020404" pitchFamily="49" charset="0"/>
+              </a:rPr>
+              <a:t>)) + </a:t>
+            </a:r>
+          </a:p>
+          <a:p>
+            <a:pPr marL="0" marR="0" lvl="0" indent="0" algn="l" defTabSz="914400" rtl="0" eaLnBrk="0" fontAlgn="base" latinLnBrk="0" hangingPunct="0">
+              <a:lnSpc>
+                <a:spcPct val="100000"/>
+              </a:lnSpc>
+              <a:spcBef>
+                <a:spcPct val="0"/>
+              </a:spcBef>
+              <a:spcAft>
+                <a:spcPct val="0"/>
+              </a:spcAft>
+              <a:buClrTx/>
+              <a:buSzTx/>
+              <a:buFontTx/>
+              <a:buNone/>
+              <a:tabLst/>
+            </a:pPr>
+            <a:r>
+              <a:rPr kumimoji="0" lang="en-US" altLang="en-US" sz="1600" b="0" i="0" u="none" strike="noStrike" cap="none" normalizeH="0" baseline="0" dirty="0">
+                <a:ln>
+                  <a:noFill/>
+                </a:ln>
+                <a:solidFill>
+                  <a:srgbClr val="333333"/>
+                </a:solidFill>
+                <a:effectLst/>
+                <a:latin typeface="Courier New" panose="02070309020205020404" pitchFamily="49" charset="0"/>
+                <a:cs typeface="Courier New" panose="02070309020205020404" pitchFamily="49" charset="0"/>
+              </a:rPr>
+              <a:t>  </a:t>
+            </a:r>
+            <a:r>
+              <a:rPr kumimoji="0" lang="en-US" altLang="en-US" sz="1600" b="0" i="0" u="none" strike="noStrike" cap="none" normalizeH="0" baseline="0" dirty="0" err="1">
+                <a:ln>
+                  <a:noFill/>
+                </a:ln>
+                <a:solidFill>
+                  <a:srgbClr val="333333"/>
+                </a:solidFill>
+                <a:effectLst/>
+                <a:latin typeface="Courier New" panose="02070309020205020404" pitchFamily="49" charset="0"/>
+                <a:cs typeface="Courier New" panose="02070309020205020404" pitchFamily="49" charset="0"/>
+              </a:rPr>
+              <a:t>geom_point</a:t>
+            </a:r>
+            <a:r>
+              <a:rPr kumimoji="0" lang="en-US" altLang="en-US" sz="1600" b="0" i="0" u="none" strike="noStrike" cap="none" normalizeH="0" baseline="0" dirty="0">
+                <a:ln>
+                  <a:noFill/>
+                </a:ln>
+                <a:solidFill>
+                  <a:srgbClr val="333333"/>
+                </a:solidFill>
+                <a:effectLst/>
+                <a:latin typeface="Courier New" panose="02070309020205020404" pitchFamily="49" charset="0"/>
+                <a:cs typeface="Courier New" panose="02070309020205020404" pitchFamily="49" charset="0"/>
+              </a:rPr>
+              <a:t>(position = </a:t>
+            </a:r>
+            <a:r>
+              <a:rPr kumimoji="0" lang="en-US" altLang="en-US" sz="1600" b="0" i="0" u="none" strike="noStrike" cap="none" normalizeH="0" baseline="0" dirty="0" err="1">
+                <a:ln>
+                  <a:noFill/>
+                </a:ln>
+                <a:solidFill>
+                  <a:srgbClr val="333333"/>
+                </a:solidFill>
+                <a:effectLst/>
+                <a:latin typeface="Courier New" panose="02070309020205020404" pitchFamily="49" charset="0"/>
+                <a:cs typeface="Courier New" panose="02070309020205020404" pitchFamily="49" charset="0"/>
+              </a:rPr>
+              <a:t>position_jitter</a:t>
+            </a:r>
+            <a:r>
+              <a:rPr kumimoji="0" lang="en-US" altLang="en-US" sz="1600" b="0" i="0" u="none" strike="noStrike" cap="none" normalizeH="0" baseline="0" dirty="0">
+                <a:ln>
+                  <a:noFill/>
+                </a:ln>
+                <a:solidFill>
+                  <a:srgbClr val="333333"/>
+                </a:solidFill>
+                <a:effectLst/>
+                <a:latin typeface="Courier New" panose="02070309020205020404" pitchFamily="49" charset="0"/>
+                <a:cs typeface="Courier New" panose="02070309020205020404" pitchFamily="49" charset="0"/>
+              </a:rPr>
+              <a:t>(),alpha = 0.5) + </a:t>
+            </a:r>
+          </a:p>
+          <a:p>
+            <a:pPr marL="0" marR="0" lvl="0" indent="0" algn="l" defTabSz="914400" rtl="0" eaLnBrk="0" fontAlgn="base" latinLnBrk="0" hangingPunct="0">
+              <a:lnSpc>
+                <a:spcPct val="100000"/>
+              </a:lnSpc>
+              <a:spcBef>
+                <a:spcPct val="0"/>
+              </a:spcBef>
+              <a:spcAft>
+                <a:spcPct val="0"/>
+              </a:spcAft>
+              <a:buClrTx/>
+              <a:buSzTx/>
+              <a:buFontTx/>
+              <a:buNone/>
+              <a:tabLst/>
+            </a:pPr>
+            <a:r>
+              <a:rPr kumimoji="0" lang="en-US" altLang="en-US" sz="1600" b="0" i="0" u="none" strike="noStrike" cap="none" normalizeH="0" baseline="0" dirty="0" err="1">
+                <a:ln>
+                  <a:noFill/>
+                </a:ln>
+                <a:solidFill>
+                  <a:srgbClr val="333333"/>
+                </a:solidFill>
+                <a:effectLst/>
+                <a:latin typeface="Courier New" panose="02070309020205020404" pitchFamily="49" charset="0"/>
+                <a:cs typeface="Courier New" panose="02070309020205020404" pitchFamily="49" charset="0"/>
+              </a:rPr>
+              <a:t>geom_smooth</a:t>
+            </a:r>
+            <a:r>
+              <a:rPr kumimoji="0" lang="en-US" altLang="en-US" sz="1600" b="0" i="0" u="none" strike="noStrike" cap="none" normalizeH="0" baseline="0" dirty="0">
+                <a:ln>
+                  <a:noFill/>
+                </a:ln>
+                <a:solidFill>
+                  <a:srgbClr val="333333"/>
+                </a:solidFill>
+                <a:effectLst/>
+                <a:latin typeface="Courier New" panose="02070309020205020404" pitchFamily="49" charset="0"/>
+                <a:cs typeface="Courier New" panose="02070309020205020404" pitchFamily="49" charset="0"/>
+              </a:rPr>
+              <a:t>(</a:t>
+            </a:r>
+            <a:r>
+              <a:rPr kumimoji="0" lang="en-US" altLang="en-US" sz="1600" b="0" i="0" u="none" strike="noStrike" cap="none" normalizeH="0" baseline="0" dirty="0" err="1">
+                <a:ln>
+                  <a:noFill/>
+                </a:ln>
+                <a:solidFill>
+                  <a:srgbClr val="333333"/>
+                </a:solidFill>
+                <a:effectLst/>
+                <a:latin typeface="Courier New" panose="02070309020205020404" pitchFamily="49" charset="0"/>
+                <a:cs typeface="Courier New" panose="02070309020205020404" pitchFamily="49" charset="0"/>
+              </a:rPr>
+              <a:t>colour</a:t>
+            </a:r>
+            <a:r>
+              <a:rPr kumimoji="0" lang="en-US" altLang="en-US" sz="1600" b="0" i="0" u="none" strike="noStrike" cap="none" normalizeH="0" baseline="0" dirty="0">
+                <a:ln>
+                  <a:noFill/>
+                </a:ln>
+                <a:solidFill>
+                  <a:srgbClr val="333333"/>
+                </a:solidFill>
+                <a:effectLst/>
+                <a:latin typeface="Courier New" panose="02070309020205020404" pitchFamily="49" charset="0"/>
+                <a:cs typeface="Courier New" panose="02070309020205020404" pitchFamily="49" charset="0"/>
+              </a:rPr>
+              <a:t> = "#76B843")</a:t>
+            </a:r>
+            <a:r>
+              <a:rPr kumimoji="0" lang="en-US" altLang="en-US" sz="1200" b="0" i="0" u="none" strike="noStrike" cap="none" normalizeH="0" baseline="0" dirty="0">
+                <a:ln>
+                  <a:noFill/>
+                </a:ln>
+                <a:solidFill>
+                  <a:schemeClr val="tx1"/>
+                </a:solidFill>
+                <a:effectLst/>
+              </a:rPr>
+              <a:t> </a:t>
+            </a:r>
+            <a:endParaRPr kumimoji="0" lang="en-US" altLang="en-US" sz="3600" b="0" i="0" u="none" strike="noStrike" cap="none" normalizeH="0" baseline="0" dirty="0">
+              <a:ln>
+                <a:noFill/>
+              </a:ln>
+              <a:solidFill>
+                <a:schemeClr val="tx1"/>
+              </a:solidFill>
+              <a:effectLst/>
+              <a:latin typeface="Arial" panose="020B0604020202020204" pitchFamily="34" charset="0"/>
+            </a:endParaRPr>
+          </a:p>
+        </p:txBody>
+      </p:sp>
+      <p:pic>
+        <p:nvPicPr>
+          <p:cNvPr id="10245" name="Picture 5">
+            <a:extLst>
+              <a:ext uri="{FF2B5EF4-FFF2-40B4-BE49-F238E27FC236}">
+                <a16:creationId xmlns:a16="http://schemas.microsoft.com/office/drawing/2014/main" id="{EED85853-B63A-4920-94F3-A6D78E0D9570}"/>
+              </a:ext>
+            </a:extLst>
+          </p:cNvPr>
+          <p:cNvPicPr>
+            <a:picLocks noChangeAspect="1" noChangeArrowheads="1"/>
+          </p:cNvPicPr>
+          <p:nvPr/>
+        </p:nvPicPr>
+        <p:blipFill>
+          <a:blip r:embed="rId2">
+            <a:extLst>
+              <a:ext uri="{28A0092B-C50C-407E-A947-70E740481C1C}">
+                <a14:useLocalDpi xmlns:a14="http://schemas.microsoft.com/office/drawing/2010/main" val="0"/>
+              </a:ext>
+            </a:extLst>
+          </a:blip>
+          <a:srcRect/>
+          <a:stretch>
+            <a:fillRect/>
+          </a:stretch>
+        </p:blipFill>
+        <p:spPr bwMode="auto">
+          <a:xfrm>
+            <a:off x="5970638" y="2317955"/>
+            <a:ext cx="5943600" cy="3657600"/>
+          </a:xfrm>
+          <a:prstGeom prst="rect">
+            <a:avLst/>
+          </a:prstGeom>
+          <a:noFill/>
+          <a:extLst>
+            <a:ext uri="{909E8E84-426E-40DD-AFC4-6F175D3DCCD1}">
+              <a14:hiddenFill xmlns:a14="http://schemas.microsoft.com/office/drawing/2010/main">
+                <a:solidFill>
+                  <a:srgbClr val="FFFFFF"/>
+                </a:solidFill>
+              </a14:hiddenFill>
+            </a:ext>
+          </a:extLst>
+        </p:spPr>
+      </p:pic>
+    </p:spTree>
+    <p:extLst>
+      <p:ext uri="{BB962C8B-B14F-4D97-AF65-F5344CB8AC3E}">
+        <p14:creationId xmlns:p14="http://schemas.microsoft.com/office/powerpoint/2010/main" val="4275950020"/>
+      </p:ext>
+    </p:extLst>
+  </p:cSld>
+  <p:clrMapOvr>
+    <a:masterClrMapping/>
+  </p:clrMapOvr>
+</p:sld>
+</file>
+
+<file path=ppt/slides/slide14.xml><?xml version="1.0" encoding="utf-8"?>
+<p:sld xmlns:a="http://schemas.openxmlformats.org/drawingml/2006/main" xmlns:r="http://schemas.openxmlformats.org/officeDocument/2006/relationships" xmlns:p="http://schemas.openxmlformats.org/presentationml/2006/main">
+  <p:cSld>
+    <p:spTree>
+      <p:nvGrpSpPr>
+        <p:cNvPr id="1" name=""/>
+        <p:cNvGrpSpPr/>
+        <p:nvPr/>
+      </p:nvGrpSpPr>
+      <p:grpSpPr>
+        <a:xfrm>
+          <a:off x="0" y="0"/>
+          <a:ext cx="0" cy="0"/>
+          <a:chOff x="0" y="0"/>
+          <a:chExt cx="0" cy="0"/>
+        </a:xfrm>
+      </p:grpSpPr>
+      <p:sp>
+        <p:nvSpPr>
+          <p:cNvPr id="2" name="Title 1">
+            <a:extLst>
+              <a:ext uri="{FF2B5EF4-FFF2-40B4-BE49-F238E27FC236}">
                 <a16:creationId xmlns:a16="http://schemas.microsoft.com/office/drawing/2014/main" id="{F02F607B-42A1-4EF4-BA4D-D3E5FB22035A}"/>
               </a:ext>
             </a:extLst>
@@ -3079,7 +4921,7 @@
 </p:sld>
 </file>
 
-<file path=ppt/slides/slide12.xml><?xml version="1.0" encoding="utf-8"?>
+<file path=ppt/slides/slide15.xml><?xml version="1.0" encoding="utf-8"?>
 <p:sld xmlns:a="http://schemas.openxmlformats.org/drawingml/2006/main" xmlns:r="http://schemas.openxmlformats.org/officeDocument/2006/relationships" xmlns:p="http://schemas.openxmlformats.org/presentationml/2006/main">
   <p:cSld>
     <p:spTree>
@@ -3987,7 +5829,7 @@
 </p:sld>
 </file>
 
-<file path=ppt/slides/slide13.xml><?xml version="1.0" encoding="utf-8"?>
+<file path=ppt/slides/slide16.xml><?xml version="1.0" encoding="utf-8"?>
 <p:sld xmlns:a="http://schemas.openxmlformats.org/drawingml/2006/main" xmlns:r="http://schemas.openxmlformats.org/officeDocument/2006/relationships" xmlns:p="http://schemas.openxmlformats.org/presentationml/2006/main">
   <p:cSld>
     <p:spTree>
@@ -4597,7 +6439,7 @@
 </p:sld>
 </file>
 
-<file path=ppt/slides/slide14.xml><?xml version="1.0" encoding="utf-8"?>
+<file path=ppt/slides/slide17.xml><?xml version="1.0" encoding="utf-8"?>
 <p:sld xmlns:a="http://schemas.openxmlformats.org/drawingml/2006/main" xmlns:r="http://schemas.openxmlformats.org/officeDocument/2006/relationships" xmlns:p="http://schemas.openxmlformats.org/presentationml/2006/main">
   <p:cSld>
     <p:spTree>
@@ -4747,7 +6589,7 @@
 </p:sld>
 </file>
 
-<file path=ppt/slides/slide15.xml><?xml version="1.0" encoding="utf-8"?>
+<file path=ppt/slides/slide18.xml><?xml version="1.0" encoding="utf-8"?>
 <p:sld xmlns:a="http://schemas.openxmlformats.org/drawingml/2006/main" xmlns:r="http://schemas.openxmlformats.org/officeDocument/2006/relationships" xmlns:p="http://schemas.openxmlformats.org/presentationml/2006/main">
   <p:cSld>
     <p:spTree>
@@ -5542,7 +7384,7 @@
 </p:sld>
 </file>
 
-<file path=ppt/slides/slide16.xml><?xml version="1.0" encoding="utf-8"?>
+<file path=ppt/slides/slide19.xml><?xml version="1.0" encoding="utf-8"?>
 <p:sld xmlns:a="http://schemas.openxmlformats.org/drawingml/2006/main" xmlns:r="http://schemas.openxmlformats.org/officeDocument/2006/relationships" xmlns:p="http://schemas.openxmlformats.org/presentationml/2006/main">
   <p:cSld>
     <p:spTree>
@@ -5619,404 +7461,6 @@
     <p:extLst>
       <p:ext uri="{BB962C8B-B14F-4D97-AF65-F5344CB8AC3E}">
         <p14:creationId xmlns:p14="http://schemas.microsoft.com/office/powerpoint/2010/main" val="1045435317"/>
-      </p:ext>
-    </p:extLst>
-  </p:cSld>
-  <p:clrMapOvr>
-    <a:masterClrMapping/>
-  </p:clrMapOvr>
-</p:sld>
-</file>
-
-<file path=ppt/slides/slide17.xml><?xml version="1.0" encoding="utf-8"?>
-<p:sld xmlns:a="http://schemas.openxmlformats.org/drawingml/2006/main" xmlns:r="http://schemas.openxmlformats.org/officeDocument/2006/relationships" xmlns:p="http://schemas.openxmlformats.org/presentationml/2006/main">
-  <p:cSld>
-    <p:spTree>
-      <p:nvGrpSpPr>
-        <p:cNvPr id="1" name=""/>
-        <p:cNvGrpSpPr/>
-        <p:nvPr/>
-      </p:nvGrpSpPr>
-      <p:grpSpPr>
-        <a:xfrm>
-          <a:off x="0" y="0"/>
-          <a:ext cx="0" cy="0"/>
-          <a:chOff x="0" y="0"/>
-          <a:chExt cx="0" cy="0"/>
-        </a:xfrm>
-      </p:grpSpPr>
-      <p:sp>
-        <p:nvSpPr>
-          <p:cNvPr id="2" name="Title 1">
-            <a:extLst>
-              <a:ext uri="{FF2B5EF4-FFF2-40B4-BE49-F238E27FC236}">
-                <a16:creationId xmlns:a16="http://schemas.microsoft.com/office/drawing/2014/main" id="{FA02A8F9-B3BA-44FB-8EFA-4C5746D380BA}"/>
-              </a:ext>
-            </a:extLst>
-          </p:cNvPr>
-          <p:cNvSpPr>
-            <a:spLocks noGrp="1"/>
-          </p:cNvSpPr>
-          <p:nvPr>
-            <p:ph type="title"/>
-          </p:nvPr>
-        </p:nvSpPr>
-        <p:spPr/>
-        <p:txBody>
-          <a:bodyPr/>
-          <a:lstStyle/>
-          <a:p>
-            <a:r>
-              <a:rPr lang="en-GB" dirty="0"/>
-              <a:t>Scales and axes</a:t>
-            </a:r>
-          </a:p>
-        </p:txBody>
-      </p:sp>
-      <p:sp>
-        <p:nvSpPr>
-          <p:cNvPr id="3" name="Content Placeholder 2">
-            <a:extLst>
-              <a:ext uri="{FF2B5EF4-FFF2-40B4-BE49-F238E27FC236}">
-                <a16:creationId xmlns:a16="http://schemas.microsoft.com/office/drawing/2014/main" id="{392C7B0E-C3AC-474A-AFE5-18A8C2D91E35}"/>
-              </a:ext>
-            </a:extLst>
-          </p:cNvPr>
-          <p:cNvSpPr>
-            <a:spLocks noGrp="1"/>
-          </p:cNvSpPr>
-          <p:nvPr>
-            <p:ph idx="1"/>
-          </p:nvPr>
-        </p:nvSpPr>
-        <p:spPr/>
-        <p:txBody>
-          <a:bodyPr/>
-          <a:lstStyle/>
-          <a:p>
-            <a:r>
-              <a:rPr lang="en-GB" dirty="0"/>
-              <a:t>Scales affect how the aesthetics are set up and control visual properties of the data values.</a:t>
-            </a:r>
-          </a:p>
-          <a:p>
-            <a:r>
-              <a:rPr lang="en-GB" dirty="0"/>
-              <a:t>Functions of the type scale_&lt;name&gt;_&lt;</a:t>
-            </a:r>
-            <a:r>
-              <a:rPr lang="en-GB" dirty="0" err="1"/>
-              <a:t>data_type</a:t>
-            </a:r>
-            <a:r>
-              <a:rPr lang="en-GB" dirty="0"/>
-              <a:t>&gt;</a:t>
-            </a:r>
-          </a:p>
-          <a:p>
-            <a:pPr lvl="1"/>
-            <a:r>
-              <a:rPr lang="en-GB" dirty="0"/>
-              <a:t>E.g. </a:t>
-            </a:r>
-            <a:r>
-              <a:rPr lang="en-GB" dirty="0" err="1">
-                <a:highlight>
-                  <a:srgbClr val="C0C0C0"/>
-                </a:highlight>
-                <a:latin typeface="Consolas" panose="020B0609020204030204" pitchFamily="49" charset="0"/>
-              </a:rPr>
-              <a:t>scale_x_contiuous</a:t>
-            </a:r>
-            <a:r>
-              <a:rPr lang="en-GB" dirty="0">
-                <a:highlight>
-                  <a:srgbClr val="C0C0C0"/>
-                </a:highlight>
-                <a:latin typeface="Consolas" panose="020B0609020204030204" pitchFamily="49" charset="0"/>
-              </a:rPr>
-              <a:t>()</a:t>
-            </a:r>
-            <a:r>
-              <a:rPr lang="en-GB" dirty="0"/>
-              <a:t>,  </a:t>
-            </a:r>
-            <a:r>
-              <a:rPr lang="en-GB" dirty="0" err="1">
-                <a:highlight>
-                  <a:srgbClr val="C0C0C0"/>
-                </a:highlight>
-                <a:latin typeface="Consolas" panose="020B0609020204030204" pitchFamily="49" charset="0"/>
-              </a:rPr>
-              <a:t>scale_y_discrete</a:t>
-            </a:r>
-            <a:r>
-              <a:rPr lang="en-GB" dirty="0">
-                <a:highlight>
-                  <a:srgbClr val="C0C0C0"/>
-                </a:highlight>
-                <a:latin typeface="Consolas" panose="020B0609020204030204" pitchFamily="49" charset="0"/>
-              </a:rPr>
-              <a:t>(), </a:t>
-            </a:r>
-            <a:r>
-              <a:rPr lang="en-GB" dirty="0" err="1">
-                <a:highlight>
-                  <a:srgbClr val="C0C0C0"/>
-                </a:highlight>
-                <a:latin typeface="Consolas" panose="020B0609020204030204" pitchFamily="49" charset="0"/>
-              </a:rPr>
-              <a:t>scale_colour_continuous</a:t>
-            </a:r>
-            <a:r>
-              <a:rPr lang="en-GB" dirty="0">
-                <a:highlight>
-                  <a:srgbClr val="C0C0C0"/>
-                </a:highlight>
-                <a:latin typeface="Consolas" panose="020B0609020204030204" pitchFamily="49" charset="0"/>
-              </a:rPr>
-              <a:t>()</a:t>
-            </a:r>
-          </a:p>
-          <a:p>
-            <a:r>
-              <a:rPr lang="en-GB" dirty="0"/>
-              <a:t>Within these you can define things such as: limits of the axes, labels and axis titles, colour palette, </a:t>
-            </a:r>
-          </a:p>
-          <a:p>
-            <a:endParaRPr lang="en-GB" dirty="0"/>
-          </a:p>
-          <a:p>
-            <a:r>
-              <a:rPr lang="en-GB" dirty="0"/>
-              <a:t>There are </a:t>
-            </a:r>
-            <a:r>
-              <a:rPr lang="en-GB" i="1" dirty="0"/>
-              <a:t>many, many</a:t>
-            </a:r>
-            <a:r>
-              <a:rPr lang="en-GB" dirty="0"/>
-              <a:t> scale options/ functions – do not try and memorise them all, just be aware that they are available!</a:t>
-            </a:r>
-          </a:p>
-        </p:txBody>
-      </p:sp>
-    </p:spTree>
-    <p:extLst>
-      <p:ext uri="{BB962C8B-B14F-4D97-AF65-F5344CB8AC3E}">
-        <p14:creationId xmlns:p14="http://schemas.microsoft.com/office/powerpoint/2010/main" val="3295144012"/>
-      </p:ext>
-    </p:extLst>
-  </p:cSld>
-  <p:clrMapOvr>
-    <a:masterClrMapping/>
-  </p:clrMapOvr>
-</p:sld>
-</file>
-
-<file path=ppt/slides/slide18.xml><?xml version="1.0" encoding="utf-8"?>
-<p:sld xmlns:a="http://schemas.openxmlformats.org/drawingml/2006/main" xmlns:r="http://schemas.openxmlformats.org/officeDocument/2006/relationships" xmlns:p="http://schemas.openxmlformats.org/presentationml/2006/main">
-  <p:cSld>
-    <p:spTree>
-      <p:nvGrpSpPr>
-        <p:cNvPr id="1" name=""/>
-        <p:cNvGrpSpPr/>
-        <p:nvPr/>
-      </p:nvGrpSpPr>
-      <p:grpSpPr>
-        <a:xfrm>
-          <a:off x="0" y="0"/>
-          <a:ext cx="0" cy="0"/>
-          <a:chOff x="0" y="0"/>
-          <a:chExt cx="0" cy="0"/>
-        </a:xfrm>
-      </p:grpSpPr>
-      <p:sp>
-        <p:nvSpPr>
-          <p:cNvPr id="2" name="Title 1">
-            <a:extLst>
-              <a:ext uri="{FF2B5EF4-FFF2-40B4-BE49-F238E27FC236}">
-                <a16:creationId xmlns:a16="http://schemas.microsoft.com/office/drawing/2014/main" id="{17BE9EC1-77AE-48E9-993B-FE6712862D5B}"/>
-              </a:ext>
-            </a:extLst>
-          </p:cNvPr>
-          <p:cNvSpPr>
-            <a:spLocks noGrp="1"/>
-          </p:cNvSpPr>
-          <p:nvPr>
-            <p:ph type="title"/>
-          </p:nvPr>
-        </p:nvSpPr>
-        <p:spPr/>
-        <p:txBody>
-          <a:bodyPr/>
-          <a:lstStyle/>
-          <a:p>
-            <a:r>
-              <a:rPr lang="en-GB" dirty="0"/>
-              <a:t>Exercise 3</a:t>
-            </a:r>
-          </a:p>
-        </p:txBody>
-      </p:sp>
-      <p:sp>
-        <p:nvSpPr>
-          <p:cNvPr id="3" name="Content Placeholder 2">
-            <a:extLst>
-              <a:ext uri="{FF2B5EF4-FFF2-40B4-BE49-F238E27FC236}">
-                <a16:creationId xmlns:a16="http://schemas.microsoft.com/office/drawing/2014/main" id="{CAEEA666-751C-409B-8169-009F39608875}"/>
-              </a:ext>
-            </a:extLst>
-          </p:cNvPr>
-          <p:cNvSpPr>
-            <a:spLocks noGrp="1"/>
-          </p:cNvSpPr>
-          <p:nvPr>
-            <p:ph idx="1"/>
-          </p:nvPr>
-        </p:nvSpPr>
-        <p:spPr/>
-        <p:txBody>
-          <a:bodyPr/>
-          <a:lstStyle/>
-          <a:p>
-            <a:r>
-              <a:rPr lang="en-GB" dirty="0"/>
-              <a:t> exercise 3 in the exercises file, or the exercise that comes after the “scale” section on the aesthetics page of the app</a:t>
-            </a:r>
-          </a:p>
-        </p:txBody>
-      </p:sp>
-    </p:spTree>
-    <p:extLst>
-      <p:ext uri="{BB962C8B-B14F-4D97-AF65-F5344CB8AC3E}">
-        <p14:creationId xmlns:p14="http://schemas.microsoft.com/office/powerpoint/2010/main" val="2446342836"/>
-      </p:ext>
-    </p:extLst>
-  </p:cSld>
-  <p:clrMapOvr>
-    <a:masterClrMapping/>
-  </p:clrMapOvr>
-</p:sld>
-</file>
-
-<file path=ppt/slides/slide19.xml><?xml version="1.0" encoding="utf-8"?>
-<p:sld xmlns:a="http://schemas.openxmlformats.org/drawingml/2006/main" xmlns:r="http://schemas.openxmlformats.org/officeDocument/2006/relationships" xmlns:p="http://schemas.openxmlformats.org/presentationml/2006/main">
-  <p:cSld>
-    <p:spTree>
-      <p:nvGrpSpPr>
-        <p:cNvPr id="1" name=""/>
-        <p:cNvGrpSpPr/>
-        <p:nvPr/>
-      </p:nvGrpSpPr>
-      <p:grpSpPr>
-        <a:xfrm>
-          <a:off x="0" y="0"/>
-          <a:ext cx="0" cy="0"/>
-          <a:chOff x="0" y="0"/>
-          <a:chExt cx="0" cy="0"/>
-        </a:xfrm>
-      </p:grpSpPr>
-      <p:sp>
-        <p:nvSpPr>
-          <p:cNvPr id="2" name="Title 1">
-            <a:extLst>
-              <a:ext uri="{FF2B5EF4-FFF2-40B4-BE49-F238E27FC236}">
-                <a16:creationId xmlns:a16="http://schemas.microsoft.com/office/drawing/2014/main" id="{DC6C9B58-EE8B-43B7-9EA7-4FB5C0C89F6C}"/>
-              </a:ext>
-            </a:extLst>
-          </p:cNvPr>
-          <p:cNvSpPr>
-            <a:spLocks noGrp="1"/>
-          </p:cNvSpPr>
-          <p:nvPr>
-            <p:ph type="title"/>
-          </p:nvPr>
-        </p:nvSpPr>
-        <p:spPr/>
-        <p:txBody>
-          <a:bodyPr/>
-          <a:lstStyle/>
-          <a:p>
-            <a:r>
-              <a:rPr lang="en-GB" dirty="0"/>
-              <a:t>Geometry layers</a:t>
-            </a:r>
-          </a:p>
-        </p:txBody>
-      </p:sp>
-      <p:sp>
-        <p:nvSpPr>
-          <p:cNvPr id="3" name="Content Placeholder 2">
-            <a:extLst>
-              <a:ext uri="{FF2B5EF4-FFF2-40B4-BE49-F238E27FC236}">
-                <a16:creationId xmlns:a16="http://schemas.microsoft.com/office/drawing/2014/main" id="{CF0EAE4F-AEB3-4AC6-B3CF-78C925F99AFB}"/>
-              </a:ext>
-            </a:extLst>
-          </p:cNvPr>
-          <p:cNvSpPr>
-            <a:spLocks noGrp="1"/>
-          </p:cNvSpPr>
-          <p:nvPr>
-            <p:ph idx="1"/>
-          </p:nvPr>
-        </p:nvSpPr>
-        <p:spPr/>
-        <p:txBody>
-          <a:bodyPr/>
-          <a:lstStyle/>
-          <a:p>
-            <a:r>
-              <a:rPr lang="en-GB" dirty="0"/>
-              <a:t>These are the </a:t>
-            </a:r>
-            <a:r>
-              <a:rPr lang="en-GB" dirty="0" err="1"/>
-              <a:t>geom</a:t>
-            </a:r>
-            <a:r>
-              <a:rPr lang="en-GB" dirty="0"/>
-              <a:t> layers we have already used: </a:t>
-            </a:r>
-            <a:r>
-              <a:rPr lang="en-GB" dirty="0" err="1"/>
-              <a:t>gemo_bar</a:t>
-            </a:r>
-            <a:r>
-              <a:rPr lang="en-GB" dirty="0"/>
-              <a:t>, </a:t>
-            </a:r>
-            <a:r>
-              <a:rPr lang="en-GB" dirty="0" err="1"/>
-              <a:t>geom_line</a:t>
-            </a:r>
-            <a:r>
-              <a:rPr lang="en-GB" dirty="0"/>
-              <a:t> etc.</a:t>
-            </a:r>
-          </a:p>
-          <a:p>
-            <a:pPr lvl="1"/>
-            <a:r>
-              <a:rPr lang="en-GB" dirty="0"/>
-              <a:t>There are ~50 options! </a:t>
-            </a:r>
-          </a:p>
-          <a:p>
-            <a:pPr lvl="1"/>
-            <a:r>
-              <a:rPr lang="en-GB" dirty="0"/>
-              <a:t>You will probably only use a few of these frequently</a:t>
-            </a:r>
-          </a:p>
-        </p:txBody>
-      </p:sp>
-    </p:spTree>
-    <p:extLst>
-      <p:ext uri="{BB962C8B-B14F-4D97-AF65-F5344CB8AC3E}">
-        <p14:creationId xmlns:p14="http://schemas.microsoft.com/office/powerpoint/2010/main" val="2747122656"/>
       </p:ext>
     </p:extLst>
   </p:cSld>
@@ -6165,7 +7609,7 @@
           <p:cNvPr id="2" name="Title 1">
             <a:extLst>
               <a:ext uri="{FF2B5EF4-FFF2-40B4-BE49-F238E27FC236}">
-                <a16:creationId xmlns:a16="http://schemas.microsoft.com/office/drawing/2014/main" id="{DC6C9B58-EE8B-43B7-9EA7-4FB5C0C89F6C}"/>
+                <a16:creationId xmlns:a16="http://schemas.microsoft.com/office/drawing/2014/main" id="{FA02A8F9-B3BA-44FB-8EFA-4C5746D380BA}"/>
               </a:ext>
             </a:extLst>
           </p:cNvPr>
@@ -6183,1099 +7627,145 @@
           <a:p>
             <a:r>
               <a:rPr lang="en-GB" dirty="0"/>
-              <a:t>Geometry layers – some examples</a:t>
+              <a:t>Scales and axes</a:t>
             </a:r>
           </a:p>
         </p:txBody>
       </p:sp>
-      <p:graphicFrame>
-        <p:nvGraphicFramePr>
-          <p:cNvPr id="6" name="Table 5">
+      <p:sp>
+        <p:nvSpPr>
+          <p:cNvPr id="3" name="Content Placeholder 2">
             <a:extLst>
               <a:ext uri="{FF2B5EF4-FFF2-40B4-BE49-F238E27FC236}">
-                <a16:creationId xmlns:a16="http://schemas.microsoft.com/office/drawing/2014/main" id="{D8408E5E-02B9-4AC0-8449-8D5364E00E7B}"/>
+                <a16:creationId xmlns:a16="http://schemas.microsoft.com/office/drawing/2014/main" id="{392C7B0E-C3AC-474A-AFE5-18A8C2D91E35}"/>
               </a:ext>
             </a:extLst>
           </p:cNvPr>
-          <p:cNvGraphicFramePr>
-            <a:graphicFrameLocks noGrp="1"/>
-          </p:cNvGraphicFramePr>
+          <p:cNvSpPr>
+            <a:spLocks noGrp="1"/>
+          </p:cNvSpPr>
           <p:nvPr>
-            <p:extLst>
-              <p:ext uri="{D42A27DB-BD31-4B8C-83A1-F6EECF244321}">
-                <p14:modId xmlns:p14="http://schemas.microsoft.com/office/powerpoint/2010/main" val="1458261592"/>
-              </p:ext>
-            </p:extLst>
+            <p:ph idx="1"/>
           </p:nvPr>
-        </p:nvGraphicFramePr>
-        <p:xfrm>
-          <a:off x="1069258" y="1497787"/>
-          <a:ext cx="10660626" cy="4636533"/>
-        </p:xfrm>
-        <a:graphic>
-          <a:graphicData uri="http://schemas.openxmlformats.org/drawingml/2006/table">
-            <a:tbl>
-              <a:tblPr/>
-              <a:tblGrid>
-                <a:gridCol w="1408471">
-                  <a:extLst>
-                    <a:ext uri="{9D8B030D-6E8A-4147-A177-3AD203B41FA5}">
-                      <a16:colId xmlns:a16="http://schemas.microsoft.com/office/drawing/2014/main" val="1152714497"/>
-                    </a:ext>
-                  </a:extLst>
-                </a:gridCol>
-                <a:gridCol w="1858297">
-                  <a:extLst>
-                    <a:ext uri="{9D8B030D-6E8A-4147-A177-3AD203B41FA5}">
-                      <a16:colId xmlns:a16="http://schemas.microsoft.com/office/drawing/2014/main" val="752761264"/>
-                    </a:ext>
-                  </a:extLst>
-                </a:gridCol>
-                <a:gridCol w="7393858">
-                  <a:extLst>
-                    <a:ext uri="{9D8B030D-6E8A-4147-A177-3AD203B41FA5}">
-                      <a16:colId xmlns:a16="http://schemas.microsoft.com/office/drawing/2014/main" val="1489400548"/>
-                    </a:ext>
-                  </a:extLst>
-                </a:gridCol>
-              </a:tblGrid>
-              <a:tr h="318868">
-                <a:tc>
-                  <a:txBody>
-                    <a:bodyPr/>
-                    <a:lstStyle/>
-                    <a:p>
-                      <a:pPr algn="l" fontAlgn="b"/>
-                      <a:r>
-                        <a:rPr lang="en-GB" sz="1400" b="1" dirty="0">
-                          <a:solidFill>
-                            <a:srgbClr val="666666"/>
-                          </a:solidFill>
-                          <a:effectLst/>
-                          <a:latin typeface="Open Sans" panose="020B0606030504020204" pitchFamily="34" charset="0"/>
-                        </a:rPr>
-                        <a:t>Group</a:t>
-                      </a:r>
-                    </a:p>
-                  </a:txBody>
-                  <a:tcPr marL="28978" marR="28978" marT="57956" marB="57956" anchor="b">
-                    <a:lnL>
-                      <a:noFill/>
-                    </a:lnL>
-                    <a:lnR>
-                      <a:noFill/>
-                    </a:lnR>
-                    <a:lnT>
-                      <a:noFill/>
-                    </a:lnT>
-                    <a:lnB>
-                      <a:noFill/>
-                    </a:lnB>
-                  </a:tcPr>
-                </a:tc>
-                <a:tc>
-                  <a:txBody>
-                    <a:bodyPr/>
-                    <a:lstStyle/>
-                    <a:p>
-                      <a:pPr algn="l" fontAlgn="b"/>
-                      <a:r>
-                        <a:rPr lang="en-GB" sz="1400" b="1">
-                          <a:solidFill>
-                            <a:srgbClr val="666666"/>
-                          </a:solidFill>
-                          <a:effectLst/>
-                          <a:latin typeface="Open Sans" panose="020B0606030504020204" pitchFamily="34" charset="0"/>
-                        </a:rPr>
-                        <a:t>Function</a:t>
-                      </a:r>
-                    </a:p>
-                  </a:txBody>
-                  <a:tcPr marL="28978" marR="28978" marT="57956" marB="57956" anchor="b">
-                    <a:lnL>
-                      <a:noFill/>
-                    </a:lnL>
-                    <a:lnR>
-                      <a:noFill/>
-                    </a:lnR>
-                    <a:lnT>
-                      <a:noFill/>
-                    </a:lnT>
-                    <a:lnB>
-                      <a:noFill/>
-                    </a:lnB>
-                  </a:tcPr>
-                </a:tc>
-                <a:tc>
-                  <a:txBody>
-                    <a:bodyPr/>
-                    <a:lstStyle/>
-                    <a:p>
-                      <a:pPr algn="l" fontAlgn="b"/>
-                      <a:r>
-                        <a:rPr lang="en-GB" sz="1400" b="1" dirty="0">
-                          <a:solidFill>
-                            <a:srgbClr val="666666"/>
-                          </a:solidFill>
-                          <a:effectLst/>
-                          <a:latin typeface="Open Sans" panose="020B0606030504020204" pitchFamily="34" charset="0"/>
-                        </a:rPr>
-                        <a:t>Description</a:t>
-                      </a:r>
-                    </a:p>
-                  </a:txBody>
-                  <a:tcPr marL="28978" marR="28978" marT="57956" marB="57956" anchor="b">
-                    <a:lnL>
-                      <a:noFill/>
-                    </a:lnL>
-                    <a:lnR>
-                      <a:noFill/>
-                    </a:lnR>
-                    <a:lnT>
-                      <a:noFill/>
-                    </a:lnT>
-                    <a:lnB>
-                      <a:noFill/>
-                    </a:lnB>
-                  </a:tcPr>
-                </a:tc>
-                <a:extLst>
-                  <a:ext uri="{0D108BD9-81ED-4DB2-BD59-A6C34878D82A}">
-                    <a16:rowId xmlns:a16="http://schemas.microsoft.com/office/drawing/2014/main" val="3173409864"/>
-                  </a:ext>
-                </a:extLst>
-              </a:tr>
-              <a:tr h="788854">
-                <a:tc rowSpan="3">
-                  <a:txBody>
-                    <a:bodyPr/>
-                    <a:lstStyle/>
-                    <a:p>
-                      <a:pPr algn="l" fontAlgn="ctr"/>
-                      <a:r>
-                        <a:rPr lang="en-GB" sz="1400" dirty="0">
-                          <a:effectLst/>
-                          <a:latin typeface="Open Sans" panose="020B0606030504020204" pitchFamily="34" charset="0"/>
-                        </a:rPr>
-                        <a:t>Scatter</a:t>
-                      </a:r>
-                    </a:p>
-                  </a:txBody>
-                  <a:tcPr marL="28978" marR="28978" marT="40569" marB="40569" anchor="ctr">
-                    <a:lnL>
-                      <a:noFill/>
-                    </a:lnL>
-                    <a:lnR>
-                      <a:noFill/>
-                    </a:lnR>
-                    <a:lnT>
-                      <a:noFill/>
-                    </a:lnT>
-                    <a:lnB>
-                      <a:noFill/>
-                    </a:lnB>
-                  </a:tcPr>
-                </a:tc>
-                <a:tc>
-                  <a:txBody>
-                    <a:bodyPr/>
-                    <a:lstStyle/>
-                    <a:p>
-                      <a:pPr algn="l" fontAlgn="ctr"/>
-                      <a:r>
-                        <a:rPr lang="en-GB" sz="1400" b="1" dirty="0" err="1">
-                          <a:effectLst/>
-                          <a:latin typeface="Open Sans" panose="020B0606030504020204" pitchFamily="34" charset="0"/>
-                        </a:rPr>
-                        <a:t>geom_point</a:t>
-                      </a:r>
-                      <a:r>
-                        <a:rPr lang="en-GB" sz="1400" b="1" dirty="0">
-                          <a:effectLst/>
-                          <a:latin typeface="Open Sans" panose="020B0606030504020204" pitchFamily="34" charset="0"/>
-                        </a:rPr>
-                        <a:t>()</a:t>
-                      </a:r>
-                      <a:endParaRPr lang="en-GB" sz="1400" dirty="0">
-                        <a:effectLst/>
-                        <a:latin typeface="Open Sans" panose="020B0606030504020204" pitchFamily="34" charset="0"/>
-                      </a:endParaRPr>
-                    </a:p>
-                  </a:txBody>
-                  <a:tcPr marL="28978" marR="28978" marT="40569" marB="40569" anchor="ctr">
-                    <a:lnL>
-                      <a:noFill/>
-                    </a:lnL>
-                    <a:lnR>
-                      <a:noFill/>
-                    </a:lnR>
-                    <a:lnT>
-                      <a:noFill/>
-                    </a:lnT>
-                    <a:lnB>
-                      <a:noFill/>
-                    </a:lnB>
-                  </a:tcPr>
-                </a:tc>
-                <a:tc>
-                  <a:txBody>
-                    <a:bodyPr/>
-                    <a:lstStyle/>
-                    <a:p>
-                      <a:pPr algn="l" fontAlgn="ctr"/>
-                      <a:r>
-                        <a:rPr lang="en-GB" sz="1400" dirty="0">
-                          <a:effectLst/>
-                          <a:latin typeface="Open Sans" panose="020B0606030504020204" pitchFamily="34" charset="0"/>
-                        </a:rPr>
-                        <a:t>This is the foundation for the next 2 variations. Scatterplots are the most useful for displaying the relationship between 2 continuous variables. You can map another variable to size which will create a bubble chart from this.</a:t>
-                      </a:r>
-                    </a:p>
-                  </a:txBody>
-                  <a:tcPr marL="28978" marR="28978" marT="40569" marB="40569" anchor="ctr">
-                    <a:lnL>
-                      <a:noFill/>
-                    </a:lnL>
-                    <a:lnR>
-                      <a:noFill/>
-                    </a:lnR>
-                    <a:lnT>
-                      <a:noFill/>
-                    </a:lnT>
-                    <a:lnB>
-                      <a:noFill/>
-                    </a:lnB>
-                  </a:tcPr>
-                </a:tc>
-                <a:extLst>
-                  <a:ext uri="{0D108BD9-81ED-4DB2-BD59-A6C34878D82A}">
-                    <a16:rowId xmlns:a16="http://schemas.microsoft.com/office/drawing/2014/main" val="2296354270"/>
-                  </a:ext>
-                </a:extLst>
-              </a:tr>
-              <a:tr h="653750">
-                <a:tc vMerge="1">
-                  <a:txBody>
-                    <a:bodyPr/>
-                    <a:lstStyle/>
-                    <a:p>
-                      <a:endParaRPr lang="en-GB"/>
-                    </a:p>
-                  </a:txBody>
-                  <a:tcPr/>
-                </a:tc>
-                <a:tc>
-                  <a:txBody>
-                    <a:bodyPr/>
-                    <a:lstStyle/>
-                    <a:p>
-                      <a:pPr algn="l" fontAlgn="ctr"/>
-                      <a:r>
-                        <a:rPr lang="en-GB" sz="1400" b="1" dirty="0" err="1">
-                          <a:effectLst/>
-                          <a:latin typeface="Open Sans" panose="020B0606030504020204" pitchFamily="34" charset="0"/>
-                        </a:rPr>
-                        <a:t>geom_jitter</a:t>
-                      </a:r>
-                      <a:r>
-                        <a:rPr lang="en-GB" sz="1400" b="1" dirty="0">
-                          <a:effectLst/>
-                          <a:latin typeface="Open Sans" panose="020B0606030504020204" pitchFamily="34" charset="0"/>
-                        </a:rPr>
-                        <a:t>()</a:t>
-                      </a:r>
-                      <a:endParaRPr lang="en-GB" sz="1400" dirty="0">
-                        <a:effectLst/>
-                        <a:latin typeface="Open Sans" panose="020B0606030504020204" pitchFamily="34" charset="0"/>
-                      </a:endParaRPr>
-                    </a:p>
-                  </a:txBody>
-                  <a:tcPr marL="28978" marR="28978" marT="40569" marB="40569" anchor="ctr">
-                    <a:lnL>
-                      <a:noFill/>
-                    </a:lnL>
-                    <a:lnR>
-                      <a:noFill/>
-                    </a:lnR>
-                    <a:lnT>
-                      <a:noFill/>
-                    </a:lnT>
-                    <a:lnB>
-                      <a:noFill/>
-                    </a:lnB>
-                  </a:tcPr>
-                </a:tc>
-                <a:tc>
-                  <a:txBody>
-                    <a:bodyPr/>
-                    <a:lstStyle/>
-                    <a:p>
-                      <a:pPr algn="l" fontAlgn="ctr"/>
-                      <a:r>
-                        <a:rPr lang="en-GB" sz="1400" dirty="0">
-                          <a:effectLst/>
-                          <a:latin typeface="Open Sans" panose="020B0606030504020204" pitchFamily="34" charset="0"/>
-                        </a:rPr>
-                        <a:t>A convenient shortcut for specifying jitter as the position. Adding a small amount of random variation to the location of points, useful for handling overplotting.</a:t>
-                      </a:r>
-                    </a:p>
-                  </a:txBody>
-                  <a:tcPr marL="28978" marR="28978" marT="40569" marB="40569" anchor="ctr">
-                    <a:lnL>
-                      <a:noFill/>
-                    </a:lnL>
-                    <a:lnR>
-                      <a:noFill/>
-                    </a:lnR>
-                    <a:lnT>
-                      <a:noFill/>
-                    </a:lnT>
-                    <a:lnB>
-                      <a:noFill/>
-                    </a:lnB>
-                  </a:tcPr>
-                </a:tc>
-                <a:extLst>
-                  <a:ext uri="{0D108BD9-81ED-4DB2-BD59-A6C34878D82A}">
-                    <a16:rowId xmlns:a16="http://schemas.microsoft.com/office/drawing/2014/main" val="3025231216"/>
-                  </a:ext>
-                </a:extLst>
-              </a:tr>
-              <a:tr h="285193">
-                <a:tc vMerge="1">
-                  <a:txBody>
-                    <a:bodyPr/>
-                    <a:lstStyle/>
-                    <a:p>
-                      <a:endParaRPr lang="en-GB"/>
-                    </a:p>
-                  </a:txBody>
-                  <a:tcPr/>
-                </a:tc>
-                <a:tc>
-                  <a:txBody>
-                    <a:bodyPr/>
-                    <a:lstStyle/>
-                    <a:p>
-                      <a:pPr algn="l" fontAlgn="ctr"/>
-                      <a:r>
-                        <a:rPr lang="en-GB" sz="1400" b="1">
-                          <a:effectLst/>
-                          <a:latin typeface="Open Sans" panose="020B0606030504020204" pitchFamily="34" charset="0"/>
-                        </a:rPr>
-                        <a:t>geom_count()</a:t>
-                      </a:r>
-                      <a:endParaRPr lang="en-GB" sz="1400">
-                        <a:effectLst/>
-                        <a:latin typeface="Open Sans" panose="020B0606030504020204" pitchFamily="34" charset="0"/>
-                      </a:endParaRPr>
-                    </a:p>
-                  </a:txBody>
-                  <a:tcPr marL="28978" marR="28978" marT="40569" marB="40569" anchor="ctr">
-                    <a:lnL>
-                      <a:noFill/>
-                    </a:lnL>
-                    <a:lnR>
-                      <a:noFill/>
-                    </a:lnR>
-                    <a:lnT>
-                      <a:noFill/>
-                    </a:lnT>
-                    <a:lnB w="12700" cap="flat" cmpd="sng" algn="ctr">
-                      <a:solidFill>
-                        <a:schemeClr val="tx1"/>
-                      </a:solidFill>
-                      <a:prstDash val="solid"/>
-                      <a:round/>
-                      <a:headEnd type="none" w="med" len="med"/>
-                      <a:tailEnd type="none" w="med" len="med"/>
-                    </a:lnB>
-                  </a:tcPr>
-                </a:tc>
-                <a:tc>
-                  <a:txBody>
-                    <a:bodyPr/>
-                    <a:lstStyle/>
-                    <a:p>
-                      <a:pPr algn="l" fontAlgn="ctr"/>
-                      <a:r>
-                        <a:rPr lang="en-GB" sz="1400" dirty="0">
-                          <a:effectLst/>
-                          <a:latin typeface="Open Sans" panose="020B0606030504020204" pitchFamily="34" charset="0"/>
-                        </a:rPr>
-                        <a:t>Counting the number of observations at each location.</a:t>
-                      </a:r>
-                    </a:p>
-                  </a:txBody>
-                  <a:tcPr marL="28978" marR="28978" marT="40569" marB="40569" anchor="ctr">
-                    <a:lnL>
-                      <a:noFill/>
-                    </a:lnL>
-                    <a:lnR>
-                      <a:noFill/>
-                    </a:lnR>
-                    <a:lnT>
-                      <a:noFill/>
-                    </a:lnT>
-                    <a:lnB w="12700" cap="flat" cmpd="sng" algn="ctr">
-                      <a:solidFill>
-                        <a:schemeClr val="tx1"/>
-                      </a:solidFill>
-                      <a:prstDash val="solid"/>
-                      <a:round/>
-                      <a:headEnd type="none" w="med" len="med"/>
-                      <a:tailEnd type="none" w="med" len="med"/>
-                    </a:lnB>
-                  </a:tcPr>
-                </a:tc>
-                <a:extLst>
-                  <a:ext uri="{0D108BD9-81ED-4DB2-BD59-A6C34878D82A}">
-                    <a16:rowId xmlns:a16="http://schemas.microsoft.com/office/drawing/2014/main" val="4234896019"/>
-                  </a:ext>
-                </a:extLst>
-              </a:tr>
-              <a:tr h="508011">
-                <a:tc rowSpan="3">
-                  <a:txBody>
-                    <a:bodyPr/>
-                    <a:lstStyle/>
-                    <a:p>
-                      <a:pPr algn="l" fontAlgn="ctr"/>
-                      <a:r>
-                        <a:rPr lang="en-GB" sz="1400" dirty="0">
-                          <a:effectLst/>
-                          <a:latin typeface="Open Sans" panose="020B0606030504020204" pitchFamily="34" charset="0"/>
-                        </a:rPr>
-                        <a:t>Bar</a:t>
-                      </a:r>
-                    </a:p>
-                  </a:txBody>
-                  <a:tcPr marL="28978" marR="28978" marT="40569" marB="40569" anchor="ctr">
-                    <a:lnL>
-                      <a:noFill/>
-                    </a:lnL>
-                    <a:lnR>
-                      <a:noFill/>
-                    </a:lnR>
-                    <a:lnT>
-                      <a:noFill/>
-                    </a:lnT>
-                    <a:lnB>
-                      <a:noFill/>
-                    </a:lnB>
-                  </a:tcPr>
-                </a:tc>
-                <a:tc>
-                  <a:txBody>
-                    <a:bodyPr/>
-                    <a:lstStyle/>
-                    <a:p>
-                      <a:pPr algn="l" fontAlgn="ctr"/>
-                      <a:r>
-                        <a:rPr lang="en-GB" sz="1400" b="1" dirty="0" err="1">
-                          <a:effectLst/>
-                          <a:latin typeface="Open Sans" panose="020B0606030504020204" pitchFamily="34" charset="0"/>
-                        </a:rPr>
-                        <a:t>geom_histogram</a:t>
-                      </a:r>
-                      <a:r>
-                        <a:rPr lang="en-GB" sz="1400" b="1" dirty="0">
-                          <a:effectLst/>
-                          <a:latin typeface="Open Sans" panose="020B0606030504020204" pitchFamily="34" charset="0"/>
-                        </a:rPr>
-                        <a:t>()</a:t>
-                      </a:r>
-                      <a:endParaRPr lang="en-GB" sz="1400" dirty="0">
-                        <a:effectLst/>
-                        <a:latin typeface="Open Sans" panose="020B0606030504020204" pitchFamily="34" charset="0"/>
-                      </a:endParaRPr>
-                    </a:p>
-                  </a:txBody>
-                  <a:tcPr marL="28978" marR="28978" marT="40569" marB="40569" anchor="ctr">
-                    <a:lnL>
-                      <a:noFill/>
-                    </a:lnL>
-                    <a:lnR>
-                      <a:noFill/>
-                    </a:lnR>
-                    <a:lnT w="12700" cap="flat" cmpd="sng" algn="ctr">
-                      <a:solidFill>
-                        <a:schemeClr val="tx1"/>
-                      </a:solidFill>
-                      <a:prstDash val="solid"/>
-                      <a:round/>
-                      <a:headEnd type="none" w="med" len="med"/>
-                      <a:tailEnd type="none" w="med" len="med"/>
-                    </a:lnT>
-                    <a:lnB>
-                      <a:noFill/>
-                    </a:lnB>
-                  </a:tcPr>
-                </a:tc>
-                <a:tc>
-                  <a:txBody>
-                    <a:bodyPr/>
-                    <a:lstStyle/>
-                    <a:p>
-                      <a:pPr algn="l" fontAlgn="ctr"/>
-                      <a:r>
-                        <a:rPr lang="en-GB" sz="1400" dirty="0">
-                          <a:effectLst/>
-                          <a:latin typeface="Open Sans" panose="020B0606030504020204" pitchFamily="34" charset="0"/>
-                        </a:rPr>
-                        <a:t>A specialised version of bar plots. Showing the binned distribution of a continuous variable.</a:t>
-                      </a:r>
-                    </a:p>
-                  </a:txBody>
-                  <a:tcPr marL="28978" marR="28978" marT="40569" marB="40569" anchor="ctr">
-                    <a:lnL>
-                      <a:noFill/>
-                    </a:lnL>
-                    <a:lnR>
-                      <a:noFill/>
-                    </a:lnR>
-                    <a:lnT w="12700" cap="flat" cmpd="sng" algn="ctr">
-                      <a:solidFill>
-                        <a:schemeClr val="tx1"/>
-                      </a:solidFill>
-                      <a:prstDash val="solid"/>
-                      <a:round/>
-                      <a:headEnd type="none" w="med" len="med"/>
-                      <a:tailEnd type="none" w="med" len="med"/>
-                    </a:lnT>
-                    <a:lnB>
-                      <a:noFill/>
-                    </a:lnB>
-                  </a:tcPr>
-                </a:tc>
-                <a:extLst>
-                  <a:ext uri="{0D108BD9-81ED-4DB2-BD59-A6C34878D82A}">
-                    <a16:rowId xmlns:a16="http://schemas.microsoft.com/office/drawing/2014/main" val="3699880814"/>
-                  </a:ext>
-                </a:extLst>
-              </a:tr>
-              <a:tr h="320848">
-                <a:tc vMerge="1">
-                  <a:txBody>
-                    <a:bodyPr/>
-                    <a:lstStyle/>
-                    <a:p>
-                      <a:endParaRPr lang="en-GB"/>
-                    </a:p>
-                  </a:txBody>
-                  <a:tcPr/>
-                </a:tc>
-                <a:tc>
-                  <a:txBody>
-                    <a:bodyPr/>
-                    <a:lstStyle/>
-                    <a:p>
-                      <a:pPr algn="l" fontAlgn="ctr"/>
-                      <a:r>
-                        <a:rPr lang="en-GB" sz="1400" b="1">
-                          <a:effectLst/>
-                          <a:latin typeface="Open Sans" panose="020B0606030504020204" pitchFamily="34" charset="0"/>
-                        </a:rPr>
-                        <a:t>geom_bar()</a:t>
-                      </a:r>
-                      <a:endParaRPr lang="en-GB" sz="1400">
-                        <a:effectLst/>
-                        <a:latin typeface="Open Sans" panose="020B0606030504020204" pitchFamily="34" charset="0"/>
-                      </a:endParaRPr>
-                    </a:p>
-                  </a:txBody>
-                  <a:tcPr marL="28978" marR="28978" marT="40569" marB="40569" anchor="ctr">
-                    <a:lnL>
-                      <a:noFill/>
-                    </a:lnL>
-                    <a:lnR>
-                      <a:noFill/>
-                    </a:lnR>
-                    <a:lnT>
-                      <a:noFill/>
-                    </a:lnT>
-                    <a:lnB>
-                      <a:noFill/>
-                    </a:lnB>
-                  </a:tcPr>
-                </a:tc>
-                <a:tc>
-                  <a:txBody>
-                    <a:bodyPr/>
-                    <a:lstStyle/>
-                    <a:p>
-                      <a:pPr algn="l" fontAlgn="ctr"/>
-                      <a:r>
-                        <a:rPr lang="en-GB" sz="1400" dirty="0">
-                          <a:effectLst/>
-                          <a:latin typeface="Open Sans" panose="020B0606030504020204" pitchFamily="34" charset="0"/>
-                        </a:rPr>
-                        <a:t>A bar with the height proportional to the number of cases in each group.</a:t>
-                      </a:r>
-                    </a:p>
-                  </a:txBody>
-                  <a:tcPr marL="28978" marR="28978" marT="40569" marB="40569" anchor="ctr">
-                    <a:lnL>
-                      <a:noFill/>
-                    </a:lnL>
-                    <a:lnR>
-                      <a:noFill/>
-                    </a:lnR>
-                    <a:lnT>
-                      <a:noFill/>
-                    </a:lnT>
-                    <a:lnB>
-                      <a:noFill/>
-                    </a:lnB>
-                  </a:tcPr>
-                </a:tc>
-                <a:extLst>
-                  <a:ext uri="{0D108BD9-81ED-4DB2-BD59-A6C34878D82A}">
-                    <a16:rowId xmlns:a16="http://schemas.microsoft.com/office/drawing/2014/main" val="3674227604"/>
-                  </a:ext>
-                </a:extLst>
-              </a:tr>
-              <a:tr h="338674">
-                <a:tc vMerge="1">
-                  <a:txBody>
-                    <a:bodyPr/>
-                    <a:lstStyle/>
-                    <a:p>
-                      <a:endParaRPr lang="en-GB"/>
-                    </a:p>
-                  </a:txBody>
-                  <a:tcPr/>
-                </a:tc>
-                <a:tc>
-                  <a:txBody>
-                    <a:bodyPr/>
-                    <a:lstStyle/>
-                    <a:p>
-                      <a:pPr algn="l" fontAlgn="ctr"/>
-                      <a:r>
-                        <a:rPr lang="en-GB" sz="1400" b="1">
-                          <a:effectLst/>
-                          <a:latin typeface="Open Sans" panose="020B0606030504020204" pitchFamily="34" charset="0"/>
-                        </a:rPr>
-                        <a:t>geom_col()</a:t>
-                      </a:r>
-                      <a:endParaRPr lang="en-GB" sz="1400">
-                        <a:effectLst/>
-                        <a:latin typeface="Open Sans" panose="020B0606030504020204" pitchFamily="34" charset="0"/>
-                      </a:endParaRPr>
-                    </a:p>
-                  </a:txBody>
-                  <a:tcPr marL="28978" marR="28978" marT="40569" marB="40569" anchor="ctr">
-                    <a:lnL>
-                      <a:noFill/>
-                    </a:lnL>
-                    <a:lnR>
-                      <a:noFill/>
-                    </a:lnR>
-                    <a:lnT>
-                      <a:noFill/>
-                    </a:lnT>
-                    <a:lnB w="12700" cap="flat" cmpd="sng" algn="ctr">
-                      <a:solidFill>
-                        <a:schemeClr val="tx1"/>
-                      </a:solidFill>
-                      <a:prstDash val="solid"/>
-                      <a:round/>
-                      <a:headEnd type="none" w="med" len="med"/>
-                      <a:tailEnd type="none" w="med" len="med"/>
-                    </a:lnB>
-                  </a:tcPr>
-                </a:tc>
-                <a:tc>
-                  <a:txBody>
-                    <a:bodyPr/>
-                    <a:lstStyle/>
-                    <a:p>
-                      <a:pPr algn="l" fontAlgn="ctr"/>
-                      <a:r>
-                        <a:rPr lang="en-GB" sz="1400" dirty="0">
-                          <a:effectLst/>
-                          <a:latin typeface="Open Sans" panose="020B0606030504020204" pitchFamily="34" charset="0"/>
-                        </a:rPr>
-                        <a:t>A bar with the height representing values in the data.</a:t>
-                      </a:r>
-                    </a:p>
-                  </a:txBody>
-                  <a:tcPr marL="28978" marR="28978" marT="40569" marB="40569" anchor="ctr">
-                    <a:lnL>
-                      <a:noFill/>
-                    </a:lnL>
-                    <a:lnR>
-                      <a:noFill/>
-                    </a:lnR>
-                    <a:lnT>
-                      <a:noFill/>
-                    </a:lnT>
-                    <a:lnB w="12700" cap="flat" cmpd="sng" algn="ctr">
-                      <a:solidFill>
-                        <a:schemeClr val="tx1"/>
-                      </a:solidFill>
-                      <a:prstDash val="solid"/>
-                      <a:round/>
-                      <a:headEnd type="none" w="med" len="med"/>
-                      <a:tailEnd type="none" w="med" len="med"/>
-                    </a:lnB>
-                  </a:tcPr>
-                </a:tc>
-                <a:extLst>
-                  <a:ext uri="{0D108BD9-81ED-4DB2-BD59-A6C34878D82A}">
-                    <a16:rowId xmlns:a16="http://schemas.microsoft.com/office/drawing/2014/main" val="3722422891"/>
-                  </a:ext>
-                </a:extLst>
-              </a:tr>
-              <a:tr h="285193">
-                <a:tc rowSpan="2">
-                  <a:txBody>
-                    <a:bodyPr/>
-                    <a:lstStyle/>
-                    <a:p>
-                      <a:pPr algn="l" fontAlgn="ctr"/>
-                      <a:r>
-                        <a:rPr lang="en-GB" sz="1400" dirty="0">
-                          <a:effectLst/>
-                          <a:latin typeface="Open Sans" panose="020B0606030504020204" pitchFamily="34" charset="0"/>
-                        </a:rPr>
-                        <a:t>Line</a:t>
-                      </a:r>
-                    </a:p>
-                  </a:txBody>
-                  <a:tcPr marL="28978" marR="28978" marT="40569" marB="40569" anchor="ctr">
-                    <a:lnL>
-                      <a:noFill/>
-                    </a:lnL>
-                    <a:lnR>
-                      <a:noFill/>
-                    </a:lnR>
-                    <a:lnT>
-                      <a:noFill/>
-                    </a:lnT>
-                    <a:lnB>
-                      <a:noFill/>
-                    </a:lnB>
-                  </a:tcPr>
-                </a:tc>
-                <a:tc>
-                  <a:txBody>
-                    <a:bodyPr/>
-                    <a:lstStyle/>
-                    <a:p>
-                      <a:pPr algn="l" fontAlgn="ctr"/>
-                      <a:r>
-                        <a:rPr lang="en-GB" sz="1400" b="1" dirty="0" err="1">
-                          <a:effectLst/>
-                          <a:latin typeface="Open Sans" panose="020B0606030504020204" pitchFamily="34" charset="0"/>
-                        </a:rPr>
-                        <a:t>geom_line</a:t>
-                      </a:r>
-                      <a:r>
-                        <a:rPr lang="en-GB" sz="1400" b="1" dirty="0">
-                          <a:effectLst/>
-                          <a:latin typeface="Open Sans" panose="020B0606030504020204" pitchFamily="34" charset="0"/>
-                        </a:rPr>
-                        <a:t>()</a:t>
-                      </a:r>
-                      <a:endParaRPr lang="en-GB" sz="1400" dirty="0">
-                        <a:effectLst/>
-                        <a:latin typeface="Open Sans" panose="020B0606030504020204" pitchFamily="34" charset="0"/>
-                      </a:endParaRPr>
-                    </a:p>
-                  </a:txBody>
-                  <a:tcPr marL="28978" marR="28978" marT="40569" marB="40569" anchor="ctr">
-                    <a:lnL>
-                      <a:noFill/>
-                    </a:lnL>
-                    <a:lnR>
-                      <a:noFill/>
-                    </a:lnR>
-                    <a:lnT w="12700" cap="flat" cmpd="sng" algn="ctr">
-                      <a:solidFill>
-                        <a:schemeClr val="tx1"/>
-                      </a:solidFill>
-                      <a:prstDash val="solid"/>
-                      <a:round/>
-                      <a:headEnd type="none" w="med" len="med"/>
-                      <a:tailEnd type="none" w="med" len="med"/>
-                    </a:lnT>
-                    <a:lnB>
-                      <a:noFill/>
-                    </a:lnB>
-                  </a:tcPr>
-                </a:tc>
-                <a:tc>
-                  <a:txBody>
-                    <a:bodyPr/>
-                    <a:lstStyle/>
-                    <a:p>
-                      <a:pPr algn="l" fontAlgn="ctr"/>
-                      <a:r>
-                        <a:rPr lang="en-GB" sz="1400">
-                          <a:effectLst/>
-                          <a:latin typeface="Open Sans" panose="020B0606030504020204" pitchFamily="34" charset="0"/>
-                        </a:rPr>
-                        <a:t>Connect observations based on the order on the x-axis.</a:t>
-                      </a:r>
-                    </a:p>
-                  </a:txBody>
-                  <a:tcPr marL="28978" marR="28978" marT="40569" marB="40569" anchor="ctr">
-                    <a:lnL>
-                      <a:noFill/>
-                    </a:lnL>
-                    <a:lnR>
-                      <a:noFill/>
-                    </a:lnR>
-                    <a:lnT w="12700" cap="flat" cmpd="sng" algn="ctr">
-                      <a:solidFill>
-                        <a:schemeClr val="tx1"/>
-                      </a:solidFill>
-                      <a:prstDash val="solid"/>
-                      <a:round/>
-                      <a:headEnd type="none" w="med" len="med"/>
-                      <a:tailEnd type="none" w="med" len="med"/>
-                    </a:lnT>
-                    <a:lnB>
-                      <a:noFill/>
-                    </a:lnB>
-                  </a:tcPr>
-                </a:tc>
-                <a:extLst>
-                  <a:ext uri="{0D108BD9-81ED-4DB2-BD59-A6C34878D82A}">
-                    <a16:rowId xmlns:a16="http://schemas.microsoft.com/office/drawing/2014/main" val="2573069041"/>
-                  </a:ext>
-                </a:extLst>
-              </a:tr>
-              <a:tr h="285193">
-                <a:tc vMerge="1">
-                  <a:txBody>
-                    <a:bodyPr/>
-                    <a:lstStyle/>
-                    <a:p>
-                      <a:endParaRPr lang="en-GB"/>
-                    </a:p>
-                  </a:txBody>
-                  <a:tcPr/>
-                </a:tc>
-                <a:tc>
-                  <a:txBody>
-                    <a:bodyPr/>
-                    <a:lstStyle/>
-                    <a:p>
-                      <a:pPr algn="l" fontAlgn="ctr"/>
-                      <a:r>
-                        <a:rPr lang="en-GB" sz="1400" b="1" dirty="0" err="1">
-                          <a:effectLst/>
-                          <a:latin typeface="Open Sans" panose="020B0606030504020204" pitchFamily="34" charset="0"/>
-                        </a:rPr>
-                        <a:t>geom_path</a:t>
-                      </a:r>
-                      <a:r>
-                        <a:rPr lang="en-GB" sz="1400" b="1" dirty="0">
-                          <a:effectLst/>
-                          <a:latin typeface="Open Sans" panose="020B0606030504020204" pitchFamily="34" charset="0"/>
-                        </a:rPr>
-                        <a:t>()</a:t>
-                      </a:r>
-                      <a:endParaRPr lang="en-GB" sz="1400" dirty="0">
-                        <a:effectLst/>
-                        <a:latin typeface="Open Sans" panose="020B0606030504020204" pitchFamily="34" charset="0"/>
-                      </a:endParaRPr>
-                    </a:p>
-                  </a:txBody>
-                  <a:tcPr marL="28978" marR="28978" marT="40569" marB="40569" anchor="ctr">
-                    <a:lnL>
-                      <a:noFill/>
-                    </a:lnL>
-                    <a:lnR>
-                      <a:noFill/>
-                    </a:lnR>
-                    <a:lnT>
-                      <a:noFill/>
-                    </a:lnT>
-                    <a:lnB w="12700" cap="flat" cmpd="sng" algn="ctr">
-                      <a:solidFill>
-                        <a:schemeClr val="tx1"/>
-                      </a:solidFill>
-                      <a:prstDash val="solid"/>
-                      <a:round/>
-                      <a:headEnd type="none" w="med" len="med"/>
-                      <a:tailEnd type="none" w="med" len="med"/>
-                    </a:lnB>
-                  </a:tcPr>
-                </a:tc>
-                <a:tc>
-                  <a:txBody>
-                    <a:bodyPr/>
-                    <a:lstStyle/>
-                    <a:p>
-                      <a:pPr algn="l" fontAlgn="ctr"/>
-                      <a:r>
-                        <a:rPr lang="en-GB" sz="1400" dirty="0">
-                          <a:effectLst/>
-                          <a:latin typeface="Open Sans" panose="020B0606030504020204" pitchFamily="34" charset="0"/>
-                        </a:rPr>
-                        <a:t>Connect observations based on the order which they appear in the data.</a:t>
-                      </a:r>
-                    </a:p>
-                  </a:txBody>
-                  <a:tcPr marL="28978" marR="28978" marT="40569" marB="40569" anchor="ctr">
-                    <a:lnL>
-                      <a:noFill/>
-                    </a:lnL>
-                    <a:lnR>
-                      <a:noFill/>
-                    </a:lnR>
-                    <a:lnT>
-                      <a:noFill/>
-                    </a:lnT>
-                    <a:lnB w="12700" cap="flat" cmpd="sng" algn="ctr">
-                      <a:solidFill>
-                        <a:schemeClr val="tx1"/>
-                      </a:solidFill>
-                      <a:prstDash val="solid"/>
-                      <a:round/>
-                      <a:headEnd type="none" w="med" len="med"/>
-                      <a:tailEnd type="none" w="med" len="med"/>
-                    </a:lnB>
-                  </a:tcPr>
-                </a:tc>
-                <a:extLst>
-                  <a:ext uri="{0D108BD9-81ED-4DB2-BD59-A6C34878D82A}">
-                    <a16:rowId xmlns:a16="http://schemas.microsoft.com/office/drawing/2014/main" val="2122322100"/>
-                  </a:ext>
-                </a:extLst>
-              </a:tr>
-              <a:tr h="813630">
-                <a:tc>
-                  <a:txBody>
-                    <a:bodyPr/>
-                    <a:lstStyle/>
-                    <a:p>
-                      <a:pPr algn="l" fontAlgn="ctr"/>
-                      <a:r>
-                        <a:rPr lang="en-GB" sz="1400">
-                          <a:effectLst/>
-                          <a:latin typeface="Open Sans" panose="020B0606030504020204" pitchFamily="34" charset="0"/>
-                        </a:rPr>
-                        <a:t>Other</a:t>
-                      </a:r>
-                    </a:p>
-                  </a:txBody>
-                  <a:tcPr marL="28978" marR="28978" marT="40569" marB="40569" anchor="ctr">
-                    <a:lnL>
-                      <a:noFill/>
-                    </a:lnL>
-                    <a:lnR>
-                      <a:noFill/>
-                    </a:lnR>
-                    <a:lnT>
-                      <a:noFill/>
-                    </a:lnT>
-                    <a:lnB>
-                      <a:noFill/>
-                    </a:lnB>
-                  </a:tcPr>
-                </a:tc>
-                <a:tc>
-                  <a:txBody>
-                    <a:bodyPr/>
-                    <a:lstStyle/>
-                    <a:p>
-                      <a:pPr algn="l" fontAlgn="ctr"/>
-                      <a:r>
-                        <a:rPr lang="en-GB" sz="1400" b="1" dirty="0" err="1">
-                          <a:effectLst/>
-                          <a:latin typeface="Open Sans" panose="020B0606030504020204" pitchFamily="34" charset="0"/>
-                        </a:rPr>
-                        <a:t>geom_smooth</a:t>
-                      </a:r>
-                      <a:r>
-                        <a:rPr lang="en-GB" sz="1400" b="1" dirty="0">
-                          <a:effectLst/>
-                          <a:latin typeface="Open Sans" panose="020B0606030504020204" pitchFamily="34" charset="0"/>
-                        </a:rPr>
-                        <a:t>()</a:t>
-                      </a:r>
-                      <a:endParaRPr lang="en-GB" sz="1400" dirty="0">
-                        <a:effectLst/>
-                        <a:latin typeface="Open Sans" panose="020B0606030504020204" pitchFamily="34" charset="0"/>
-                      </a:endParaRPr>
-                    </a:p>
-                  </a:txBody>
-                  <a:tcPr marL="28978" marR="28978" marT="40569" marB="40569" anchor="ctr">
-                    <a:lnL>
-                      <a:noFill/>
-                    </a:lnL>
-                    <a:lnR>
-                      <a:noFill/>
-                    </a:lnR>
-                    <a:lnT w="12700" cap="flat" cmpd="sng" algn="ctr">
-                      <a:solidFill>
-                        <a:schemeClr val="tx1"/>
-                      </a:solidFill>
-                      <a:prstDash val="solid"/>
-                      <a:round/>
-                      <a:headEnd type="none" w="med" len="med"/>
-                      <a:tailEnd type="none" w="med" len="med"/>
-                    </a:lnT>
-                    <a:lnB>
-                      <a:noFill/>
-                    </a:lnB>
-                  </a:tcPr>
-                </a:tc>
-                <a:tc>
-                  <a:txBody>
-                    <a:bodyPr/>
-                    <a:lstStyle/>
-                    <a:p>
-                      <a:pPr algn="l" fontAlgn="ctr"/>
-                      <a:r>
-                        <a:rPr lang="en-GB" sz="1400" dirty="0">
-                          <a:effectLst/>
-                          <a:latin typeface="Open Sans" panose="020B0606030504020204" pitchFamily="34" charset="0"/>
-                        </a:rPr>
-                        <a:t>Aiding in the visualisation of patterns/smoothed models where overplotting (large numbers of data points overlapping in a single area) is an issue.</a:t>
-                      </a:r>
-                    </a:p>
-                  </a:txBody>
-                  <a:tcPr marL="28978" marR="28978" marT="40569" marB="40569" anchor="ctr">
-                    <a:lnL>
-                      <a:noFill/>
-                    </a:lnL>
-                    <a:lnR>
-                      <a:noFill/>
-                    </a:lnR>
-                    <a:lnT w="12700" cap="flat" cmpd="sng" algn="ctr">
-                      <a:solidFill>
-                        <a:schemeClr val="tx1"/>
-                      </a:solidFill>
-                      <a:prstDash val="solid"/>
-                      <a:round/>
-                      <a:headEnd type="none" w="med" len="med"/>
-                      <a:tailEnd type="none" w="med" len="med"/>
-                    </a:lnT>
-                    <a:lnB>
-                      <a:noFill/>
-                    </a:lnB>
-                  </a:tcPr>
-                </a:tc>
-                <a:extLst>
-                  <a:ext uri="{0D108BD9-81ED-4DB2-BD59-A6C34878D82A}">
-                    <a16:rowId xmlns:a16="http://schemas.microsoft.com/office/drawing/2014/main" val="1081080904"/>
-                  </a:ext>
-                </a:extLst>
-              </a:tr>
-            </a:tbl>
-          </a:graphicData>
-        </a:graphic>
-      </p:graphicFrame>
+        </p:nvSpPr>
+        <p:spPr/>
+        <p:txBody>
+          <a:bodyPr/>
+          <a:lstStyle/>
+          <a:p>
+            <a:r>
+              <a:rPr lang="en-GB" dirty="0"/>
+              <a:t>Scales affect how the aesthetics are set up and control visual properties of the data values.</a:t>
+            </a:r>
+          </a:p>
+          <a:p>
+            <a:r>
+              <a:rPr lang="en-GB" dirty="0"/>
+              <a:t>Functions of the type scale_&lt;name&gt;_&lt;</a:t>
+            </a:r>
+            <a:r>
+              <a:rPr lang="en-GB" dirty="0" err="1"/>
+              <a:t>data_type</a:t>
+            </a:r>
+            <a:r>
+              <a:rPr lang="en-GB" dirty="0"/>
+              <a:t>&gt;</a:t>
+            </a:r>
+          </a:p>
+          <a:p>
+            <a:pPr lvl="1"/>
+            <a:r>
+              <a:rPr lang="en-GB" dirty="0"/>
+              <a:t>E.g. </a:t>
+            </a:r>
+            <a:r>
+              <a:rPr lang="en-GB" dirty="0" err="1">
+                <a:highlight>
+                  <a:srgbClr val="C0C0C0"/>
+                </a:highlight>
+                <a:latin typeface="Consolas" panose="020B0609020204030204" pitchFamily="49" charset="0"/>
+              </a:rPr>
+              <a:t>scale_x_contiuous</a:t>
+            </a:r>
+            <a:r>
+              <a:rPr lang="en-GB" dirty="0">
+                <a:highlight>
+                  <a:srgbClr val="C0C0C0"/>
+                </a:highlight>
+                <a:latin typeface="Consolas" panose="020B0609020204030204" pitchFamily="49" charset="0"/>
+              </a:rPr>
+              <a:t>()</a:t>
+            </a:r>
+            <a:r>
+              <a:rPr lang="en-GB" dirty="0"/>
+              <a:t>,  </a:t>
+            </a:r>
+            <a:r>
+              <a:rPr lang="en-GB" dirty="0" err="1">
+                <a:highlight>
+                  <a:srgbClr val="C0C0C0"/>
+                </a:highlight>
+                <a:latin typeface="Consolas" panose="020B0609020204030204" pitchFamily="49" charset="0"/>
+              </a:rPr>
+              <a:t>scale_y_discrete</a:t>
+            </a:r>
+            <a:r>
+              <a:rPr lang="en-GB" dirty="0">
+                <a:highlight>
+                  <a:srgbClr val="C0C0C0"/>
+                </a:highlight>
+                <a:latin typeface="Consolas" panose="020B0609020204030204" pitchFamily="49" charset="0"/>
+              </a:rPr>
+              <a:t>(), </a:t>
+            </a:r>
+            <a:r>
+              <a:rPr lang="en-GB" dirty="0" err="1">
+                <a:highlight>
+                  <a:srgbClr val="C0C0C0"/>
+                </a:highlight>
+                <a:latin typeface="Consolas" panose="020B0609020204030204" pitchFamily="49" charset="0"/>
+              </a:rPr>
+              <a:t>scale_colour_continuous</a:t>
+            </a:r>
+            <a:r>
+              <a:rPr lang="en-GB" dirty="0">
+                <a:highlight>
+                  <a:srgbClr val="C0C0C0"/>
+                </a:highlight>
+                <a:latin typeface="Consolas" panose="020B0609020204030204" pitchFamily="49" charset="0"/>
+              </a:rPr>
+              <a:t>()</a:t>
+            </a:r>
+          </a:p>
+          <a:p>
+            <a:r>
+              <a:rPr lang="en-GB" dirty="0"/>
+              <a:t>Within these you can define things such as: limits of the axes, labels and axis titles, colour palette, </a:t>
+            </a:r>
+          </a:p>
+          <a:p>
+            <a:endParaRPr lang="en-GB" dirty="0"/>
+          </a:p>
+          <a:p>
+            <a:r>
+              <a:rPr lang="en-GB" dirty="0"/>
+              <a:t>There are </a:t>
+            </a:r>
+            <a:r>
+              <a:rPr lang="en-GB" i="1" dirty="0"/>
+              <a:t>many, many</a:t>
+            </a:r>
+            <a:r>
+              <a:rPr lang="en-GB" dirty="0"/>
+              <a:t> scale options/ functions – do not try and memorise them all, just be aware that they are available!</a:t>
+            </a:r>
+          </a:p>
+        </p:txBody>
+      </p:sp>
     </p:spTree>
     <p:extLst>
       <p:ext uri="{BB962C8B-B14F-4D97-AF65-F5344CB8AC3E}">
-        <p14:creationId xmlns:p14="http://schemas.microsoft.com/office/powerpoint/2010/main" val="2359373971"/>
+        <p14:creationId xmlns:p14="http://schemas.microsoft.com/office/powerpoint/2010/main" val="3295144012"/>
       </p:ext>
     </p:extLst>
   </p:cSld>
@@ -7307,7 +7797,7 @@
           <p:cNvPr id="2" name="Title 1">
             <a:extLst>
               <a:ext uri="{FF2B5EF4-FFF2-40B4-BE49-F238E27FC236}">
-                <a16:creationId xmlns:a16="http://schemas.microsoft.com/office/drawing/2014/main" id="{DC6C9B58-EE8B-43B7-9EA7-4FB5C0C89F6C}"/>
+                <a16:creationId xmlns:a16="http://schemas.microsoft.com/office/drawing/2014/main" id="{17BE9EC1-77AE-48E9-993B-FE6712862D5B}"/>
               </a:ext>
             </a:extLst>
           </p:cNvPr>
@@ -7325,7 +7815,7 @@
           <a:p>
             <a:r>
               <a:rPr lang="en-GB" dirty="0"/>
-              <a:t>Geometry layers</a:t>
+              <a:t>Exercise 3</a:t>
             </a:r>
           </a:p>
         </p:txBody>
@@ -7335,7 +7825,7 @@
           <p:cNvPr id="3" name="Content Placeholder 2">
             <a:extLst>
               <a:ext uri="{FF2B5EF4-FFF2-40B4-BE49-F238E27FC236}">
-                <a16:creationId xmlns:a16="http://schemas.microsoft.com/office/drawing/2014/main" id="{CF0EAE4F-AEB3-4AC6-B3CF-78C925F99AFB}"/>
+                <a16:creationId xmlns:a16="http://schemas.microsoft.com/office/drawing/2014/main" id="{CAEEA666-751C-409B-8169-009F39608875}"/>
               </a:ext>
             </a:extLst>
           </p:cNvPr>
@@ -7353,505 +7843,15 @@
           <a:p>
             <a:r>
               <a:rPr lang="en-GB" dirty="0"/>
-              <a:t>Can add multiple </a:t>
-            </a:r>
-            <a:r>
-              <a:rPr lang="en-GB" dirty="0" err="1"/>
-              <a:t>geom</a:t>
-            </a:r>
-            <a:r>
-              <a:rPr lang="en-GB" dirty="0"/>
-              <a:t> layers to one plot: </a:t>
+              <a:t> exercise 3 in the exercises file, or the exercise that comes after the “scale” section on the aesthetics page of the app</a:t>
             </a:r>
           </a:p>
         </p:txBody>
       </p:sp>
-      <p:sp>
-        <p:nvSpPr>
-          <p:cNvPr id="5" name="Rectangle 3">
-            <a:extLst>
-              <a:ext uri="{FF2B5EF4-FFF2-40B4-BE49-F238E27FC236}">
-                <a16:creationId xmlns:a16="http://schemas.microsoft.com/office/drawing/2014/main" id="{8E0B1421-B71B-4A45-8B58-546B01F768DE}"/>
-              </a:ext>
-            </a:extLst>
-          </p:cNvPr>
-          <p:cNvSpPr>
-            <a:spLocks noChangeArrowheads="1"/>
-          </p:cNvSpPr>
-          <p:nvPr/>
-        </p:nvSpPr>
-        <p:spPr bwMode="auto">
-          <a:xfrm>
-            <a:off x="511278" y="2633596"/>
-            <a:ext cx="5132438" cy="1295206"/>
-          </a:xfrm>
-          <a:prstGeom prst="rect">
-            <a:avLst/>
-          </a:prstGeom>
-          <a:solidFill>
-            <a:srgbClr val="F5F5F5"/>
-          </a:solidFill>
-          <a:ln>
-            <a:noFill/>
-          </a:ln>
-          <a:effectLst/>
-          <a:extLst>
-            <a:ext uri="{91240B29-F687-4F45-9708-019B960494DF}">
-              <a14:hiddenLine xmlns:a14="http://schemas.microsoft.com/office/drawing/2010/main" w="9525">
-                <a:solidFill>
-                  <a:schemeClr val="tx1"/>
-                </a:solidFill>
-                <a:miter lim="800000"/>
-                <a:headEnd/>
-                <a:tailEnd/>
-              </a14:hiddenLine>
-            </a:ext>
-            <a:ext uri="{AF507438-7753-43E0-B8FC-AC1667EBCBE1}">
-              <a14:hiddenEffects xmlns:a14="http://schemas.microsoft.com/office/drawing/2010/main">
-                <a:effectLst>
-                  <a:outerShdw dist="35921" dir="2700000" algn="ctr" rotWithShape="0">
-                    <a:schemeClr val="bg2"/>
-                  </a:outerShdw>
-                </a:effectLst>
-              </a14:hiddenEffects>
-            </a:ext>
-          </a:extLst>
-        </p:spPr>
-        <p:txBody>
-          <a:bodyPr vert="horz" wrap="square" lIns="0" tIns="0" rIns="0" bIns="63480" numCol="1" anchor="ctr" anchorCtr="0" compatLnSpc="1">
-            <a:prstTxWarp prst="textNoShape">
-              <a:avLst/>
-            </a:prstTxWarp>
-            <a:spAutoFit/>
-          </a:bodyPr>
-          <a:lstStyle/>
-          <a:p>
-            <a:pPr marL="0" marR="0" lvl="0" indent="0" algn="l" defTabSz="914400" rtl="0" eaLnBrk="0" fontAlgn="base" latinLnBrk="0" hangingPunct="0">
-              <a:lnSpc>
-                <a:spcPct val="100000"/>
-              </a:lnSpc>
-              <a:spcBef>
-                <a:spcPct val="0"/>
-              </a:spcBef>
-              <a:spcAft>
-                <a:spcPct val="0"/>
-              </a:spcAft>
-              <a:buClrTx/>
-              <a:buSzTx/>
-              <a:buFontTx/>
-              <a:buNone/>
-              <a:tabLst/>
-            </a:pPr>
-            <a:r>
-              <a:rPr kumimoji="0" lang="en-US" altLang="en-US" sz="1600" b="0" i="0" u="none" strike="noStrike" cap="none" normalizeH="0" baseline="0" dirty="0" err="1">
-                <a:ln>
-                  <a:noFill/>
-                </a:ln>
-                <a:solidFill>
-                  <a:srgbClr val="333333"/>
-                </a:solidFill>
-                <a:effectLst/>
-                <a:latin typeface="Courier New" panose="02070309020205020404" pitchFamily="49" charset="0"/>
-                <a:cs typeface="Courier New" panose="02070309020205020404" pitchFamily="49" charset="0"/>
-              </a:rPr>
-              <a:t>ggplot</a:t>
-            </a:r>
-            <a:r>
-              <a:rPr kumimoji="0" lang="en-US" altLang="en-US" sz="1600" b="0" i="0" u="none" strike="noStrike" cap="none" normalizeH="0" baseline="0" dirty="0">
-                <a:ln>
-                  <a:noFill/>
-                </a:ln>
-                <a:solidFill>
-                  <a:srgbClr val="333333"/>
-                </a:solidFill>
-                <a:effectLst/>
-                <a:latin typeface="Courier New" panose="02070309020205020404" pitchFamily="49" charset="0"/>
-                <a:cs typeface="Courier New" panose="02070309020205020404" pitchFamily="49" charset="0"/>
-              </a:rPr>
-              <a:t>(data = </a:t>
-            </a:r>
-            <a:r>
-              <a:rPr kumimoji="0" lang="en-US" altLang="en-US" sz="1600" b="0" i="0" u="none" strike="noStrike" cap="none" normalizeH="0" baseline="0" dirty="0" err="1">
-                <a:ln>
-                  <a:noFill/>
-                </a:ln>
-                <a:solidFill>
-                  <a:srgbClr val="333333"/>
-                </a:solidFill>
-                <a:effectLst/>
-                <a:latin typeface="Courier New" panose="02070309020205020404" pitchFamily="49" charset="0"/>
-                <a:cs typeface="Courier New" panose="02070309020205020404" pitchFamily="49" charset="0"/>
-              </a:rPr>
-              <a:t>car_data</a:t>
-            </a:r>
-            <a:r>
-              <a:rPr kumimoji="0" lang="en-US" altLang="en-US" sz="1600" b="0" i="0" u="none" strike="noStrike" cap="none" normalizeH="0" baseline="0" dirty="0">
-                <a:ln>
-                  <a:noFill/>
-                </a:ln>
-                <a:solidFill>
-                  <a:srgbClr val="333333"/>
-                </a:solidFill>
-                <a:effectLst/>
-                <a:latin typeface="Courier New" panose="02070309020205020404" pitchFamily="49" charset="0"/>
-                <a:cs typeface="Courier New" panose="02070309020205020404" pitchFamily="49" charset="0"/>
-              </a:rPr>
-              <a:t>, mapping = </a:t>
-            </a:r>
-          </a:p>
-          <a:p>
-            <a:pPr marL="0" marR="0" lvl="0" indent="0" algn="l" defTabSz="914400" rtl="0" eaLnBrk="0" fontAlgn="base" latinLnBrk="0" hangingPunct="0">
-              <a:lnSpc>
-                <a:spcPct val="100000"/>
-              </a:lnSpc>
-              <a:spcBef>
-                <a:spcPct val="0"/>
-              </a:spcBef>
-              <a:spcAft>
-                <a:spcPct val="0"/>
-              </a:spcAft>
-              <a:buClrTx/>
-              <a:buSzTx/>
-              <a:buFontTx/>
-              <a:buNone/>
-              <a:tabLst/>
-            </a:pPr>
-            <a:r>
-              <a:rPr kumimoji="0" lang="en-US" altLang="en-US" sz="1600" b="0" i="0" u="none" strike="noStrike" cap="none" normalizeH="0" baseline="0" dirty="0">
-                <a:ln>
-                  <a:noFill/>
-                </a:ln>
-                <a:solidFill>
-                  <a:srgbClr val="333333"/>
-                </a:solidFill>
-                <a:effectLst/>
-                <a:latin typeface="Courier New" panose="02070309020205020404" pitchFamily="49" charset="0"/>
-                <a:cs typeface="Courier New" panose="02070309020205020404" pitchFamily="49" charset="0"/>
-              </a:rPr>
-              <a:t>	</a:t>
-            </a:r>
-            <a:r>
-              <a:rPr kumimoji="0" lang="en-US" altLang="en-US" sz="1600" b="0" i="0" u="none" strike="noStrike" cap="none" normalizeH="0" baseline="0" dirty="0" err="1">
-                <a:ln>
-                  <a:noFill/>
-                </a:ln>
-                <a:solidFill>
-                  <a:srgbClr val="333333"/>
-                </a:solidFill>
-                <a:effectLst/>
-                <a:latin typeface="Courier New" panose="02070309020205020404" pitchFamily="49" charset="0"/>
-                <a:cs typeface="Courier New" panose="02070309020205020404" pitchFamily="49" charset="0"/>
-              </a:rPr>
-              <a:t>aes</a:t>
-            </a:r>
-            <a:r>
-              <a:rPr kumimoji="0" lang="en-US" altLang="en-US" sz="1600" b="0" i="0" u="none" strike="noStrike" cap="none" normalizeH="0" baseline="0" dirty="0">
-                <a:ln>
-                  <a:noFill/>
-                </a:ln>
-                <a:solidFill>
-                  <a:srgbClr val="333333"/>
-                </a:solidFill>
-                <a:effectLst/>
-                <a:latin typeface="Courier New" panose="02070309020205020404" pitchFamily="49" charset="0"/>
-                <a:cs typeface="Courier New" panose="02070309020205020404" pitchFamily="49" charset="0"/>
-              </a:rPr>
-              <a:t>(x = </a:t>
-            </a:r>
-            <a:r>
-              <a:rPr kumimoji="0" lang="en-US" altLang="en-US" sz="1600" b="0" i="0" u="none" strike="noStrike" cap="none" normalizeH="0" baseline="0" dirty="0" err="1">
-                <a:ln>
-                  <a:noFill/>
-                </a:ln>
-                <a:solidFill>
-                  <a:srgbClr val="333333"/>
-                </a:solidFill>
-                <a:effectLst/>
-                <a:latin typeface="Courier New" panose="02070309020205020404" pitchFamily="49" charset="0"/>
-                <a:cs typeface="Courier New" panose="02070309020205020404" pitchFamily="49" charset="0"/>
-              </a:rPr>
-              <a:t>displ</a:t>
-            </a:r>
-            <a:r>
-              <a:rPr kumimoji="0" lang="en-US" altLang="en-US" sz="1600" b="0" i="0" u="none" strike="noStrike" cap="none" normalizeH="0" baseline="0" dirty="0">
-                <a:ln>
-                  <a:noFill/>
-                </a:ln>
-                <a:solidFill>
-                  <a:srgbClr val="333333"/>
-                </a:solidFill>
-                <a:effectLst/>
-                <a:latin typeface="Courier New" panose="02070309020205020404" pitchFamily="49" charset="0"/>
-                <a:cs typeface="Courier New" panose="02070309020205020404" pitchFamily="49" charset="0"/>
-              </a:rPr>
-              <a:t>, y = </a:t>
-            </a:r>
-            <a:r>
-              <a:rPr kumimoji="0" lang="en-US" altLang="en-US" sz="1600" b="0" i="0" u="none" strike="noStrike" cap="none" normalizeH="0" baseline="0" dirty="0" err="1">
-                <a:ln>
-                  <a:noFill/>
-                </a:ln>
-                <a:solidFill>
-                  <a:srgbClr val="333333"/>
-                </a:solidFill>
-                <a:effectLst/>
-                <a:latin typeface="Courier New" panose="02070309020205020404" pitchFamily="49" charset="0"/>
-                <a:cs typeface="Courier New" panose="02070309020205020404" pitchFamily="49" charset="0"/>
-              </a:rPr>
-              <a:t>hwy</a:t>
-            </a:r>
-            <a:r>
-              <a:rPr kumimoji="0" lang="en-US" altLang="en-US" sz="1600" b="0" i="0" u="none" strike="noStrike" cap="none" normalizeH="0" baseline="0" dirty="0">
-                <a:ln>
-                  <a:noFill/>
-                </a:ln>
-                <a:solidFill>
-                  <a:srgbClr val="333333"/>
-                </a:solidFill>
-                <a:effectLst/>
-                <a:latin typeface="Courier New" panose="02070309020205020404" pitchFamily="49" charset="0"/>
-                <a:cs typeface="Courier New" panose="02070309020205020404" pitchFamily="49" charset="0"/>
-              </a:rPr>
-              <a:t>)) + </a:t>
-            </a:r>
-          </a:p>
-          <a:p>
-            <a:pPr marL="0" marR="0" lvl="0" indent="0" algn="l" defTabSz="914400" rtl="0" eaLnBrk="0" fontAlgn="base" latinLnBrk="0" hangingPunct="0">
-              <a:lnSpc>
-                <a:spcPct val="100000"/>
-              </a:lnSpc>
-              <a:spcBef>
-                <a:spcPct val="0"/>
-              </a:spcBef>
-              <a:spcAft>
-                <a:spcPct val="0"/>
-              </a:spcAft>
-              <a:buClrTx/>
-              <a:buSzTx/>
-              <a:buFontTx/>
-              <a:buNone/>
-              <a:tabLst/>
-            </a:pPr>
-            <a:r>
-              <a:rPr kumimoji="0" lang="en-US" altLang="en-US" sz="1600" b="0" i="0" u="none" strike="noStrike" cap="none" normalizeH="0" baseline="0" dirty="0">
-                <a:ln>
-                  <a:noFill/>
-                </a:ln>
-                <a:solidFill>
-                  <a:srgbClr val="333333"/>
-                </a:solidFill>
-                <a:effectLst/>
-                <a:latin typeface="Courier New" panose="02070309020205020404" pitchFamily="49" charset="0"/>
-                <a:cs typeface="Courier New" panose="02070309020205020404" pitchFamily="49" charset="0"/>
-              </a:rPr>
-              <a:t>  </a:t>
-            </a:r>
-            <a:r>
-              <a:rPr kumimoji="0" lang="en-US" altLang="en-US" sz="1600" b="0" i="0" u="none" strike="noStrike" cap="none" normalizeH="0" baseline="0" dirty="0" err="1">
-                <a:ln>
-                  <a:noFill/>
-                </a:ln>
-                <a:solidFill>
-                  <a:srgbClr val="333333"/>
-                </a:solidFill>
-                <a:effectLst/>
-                <a:latin typeface="Courier New" panose="02070309020205020404" pitchFamily="49" charset="0"/>
-                <a:cs typeface="Courier New" panose="02070309020205020404" pitchFamily="49" charset="0"/>
-              </a:rPr>
-              <a:t>geom_point</a:t>
-            </a:r>
-            <a:r>
-              <a:rPr kumimoji="0" lang="en-US" altLang="en-US" sz="1600" b="0" i="0" u="none" strike="noStrike" cap="none" normalizeH="0" baseline="0" dirty="0">
-                <a:ln>
-                  <a:noFill/>
-                </a:ln>
-                <a:solidFill>
-                  <a:srgbClr val="333333"/>
-                </a:solidFill>
-                <a:effectLst/>
-                <a:latin typeface="Courier New" panose="02070309020205020404" pitchFamily="49" charset="0"/>
-                <a:cs typeface="Courier New" panose="02070309020205020404" pitchFamily="49" charset="0"/>
-              </a:rPr>
-              <a:t>(position = </a:t>
-            </a:r>
-            <a:r>
-              <a:rPr kumimoji="0" lang="en-US" altLang="en-US" sz="1600" b="0" i="0" u="none" strike="noStrike" cap="none" normalizeH="0" baseline="0" dirty="0" err="1">
-                <a:ln>
-                  <a:noFill/>
-                </a:ln>
-                <a:solidFill>
-                  <a:srgbClr val="333333"/>
-                </a:solidFill>
-                <a:effectLst/>
-                <a:latin typeface="Courier New" panose="02070309020205020404" pitchFamily="49" charset="0"/>
-                <a:cs typeface="Courier New" panose="02070309020205020404" pitchFamily="49" charset="0"/>
-              </a:rPr>
-              <a:t>position_jitter</a:t>
-            </a:r>
-            <a:r>
-              <a:rPr kumimoji="0" lang="en-US" altLang="en-US" sz="1600" b="0" i="0" u="none" strike="noStrike" cap="none" normalizeH="0" baseline="0" dirty="0">
-                <a:ln>
-                  <a:noFill/>
-                </a:ln>
-                <a:solidFill>
-                  <a:srgbClr val="333333"/>
-                </a:solidFill>
-                <a:effectLst/>
-                <a:latin typeface="Courier New" panose="02070309020205020404" pitchFamily="49" charset="0"/>
-                <a:cs typeface="Courier New" panose="02070309020205020404" pitchFamily="49" charset="0"/>
-              </a:rPr>
-              <a:t>(),alpha = 0.5) + </a:t>
-            </a:r>
-          </a:p>
-          <a:p>
-            <a:pPr marL="0" marR="0" lvl="0" indent="0" algn="l" defTabSz="914400" rtl="0" eaLnBrk="0" fontAlgn="base" latinLnBrk="0" hangingPunct="0">
-              <a:lnSpc>
-                <a:spcPct val="100000"/>
-              </a:lnSpc>
-              <a:spcBef>
-                <a:spcPct val="0"/>
-              </a:spcBef>
-              <a:spcAft>
-                <a:spcPct val="0"/>
-              </a:spcAft>
-              <a:buClrTx/>
-              <a:buSzTx/>
-              <a:buFontTx/>
-              <a:buNone/>
-              <a:tabLst/>
-            </a:pPr>
-            <a:r>
-              <a:rPr kumimoji="0" lang="en-US" altLang="en-US" sz="1600" b="0" i="0" u="none" strike="noStrike" cap="none" normalizeH="0" baseline="0" dirty="0" err="1">
-                <a:ln>
-                  <a:noFill/>
-                </a:ln>
-                <a:solidFill>
-                  <a:srgbClr val="333333"/>
-                </a:solidFill>
-                <a:effectLst/>
-                <a:latin typeface="Courier New" panose="02070309020205020404" pitchFamily="49" charset="0"/>
-                <a:cs typeface="Courier New" panose="02070309020205020404" pitchFamily="49" charset="0"/>
-              </a:rPr>
-              <a:t>geom_smooth</a:t>
-            </a:r>
-            <a:r>
-              <a:rPr kumimoji="0" lang="en-US" altLang="en-US" sz="1600" b="0" i="0" u="none" strike="noStrike" cap="none" normalizeH="0" baseline="0" dirty="0">
-                <a:ln>
-                  <a:noFill/>
-                </a:ln>
-                <a:solidFill>
-                  <a:srgbClr val="333333"/>
-                </a:solidFill>
-                <a:effectLst/>
-                <a:latin typeface="Courier New" panose="02070309020205020404" pitchFamily="49" charset="0"/>
-                <a:cs typeface="Courier New" panose="02070309020205020404" pitchFamily="49" charset="0"/>
-              </a:rPr>
-              <a:t>(</a:t>
-            </a:r>
-            <a:r>
-              <a:rPr kumimoji="0" lang="en-US" altLang="en-US" sz="1600" b="0" i="0" u="none" strike="noStrike" cap="none" normalizeH="0" baseline="0" dirty="0" err="1">
-                <a:ln>
-                  <a:noFill/>
-                </a:ln>
-                <a:solidFill>
-                  <a:srgbClr val="333333"/>
-                </a:solidFill>
-                <a:effectLst/>
-                <a:latin typeface="Courier New" panose="02070309020205020404" pitchFamily="49" charset="0"/>
-                <a:cs typeface="Courier New" panose="02070309020205020404" pitchFamily="49" charset="0"/>
-              </a:rPr>
-              <a:t>colour</a:t>
-            </a:r>
-            <a:r>
-              <a:rPr kumimoji="0" lang="en-US" altLang="en-US" sz="1600" b="0" i="0" u="none" strike="noStrike" cap="none" normalizeH="0" baseline="0" dirty="0">
-                <a:ln>
-                  <a:noFill/>
-                </a:ln>
-                <a:solidFill>
-                  <a:srgbClr val="333333"/>
-                </a:solidFill>
-                <a:effectLst/>
-                <a:latin typeface="Courier New" panose="02070309020205020404" pitchFamily="49" charset="0"/>
-                <a:cs typeface="Courier New" panose="02070309020205020404" pitchFamily="49" charset="0"/>
-              </a:rPr>
-              <a:t> = "#76B843")</a:t>
-            </a:r>
-            <a:r>
-              <a:rPr kumimoji="0" lang="en-US" altLang="en-US" sz="1200" b="0" i="0" u="none" strike="noStrike" cap="none" normalizeH="0" baseline="0" dirty="0">
-                <a:ln>
-                  <a:noFill/>
-                </a:ln>
-                <a:solidFill>
-                  <a:schemeClr val="tx1"/>
-                </a:solidFill>
-                <a:effectLst/>
-              </a:rPr>
-              <a:t> </a:t>
-            </a:r>
-            <a:endParaRPr kumimoji="0" lang="en-US" altLang="en-US" sz="3600" b="0" i="0" u="none" strike="noStrike" cap="none" normalizeH="0" baseline="0" dirty="0">
-              <a:ln>
-                <a:noFill/>
-              </a:ln>
-              <a:solidFill>
-                <a:schemeClr val="tx1"/>
-              </a:solidFill>
-              <a:effectLst/>
-              <a:latin typeface="Arial" panose="020B0604020202020204" pitchFamily="34" charset="0"/>
-            </a:endParaRPr>
-          </a:p>
-        </p:txBody>
-      </p:sp>
-      <p:pic>
-        <p:nvPicPr>
-          <p:cNvPr id="10245" name="Picture 5">
-            <a:extLst>
-              <a:ext uri="{FF2B5EF4-FFF2-40B4-BE49-F238E27FC236}">
-                <a16:creationId xmlns:a16="http://schemas.microsoft.com/office/drawing/2014/main" id="{EED85853-B63A-4920-94F3-A6D78E0D9570}"/>
-              </a:ext>
-            </a:extLst>
-          </p:cNvPr>
-          <p:cNvPicPr>
-            <a:picLocks noChangeAspect="1" noChangeArrowheads="1"/>
-          </p:cNvPicPr>
-          <p:nvPr/>
-        </p:nvPicPr>
-        <p:blipFill>
-          <a:blip r:embed="rId2">
-            <a:extLst>
-              <a:ext uri="{28A0092B-C50C-407E-A947-70E740481C1C}">
-                <a14:useLocalDpi xmlns:a14="http://schemas.microsoft.com/office/drawing/2010/main" val="0"/>
-              </a:ext>
-            </a:extLst>
-          </a:blip>
-          <a:srcRect/>
-          <a:stretch>
-            <a:fillRect/>
-          </a:stretch>
-        </p:blipFill>
-        <p:spPr bwMode="auto">
-          <a:xfrm>
-            <a:off x="5970638" y="2317955"/>
-            <a:ext cx="5943600" cy="3657600"/>
-          </a:xfrm>
-          <a:prstGeom prst="rect">
-            <a:avLst/>
-          </a:prstGeom>
-          <a:noFill/>
-          <a:extLst>
-            <a:ext uri="{909E8E84-426E-40DD-AFC4-6F175D3DCCD1}">
-              <a14:hiddenFill xmlns:a14="http://schemas.microsoft.com/office/drawing/2010/main">
-                <a:solidFill>
-                  <a:srgbClr val="FFFFFF"/>
-                </a:solidFill>
-              </a14:hiddenFill>
-            </a:ext>
-          </a:extLst>
-        </p:spPr>
-      </p:pic>
     </p:spTree>
     <p:extLst>
       <p:ext uri="{BB962C8B-B14F-4D97-AF65-F5344CB8AC3E}">
-        <p14:creationId xmlns:p14="http://schemas.microsoft.com/office/powerpoint/2010/main" val="4275950020"/>
+        <p14:creationId xmlns:p14="http://schemas.microsoft.com/office/powerpoint/2010/main" val="2446342836"/>
       </p:ext>
     </p:extLst>
   </p:cSld>
@@ -13039,21 +13039,6 @@
 </file>
 
 <file path=customXml/item1.xml><?xml version="1.0" encoding="utf-8"?>
-<?mso-contentType ?>
-<FormTemplates xmlns="http://schemas.microsoft.com/sharepoint/v3/contenttype/forms">
-  <Display>DocumentLibraryForm</Display>
-  <Edit>DocumentLibraryForm</Edit>
-  <New>DocumentLibraryForm</New>
-</FormTemplates>
-</file>
-
-<file path=customXml/item2.xml><?xml version="1.0" encoding="utf-8"?>
-<p:properties xmlns:p="http://schemas.microsoft.com/office/2006/metadata/properties" xmlns:xsi="http://www.w3.org/2001/XMLSchema-instance" xmlns:pc="http://schemas.microsoft.com/office/infopath/2007/PartnerControls">
-  <documentManagement/>
-</p:properties>
-</file>
-
-<file path=customXml/item3.xml><?xml version="1.0" encoding="utf-8"?>
 <ct:contentTypeSchema xmlns:ct="http://schemas.microsoft.com/office/2006/metadata/contentType" xmlns:ma="http://schemas.microsoft.com/office/2006/metadata/properties/metaAttributes" ct:_="" ma:_="" ma:contentTypeName="Document" ma:contentTypeID="0x010100349E360D75DDE845BD31B7204E9B8E6D" ma:contentTypeVersion="0" ma:contentTypeDescription="Create a new document." ma:contentTypeScope="" ma:versionID="659fdf77c7da3dae286546a3338ab112">
   <xsd:schema xmlns:xsd="http://www.w3.org/2001/XMLSchema" xmlns:xs="http://www.w3.org/2001/XMLSchema" xmlns:p="http://schemas.microsoft.com/office/2006/metadata/properties" targetNamespace="http://schemas.microsoft.com/office/2006/metadata/properties" ma:root="true" ma:fieldsID="7be2570776fbcaa7c7a71900390d2141">
     <xsd:element name="properties">
@@ -13167,10 +13152,33 @@
 </ct:contentTypeSchema>
 </file>
 
+<file path=customXml/item2.xml><?xml version="1.0" encoding="utf-8"?>
+<p:properties xmlns:p="http://schemas.microsoft.com/office/2006/metadata/properties" xmlns:xsi="http://www.w3.org/2001/XMLSchema-instance" xmlns:pc="http://schemas.microsoft.com/office/infopath/2007/PartnerControls">
+  <documentManagement/>
+</p:properties>
+</file>
+
+<file path=customXml/item3.xml><?xml version="1.0" encoding="utf-8"?>
+<?mso-contentType ?>
+<FormTemplates xmlns="http://schemas.microsoft.com/sharepoint/v3/contenttype/forms">
+  <Display>DocumentLibraryForm</Display>
+  <Edit>DocumentLibraryForm</Edit>
+  <New>DocumentLibraryForm</New>
+</FormTemplates>
+</file>
+
 <file path=customXml/itemProps1.xml><?xml version="1.0" encoding="utf-8"?>
-<ds:datastoreItem xmlns:ds="http://schemas.openxmlformats.org/officeDocument/2006/customXml" ds:itemID="{AD6B120D-A0FB-4DD8-992E-3D48283A8AF5}">
+<ds:datastoreItem xmlns:ds="http://schemas.openxmlformats.org/officeDocument/2006/customXml" ds:itemID="{1F1E5AA6-C6AF-4367-93A3-EFA43BF19798}">
   <ds:schemaRefs>
-    <ds:schemaRef ds:uri="http://schemas.microsoft.com/sharepoint/v3/contenttype/forms"/>
+    <ds:schemaRef ds:uri="http://schemas.microsoft.com/office/2006/metadata/contentType"/>
+    <ds:schemaRef ds:uri="http://schemas.microsoft.com/office/2006/metadata/properties/metaAttributes"/>
+    <ds:schemaRef ds:uri="http://www.w3.org/2001/XMLSchema"/>
+    <ds:schemaRef ds:uri="http://schemas.microsoft.com/office/2006/metadata/properties"/>
+    <ds:schemaRef ds:uri="http://schemas.openxmlformats.org/package/2006/metadata/core-properties"/>
+    <ds:schemaRef ds:uri="http://purl.org/dc/elements/1.1/"/>
+    <ds:schemaRef ds:uri="http://purl.org/dc/terms/"/>
+    <ds:schemaRef ds:uri="http://schemas.microsoft.com/internal/obd"/>
+    <ds:schemaRef ds:uri="http://schemas.microsoft.com/office/infopath/2007/PartnerControls"/>
   </ds:schemaRefs>
 </ds:datastoreItem>
 </file>
@@ -13191,17 +13199,9 @@
 </file>
 
 <file path=customXml/itemProps3.xml><?xml version="1.0" encoding="utf-8"?>
-<ds:datastoreItem xmlns:ds="http://schemas.openxmlformats.org/officeDocument/2006/customXml" ds:itemID="{1F1E5AA6-C6AF-4367-93A3-EFA43BF19798}">
+<ds:datastoreItem xmlns:ds="http://schemas.openxmlformats.org/officeDocument/2006/customXml" ds:itemID="{AD6B120D-A0FB-4DD8-992E-3D48283A8AF5}">
   <ds:schemaRefs>
-    <ds:schemaRef ds:uri="http://schemas.microsoft.com/office/2006/metadata/contentType"/>
-    <ds:schemaRef ds:uri="http://schemas.microsoft.com/office/2006/metadata/properties/metaAttributes"/>
-    <ds:schemaRef ds:uri="http://www.w3.org/2001/XMLSchema"/>
-    <ds:schemaRef ds:uri="http://schemas.microsoft.com/office/2006/metadata/properties"/>
-    <ds:schemaRef ds:uri="http://schemas.openxmlformats.org/package/2006/metadata/core-properties"/>
-    <ds:schemaRef ds:uri="http://purl.org/dc/elements/1.1/"/>
-    <ds:schemaRef ds:uri="http://purl.org/dc/terms/"/>
-    <ds:schemaRef ds:uri="http://schemas.microsoft.com/internal/obd"/>
-    <ds:schemaRef ds:uri="http://schemas.microsoft.com/office/infopath/2007/PartnerControls"/>
+    <ds:schemaRef ds:uri="http://schemas.microsoft.com/sharepoint/v3/contenttype/forms"/>
   </ds:schemaRefs>
 </ds:datastoreItem>
 </file>
</xml_diff>

<commit_message>
update ppt. add themes_phs to examples
</commit_message>
<xml_diff>
--- a/Introduction to ggplot.pptx
+++ b/Introduction to ggplot.pptx
@@ -5,7 +5,7 @@
     <p:sldMasterId id="2147483679" r:id="rId4"/>
   </p:sldMasterIdLst>
   <p:notesMasterIdLst>
-    <p:notesMasterId r:id="rId30"/>
+    <p:notesMasterId r:id="rId31"/>
   </p:notesMasterIdLst>
   <p:sldIdLst>
     <p:sldId id="257" r:id="rId5"/>
@@ -19,20 +19,21 @@
     <p:sldId id="266" r:id="rId13"/>
     <p:sldId id="262" r:id="rId14"/>
     <p:sldId id="274" r:id="rId15"/>
-    <p:sldId id="275" r:id="rId16"/>
-    <p:sldId id="277" r:id="rId17"/>
-    <p:sldId id="267" r:id="rId18"/>
-    <p:sldId id="269" r:id="rId19"/>
-    <p:sldId id="270" r:id="rId20"/>
-    <p:sldId id="271" r:id="rId21"/>
-    <p:sldId id="268" r:id="rId22"/>
-    <p:sldId id="272" r:id="rId23"/>
-    <p:sldId id="273" r:id="rId24"/>
-    <p:sldId id="276" r:id="rId25"/>
-    <p:sldId id="278" r:id="rId26"/>
-    <p:sldId id="279" r:id="rId27"/>
+    <p:sldId id="277" r:id="rId16"/>
+    <p:sldId id="267" r:id="rId17"/>
+    <p:sldId id="269" r:id="rId18"/>
+    <p:sldId id="270" r:id="rId19"/>
+    <p:sldId id="271" r:id="rId20"/>
+    <p:sldId id="268" r:id="rId21"/>
+    <p:sldId id="272" r:id="rId22"/>
+    <p:sldId id="273" r:id="rId23"/>
+    <p:sldId id="276" r:id="rId24"/>
+    <p:sldId id="278" r:id="rId25"/>
+    <p:sldId id="279" r:id="rId26"/>
+    <p:sldId id="282" r:id="rId27"/>
     <p:sldId id="280" r:id="rId28"/>
-    <p:sldId id="281" r:id="rId29"/>
+    <p:sldId id="283" r:id="rId29"/>
+    <p:sldId id="281" r:id="rId30"/>
   </p:sldIdLst>
   <p:sldSz cx="12192000" cy="6858000"/>
   <p:notesSz cx="6858000" cy="9144000"/>
@@ -221,7 +222,7 @@
           <a:p>
             <a:fld id="{E326FCFE-7176-4740-B8A4-BE7D6F546224}" type="datetimeFigureOut">
               <a:rPr lang="en-GB" smtClean="0"/>
-              <a:t>16/02/2023</a:t>
+              <a:t>17/02/2023</a:t>
             </a:fld>
             <a:endParaRPr lang="en-GB"/>
           </a:p>
@@ -660,7 +661,7 @@
           <a:p>
             <a:fld id="{32F30A6C-8B7B-4BC2-B46E-03E01B6F7999}" type="slidenum">
               <a:rPr lang="en-GB" smtClean="0"/>
-              <a:t>19</a:t>
+              <a:t>18</a:t>
             </a:fld>
             <a:endParaRPr lang="en-GB"/>
           </a:p>
@@ -755,7 +756,7 @@
           <a:p>
             <a:fld id="{32F30A6C-8B7B-4BC2-B46E-03E01B6F7999}" type="slidenum">
               <a:rPr lang="en-GB" smtClean="0"/>
-              <a:t>21</a:t>
+              <a:t>20</a:t>
             </a:fld>
             <a:endParaRPr lang="en-GB"/>
           </a:p>
@@ -2728,7 +2729,7 @@
             </a:r>
             <a:r>
               <a:rPr lang="en-GB" dirty="0"/>
-              <a:t> layers we have already used: </a:t>
+              <a:t>_ functions that we have already used: </a:t>
             </a:r>
             <a:r>
               <a:rPr lang="en-GB" dirty="0" err="1"/>
@@ -2816,1148 +2817,6 @@
           <a:p>
             <a:r>
               <a:rPr lang="en-GB" dirty="0"/>
-              <a:t>Geometry layers – some examples</a:t>
-            </a:r>
-          </a:p>
-        </p:txBody>
-      </p:sp>
-      <p:graphicFrame>
-        <p:nvGraphicFramePr>
-          <p:cNvPr id="6" name="Table 5">
-            <a:extLst>
-              <a:ext uri="{FF2B5EF4-FFF2-40B4-BE49-F238E27FC236}">
-                <a16:creationId xmlns:a16="http://schemas.microsoft.com/office/drawing/2014/main" id="{D8408E5E-02B9-4AC0-8449-8D5364E00E7B}"/>
-              </a:ext>
-            </a:extLst>
-          </p:cNvPr>
-          <p:cNvGraphicFramePr>
-            <a:graphicFrameLocks noGrp="1"/>
-          </p:cNvGraphicFramePr>
-          <p:nvPr>
-            <p:extLst>
-              <p:ext uri="{D42A27DB-BD31-4B8C-83A1-F6EECF244321}">
-                <p14:modId xmlns:p14="http://schemas.microsoft.com/office/powerpoint/2010/main" val="1458261592"/>
-              </p:ext>
-            </p:extLst>
-          </p:nvPr>
-        </p:nvGraphicFramePr>
-        <p:xfrm>
-          <a:off x="1069258" y="1497787"/>
-          <a:ext cx="10660626" cy="4636533"/>
-        </p:xfrm>
-        <a:graphic>
-          <a:graphicData uri="http://schemas.openxmlformats.org/drawingml/2006/table">
-            <a:tbl>
-              <a:tblPr/>
-              <a:tblGrid>
-                <a:gridCol w="1408471">
-                  <a:extLst>
-                    <a:ext uri="{9D8B030D-6E8A-4147-A177-3AD203B41FA5}">
-                      <a16:colId xmlns:a16="http://schemas.microsoft.com/office/drawing/2014/main" val="1152714497"/>
-                    </a:ext>
-                  </a:extLst>
-                </a:gridCol>
-                <a:gridCol w="1858297">
-                  <a:extLst>
-                    <a:ext uri="{9D8B030D-6E8A-4147-A177-3AD203B41FA5}">
-                      <a16:colId xmlns:a16="http://schemas.microsoft.com/office/drawing/2014/main" val="752761264"/>
-                    </a:ext>
-                  </a:extLst>
-                </a:gridCol>
-                <a:gridCol w="7393858">
-                  <a:extLst>
-                    <a:ext uri="{9D8B030D-6E8A-4147-A177-3AD203B41FA5}">
-                      <a16:colId xmlns:a16="http://schemas.microsoft.com/office/drawing/2014/main" val="1489400548"/>
-                    </a:ext>
-                  </a:extLst>
-                </a:gridCol>
-              </a:tblGrid>
-              <a:tr h="318868">
-                <a:tc>
-                  <a:txBody>
-                    <a:bodyPr/>
-                    <a:lstStyle/>
-                    <a:p>
-                      <a:pPr algn="l" fontAlgn="b"/>
-                      <a:r>
-                        <a:rPr lang="en-GB" sz="1400" b="1" dirty="0">
-                          <a:solidFill>
-                            <a:srgbClr val="666666"/>
-                          </a:solidFill>
-                          <a:effectLst/>
-                          <a:latin typeface="Open Sans" panose="020B0606030504020204" pitchFamily="34" charset="0"/>
-                        </a:rPr>
-                        <a:t>Group</a:t>
-                      </a:r>
-                    </a:p>
-                  </a:txBody>
-                  <a:tcPr marL="28978" marR="28978" marT="57956" marB="57956" anchor="b">
-                    <a:lnL>
-                      <a:noFill/>
-                    </a:lnL>
-                    <a:lnR>
-                      <a:noFill/>
-                    </a:lnR>
-                    <a:lnT>
-                      <a:noFill/>
-                    </a:lnT>
-                    <a:lnB>
-                      <a:noFill/>
-                    </a:lnB>
-                  </a:tcPr>
-                </a:tc>
-                <a:tc>
-                  <a:txBody>
-                    <a:bodyPr/>
-                    <a:lstStyle/>
-                    <a:p>
-                      <a:pPr algn="l" fontAlgn="b"/>
-                      <a:r>
-                        <a:rPr lang="en-GB" sz="1400" b="1">
-                          <a:solidFill>
-                            <a:srgbClr val="666666"/>
-                          </a:solidFill>
-                          <a:effectLst/>
-                          <a:latin typeface="Open Sans" panose="020B0606030504020204" pitchFamily="34" charset="0"/>
-                        </a:rPr>
-                        <a:t>Function</a:t>
-                      </a:r>
-                    </a:p>
-                  </a:txBody>
-                  <a:tcPr marL="28978" marR="28978" marT="57956" marB="57956" anchor="b">
-                    <a:lnL>
-                      <a:noFill/>
-                    </a:lnL>
-                    <a:lnR>
-                      <a:noFill/>
-                    </a:lnR>
-                    <a:lnT>
-                      <a:noFill/>
-                    </a:lnT>
-                    <a:lnB>
-                      <a:noFill/>
-                    </a:lnB>
-                  </a:tcPr>
-                </a:tc>
-                <a:tc>
-                  <a:txBody>
-                    <a:bodyPr/>
-                    <a:lstStyle/>
-                    <a:p>
-                      <a:pPr algn="l" fontAlgn="b"/>
-                      <a:r>
-                        <a:rPr lang="en-GB" sz="1400" b="1" dirty="0">
-                          <a:solidFill>
-                            <a:srgbClr val="666666"/>
-                          </a:solidFill>
-                          <a:effectLst/>
-                          <a:latin typeface="Open Sans" panose="020B0606030504020204" pitchFamily="34" charset="0"/>
-                        </a:rPr>
-                        <a:t>Description</a:t>
-                      </a:r>
-                    </a:p>
-                  </a:txBody>
-                  <a:tcPr marL="28978" marR="28978" marT="57956" marB="57956" anchor="b">
-                    <a:lnL>
-                      <a:noFill/>
-                    </a:lnL>
-                    <a:lnR>
-                      <a:noFill/>
-                    </a:lnR>
-                    <a:lnT>
-                      <a:noFill/>
-                    </a:lnT>
-                    <a:lnB>
-                      <a:noFill/>
-                    </a:lnB>
-                  </a:tcPr>
-                </a:tc>
-                <a:extLst>
-                  <a:ext uri="{0D108BD9-81ED-4DB2-BD59-A6C34878D82A}">
-                    <a16:rowId xmlns:a16="http://schemas.microsoft.com/office/drawing/2014/main" val="3173409864"/>
-                  </a:ext>
-                </a:extLst>
-              </a:tr>
-              <a:tr h="788854">
-                <a:tc rowSpan="3">
-                  <a:txBody>
-                    <a:bodyPr/>
-                    <a:lstStyle/>
-                    <a:p>
-                      <a:pPr algn="l" fontAlgn="ctr"/>
-                      <a:r>
-                        <a:rPr lang="en-GB" sz="1400" dirty="0">
-                          <a:effectLst/>
-                          <a:latin typeface="Open Sans" panose="020B0606030504020204" pitchFamily="34" charset="0"/>
-                        </a:rPr>
-                        <a:t>Scatter</a:t>
-                      </a:r>
-                    </a:p>
-                  </a:txBody>
-                  <a:tcPr marL="28978" marR="28978" marT="40569" marB="40569" anchor="ctr">
-                    <a:lnL>
-                      <a:noFill/>
-                    </a:lnL>
-                    <a:lnR>
-                      <a:noFill/>
-                    </a:lnR>
-                    <a:lnT>
-                      <a:noFill/>
-                    </a:lnT>
-                    <a:lnB>
-                      <a:noFill/>
-                    </a:lnB>
-                  </a:tcPr>
-                </a:tc>
-                <a:tc>
-                  <a:txBody>
-                    <a:bodyPr/>
-                    <a:lstStyle/>
-                    <a:p>
-                      <a:pPr algn="l" fontAlgn="ctr"/>
-                      <a:r>
-                        <a:rPr lang="en-GB" sz="1400" b="1" dirty="0" err="1">
-                          <a:effectLst/>
-                          <a:latin typeface="Open Sans" panose="020B0606030504020204" pitchFamily="34" charset="0"/>
-                        </a:rPr>
-                        <a:t>geom_point</a:t>
-                      </a:r>
-                      <a:r>
-                        <a:rPr lang="en-GB" sz="1400" b="1" dirty="0">
-                          <a:effectLst/>
-                          <a:latin typeface="Open Sans" panose="020B0606030504020204" pitchFamily="34" charset="0"/>
-                        </a:rPr>
-                        <a:t>()</a:t>
-                      </a:r>
-                      <a:endParaRPr lang="en-GB" sz="1400" dirty="0">
-                        <a:effectLst/>
-                        <a:latin typeface="Open Sans" panose="020B0606030504020204" pitchFamily="34" charset="0"/>
-                      </a:endParaRPr>
-                    </a:p>
-                  </a:txBody>
-                  <a:tcPr marL="28978" marR="28978" marT="40569" marB="40569" anchor="ctr">
-                    <a:lnL>
-                      <a:noFill/>
-                    </a:lnL>
-                    <a:lnR>
-                      <a:noFill/>
-                    </a:lnR>
-                    <a:lnT>
-                      <a:noFill/>
-                    </a:lnT>
-                    <a:lnB>
-                      <a:noFill/>
-                    </a:lnB>
-                  </a:tcPr>
-                </a:tc>
-                <a:tc>
-                  <a:txBody>
-                    <a:bodyPr/>
-                    <a:lstStyle/>
-                    <a:p>
-                      <a:pPr algn="l" fontAlgn="ctr"/>
-                      <a:r>
-                        <a:rPr lang="en-GB" sz="1400" dirty="0">
-                          <a:effectLst/>
-                          <a:latin typeface="Open Sans" panose="020B0606030504020204" pitchFamily="34" charset="0"/>
-                        </a:rPr>
-                        <a:t>This is the foundation for the next 2 variations. Scatterplots are the most useful for displaying the relationship between 2 continuous variables. You can map another variable to size which will create a bubble chart from this.</a:t>
-                      </a:r>
-                    </a:p>
-                  </a:txBody>
-                  <a:tcPr marL="28978" marR="28978" marT="40569" marB="40569" anchor="ctr">
-                    <a:lnL>
-                      <a:noFill/>
-                    </a:lnL>
-                    <a:lnR>
-                      <a:noFill/>
-                    </a:lnR>
-                    <a:lnT>
-                      <a:noFill/>
-                    </a:lnT>
-                    <a:lnB>
-                      <a:noFill/>
-                    </a:lnB>
-                  </a:tcPr>
-                </a:tc>
-                <a:extLst>
-                  <a:ext uri="{0D108BD9-81ED-4DB2-BD59-A6C34878D82A}">
-                    <a16:rowId xmlns:a16="http://schemas.microsoft.com/office/drawing/2014/main" val="2296354270"/>
-                  </a:ext>
-                </a:extLst>
-              </a:tr>
-              <a:tr h="653750">
-                <a:tc vMerge="1">
-                  <a:txBody>
-                    <a:bodyPr/>
-                    <a:lstStyle/>
-                    <a:p>
-                      <a:endParaRPr lang="en-GB"/>
-                    </a:p>
-                  </a:txBody>
-                  <a:tcPr/>
-                </a:tc>
-                <a:tc>
-                  <a:txBody>
-                    <a:bodyPr/>
-                    <a:lstStyle/>
-                    <a:p>
-                      <a:pPr algn="l" fontAlgn="ctr"/>
-                      <a:r>
-                        <a:rPr lang="en-GB" sz="1400" b="1" dirty="0" err="1">
-                          <a:effectLst/>
-                          <a:latin typeface="Open Sans" panose="020B0606030504020204" pitchFamily="34" charset="0"/>
-                        </a:rPr>
-                        <a:t>geom_jitter</a:t>
-                      </a:r>
-                      <a:r>
-                        <a:rPr lang="en-GB" sz="1400" b="1" dirty="0">
-                          <a:effectLst/>
-                          <a:latin typeface="Open Sans" panose="020B0606030504020204" pitchFamily="34" charset="0"/>
-                        </a:rPr>
-                        <a:t>()</a:t>
-                      </a:r>
-                      <a:endParaRPr lang="en-GB" sz="1400" dirty="0">
-                        <a:effectLst/>
-                        <a:latin typeface="Open Sans" panose="020B0606030504020204" pitchFamily="34" charset="0"/>
-                      </a:endParaRPr>
-                    </a:p>
-                  </a:txBody>
-                  <a:tcPr marL="28978" marR="28978" marT="40569" marB="40569" anchor="ctr">
-                    <a:lnL>
-                      <a:noFill/>
-                    </a:lnL>
-                    <a:lnR>
-                      <a:noFill/>
-                    </a:lnR>
-                    <a:lnT>
-                      <a:noFill/>
-                    </a:lnT>
-                    <a:lnB>
-                      <a:noFill/>
-                    </a:lnB>
-                  </a:tcPr>
-                </a:tc>
-                <a:tc>
-                  <a:txBody>
-                    <a:bodyPr/>
-                    <a:lstStyle/>
-                    <a:p>
-                      <a:pPr algn="l" fontAlgn="ctr"/>
-                      <a:r>
-                        <a:rPr lang="en-GB" sz="1400" dirty="0">
-                          <a:effectLst/>
-                          <a:latin typeface="Open Sans" panose="020B0606030504020204" pitchFamily="34" charset="0"/>
-                        </a:rPr>
-                        <a:t>A convenient shortcut for specifying jitter as the position. Adding a small amount of random variation to the location of points, useful for handling overplotting.</a:t>
-                      </a:r>
-                    </a:p>
-                  </a:txBody>
-                  <a:tcPr marL="28978" marR="28978" marT="40569" marB="40569" anchor="ctr">
-                    <a:lnL>
-                      <a:noFill/>
-                    </a:lnL>
-                    <a:lnR>
-                      <a:noFill/>
-                    </a:lnR>
-                    <a:lnT>
-                      <a:noFill/>
-                    </a:lnT>
-                    <a:lnB>
-                      <a:noFill/>
-                    </a:lnB>
-                  </a:tcPr>
-                </a:tc>
-                <a:extLst>
-                  <a:ext uri="{0D108BD9-81ED-4DB2-BD59-A6C34878D82A}">
-                    <a16:rowId xmlns:a16="http://schemas.microsoft.com/office/drawing/2014/main" val="3025231216"/>
-                  </a:ext>
-                </a:extLst>
-              </a:tr>
-              <a:tr h="285193">
-                <a:tc vMerge="1">
-                  <a:txBody>
-                    <a:bodyPr/>
-                    <a:lstStyle/>
-                    <a:p>
-                      <a:endParaRPr lang="en-GB"/>
-                    </a:p>
-                  </a:txBody>
-                  <a:tcPr/>
-                </a:tc>
-                <a:tc>
-                  <a:txBody>
-                    <a:bodyPr/>
-                    <a:lstStyle/>
-                    <a:p>
-                      <a:pPr algn="l" fontAlgn="ctr"/>
-                      <a:r>
-                        <a:rPr lang="en-GB" sz="1400" b="1">
-                          <a:effectLst/>
-                          <a:latin typeface="Open Sans" panose="020B0606030504020204" pitchFamily="34" charset="0"/>
-                        </a:rPr>
-                        <a:t>geom_count()</a:t>
-                      </a:r>
-                      <a:endParaRPr lang="en-GB" sz="1400">
-                        <a:effectLst/>
-                        <a:latin typeface="Open Sans" panose="020B0606030504020204" pitchFamily="34" charset="0"/>
-                      </a:endParaRPr>
-                    </a:p>
-                  </a:txBody>
-                  <a:tcPr marL="28978" marR="28978" marT="40569" marB="40569" anchor="ctr">
-                    <a:lnL>
-                      <a:noFill/>
-                    </a:lnL>
-                    <a:lnR>
-                      <a:noFill/>
-                    </a:lnR>
-                    <a:lnT>
-                      <a:noFill/>
-                    </a:lnT>
-                    <a:lnB w="12700" cap="flat" cmpd="sng" algn="ctr">
-                      <a:solidFill>
-                        <a:schemeClr val="tx1"/>
-                      </a:solidFill>
-                      <a:prstDash val="solid"/>
-                      <a:round/>
-                      <a:headEnd type="none" w="med" len="med"/>
-                      <a:tailEnd type="none" w="med" len="med"/>
-                    </a:lnB>
-                  </a:tcPr>
-                </a:tc>
-                <a:tc>
-                  <a:txBody>
-                    <a:bodyPr/>
-                    <a:lstStyle/>
-                    <a:p>
-                      <a:pPr algn="l" fontAlgn="ctr"/>
-                      <a:r>
-                        <a:rPr lang="en-GB" sz="1400" dirty="0">
-                          <a:effectLst/>
-                          <a:latin typeface="Open Sans" panose="020B0606030504020204" pitchFamily="34" charset="0"/>
-                        </a:rPr>
-                        <a:t>Counting the number of observations at each location.</a:t>
-                      </a:r>
-                    </a:p>
-                  </a:txBody>
-                  <a:tcPr marL="28978" marR="28978" marT="40569" marB="40569" anchor="ctr">
-                    <a:lnL>
-                      <a:noFill/>
-                    </a:lnL>
-                    <a:lnR>
-                      <a:noFill/>
-                    </a:lnR>
-                    <a:lnT>
-                      <a:noFill/>
-                    </a:lnT>
-                    <a:lnB w="12700" cap="flat" cmpd="sng" algn="ctr">
-                      <a:solidFill>
-                        <a:schemeClr val="tx1"/>
-                      </a:solidFill>
-                      <a:prstDash val="solid"/>
-                      <a:round/>
-                      <a:headEnd type="none" w="med" len="med"/>
-                      <a:tailEnd type="none" w="med" len="med"/>
-                    </a:lnB>
-                  </a:tcPr>
-                </a:tc>
-                <a:extLst>
-                  <a:ext uri="{0D108BD9-81ED-4DB2-BD59-A6C34878D82A}">
-                    <a16:rowId xmlns:a16="http://schemas.microsoft.com/office/drawing/2014/main" val="4234896019"/>
-                  </a:ext>
-                </a:extLst>
-              </a:tr>
-              <a:tr h="508011">
-                <a:tc rowSpan="3">
-                  <a:txBody>
-                    <a:bodyPr/>
-                    <a:lstStyle/>
-                    <a:p>
-                      <a:pPr algn="l" fontAlgn="ctr"/>
-                      <a:r>
-                        <a:rPr lang="en-GB" sz="1400" dirty="0">
-                          <a:effectLst/>
-                          <a:latin typeface="Open Sans" panose="020B0606030504020204" pitchFamily="34" charset="0"/>
-                        </a:rPr>
-                        <a:t>Bar</a:t>
-                      </a:r>
-                    </a:p>
-                  </a:txBody>
-                  <a:tcPr marL="28978" marR="28978" marT="40569" marB="40569" anchor="ctr">
-                    <a:lnL>
-                      <a:noFill/>
-                    </a:lnL>
-                    <a:lnR>
-                      <a:noFill/>
-                    </a:lnR>
-                    <a:lnT>
-                      <a:noFill/>
-                    </a:lnT>
-                    <a:lnB>
-                      <a:noFill/>
-                    </a:lnB>
-                  </a:tcPr>
-                </a:tc>
-                <a:tc>
-                  <a:txBody>
-                    <a:bodyPr/>
-                    <a:lstStyle/>
-                    <a:p>
-                      <a:pPr algn="l" fontAlgn="ctr"/>
-                      <a:r>
-                        <a:rPr lang="en-GB" sz="1400" b="1" dirty="0" err="1">
-                          <a:effectLst/>
-                          <a:latin typeface="Open Sans" panose="020B0606030504020204" pitchFamily="34" charset="0"/>
-                        </a:rPr>
-                        <a:t>geom_histogram</a:t>
-                      </a:r>
-                      <a:r>
-                        <a:rPr lang="en-GB" sz="1400" b="1" dirty="0">
-                          <a:effectLst/>
-                          <a:latin typeface="Open Sans" panose="020B0606030504020204" pitchFamily="34" charset="0"/>
-                        </a:rPr>
-                        <a:t>()</a:t>
-                      </a:r>
-                      <a:endParaRPr lang="en-GB" sz="1400" dirty="0">
-                        <a:effectLst/>
-                        <a:latin typeface="Open Sans" panose="020B0606030504020204" pitchFamily="34" charset="0"/>
-                      </a:endParaRPr>
-                    </a:p>
-                  </a:txBody>
-                  <a:tcPr marL="28978" marR="28978" marT="40569" marB="40569" anchor="ctr">
-                    <a:lnL>
-                      <a:noFill/>
-                    </a:lnL>
-                    <a:lnR>
-                      <a:noFill/>
-                    </a:lnR>
-                    <a:lnT w="12700" cap="flat" cmpd="sng" algn="ctr">
-                      <a:solidFill>
-                        <a:schemeClr val="tx1"/>
-                      </a:solidFill>
-                      <a:prstDash val="solid"/>
-                      <a:round/>
-                      <a:headEnd type="none" w="med" len="med"/>
-                      <a:tailEnd type="none" w="med" len="med"/>
-                    </a:lnT>
-                    <a:lnB>
-                      <a:noFill/>
-                    </a:lnB>
-                  </a:tcPr>
-                </a:tc>
-                <a:tc>
-                  <a:txBody>
-                    <a:bodyPr/>
-                    <a:lstStyle/>
-                    <a:p>
-                      <a:pPr algn="l" fontAlgn="ctr"/>
-                      <a:r>
-                        <a:rPr lang="en-GB" sz="1400" dirty="0">
-                          <a:effectLst/>
-                          <a:latin typeface="Open Sans" panose="020B0606030504020204" pitchFamily="34" charset="0"/>
-                        </a:rPr>
-                        <a:t>A specialised version of bar plots. Showing the binned distribution of a continuous variable.</a:t>
-                      </a:r>
-                    </a:p>
-                  </a:txBody>
-                  <a:tcPr marL="28978" marR="28978" marT="40569" marB="40569" anchor="ctr">
-                    <a:lnL>
-                      <a:noFill/>
-                    </a:lnL>
-                    <a:lnR>
-                      <a:noFill/>
-                    </a:lnR>
-                    <a:lnT w="12700" cap="flat" cmpd="sng" algn="ctr">
-                      <a:solidFill>
-                        <a:schemeClr val="tx1"/>
-                      </a:solidFill>
-                      <a:prstDash val="solid"/>
-                      <a:round/>
-                      <a:headEnd type="none" w="med" len="med"/>
-                      <a:tailEnd type="none" w="med" len="med"/>
-                    </a:lnT>
-                    <a:lnB>
-                      <a:noFill/>
-                    </a:lnB>
-                  </a:tcPr>
-                </a:tc>
-                <a:extLst>
-                  <a:ext uri="{0D108BD9-81ED-4DB2-BD59-A6C34878D82A}">
-                    <a16:rowId xmlns:a16="http://schemas.microsoft.com/office/drawing/2014/main" val="3699880814"/>
-                  </a:ext>
-                </a:extLst>
-              </a:tr>
-              <a:tr h="320848">
-                <a:tc vMerge="1">
-                  <a:txBody>
-                    <a:bodyPr/>
-                    <a:lstStyle/>
-                    <a:p>
-                      <a:endParaRPr lang="en-GB"/>
-                    </a:p>
-                  </a:txBody>
-                  <a:tcPr/>
-                </a:tc>
-                <a:tc>
-                  <a:txBody>
-                    <a:bodyPr/>
-                    <a:lstStyle/>
-                    <a:p>
-                      <a:pPr algn="l" fontAlgn="ctr"/>
-                      <a:r>
-                        <a:rPr lang="en-GB" sz="1400" b="1">
-                          <a:effectLst/>
-                          <a:latin typeface="Open Sans" panose="020B0606030504020204" pitchFamily="34" charset="0"/>
-                        </a:rPr>
-                        <a:t>geom_bar()</a:t>
-                      </a:r>
-                      <a:endParaRPr lang="en-GB" sz="1400">
-                        <a:effectLst/>
-                        <a:latin typeface="Open Sans" panose="020B0606030504020204" pitchFamily="34" charset="0"/>
-                      </a:endParaRPr>
-                    </a:p>
-                  </a:txBody>
-                  <a:tcPr marL="28978" marR="28978" marT="40569" marB="40569" anchor="ctr">
-                    <a:lnL>
-                      <a:noFill/>
-                    </a:lnL>
-                    <a:lnR>
-                      <a:noFill/>
-                    </a:lnR>
-                    <a:lnT>
-                      <a:noFill/>
-                    </a:lnT>
-                    <a:lnB>
-                      <a:noFill/>
-                    </a:lnB>
-                  </a:tcPr>
-                </a:tc>
-                <a:tc>
-                  <a:txBody>
-                    <a:bodyPr/>
-                    <a:lstStyle/>
-                    <a:p>
-                      <a:pPr algn="l" fontAlgn="ctr"/>
-                      <a:r>
-                        <a:rPr lang="en-GB" sz="1400" dirty="0">
-                          <a:effectLst/>
-                          <a:latin typeface="Open Sans" panose="020B0606030504020204" pitchFamily="34" charset="0"/>
-                        </a:rPr>
-                        <a:t>A bar with the height proportional to the number of cases in each group.</a:t>
-                      </a:r>
-                    </a:p>
-                  </a:txBody>
-                  <a:tcPr marL="28978" marR="28978" marT="40569" marB="40569" anchor="ctr">
-                    <a:lnL>
-                      <a:noFill/>
-                    </a:lnL>
-                    <a:lnR>
-                      <a:noFill/>
-                    </a:lnR>
-                    <a:lnT>
-                      <a:noFill/>
-                    </a:lnT>
-                    <a:lnB>
-                      <a:noFill/>
-                    </a:lnB>
-                  </a:tcPr>
-                </a:tc>
-                <a:extLst>
-                  <a:ext uri="{0D108BD9-81ED-4DB2-BD59-A6C34878D82A}">
-                    <a16:rowId xmlns:a16="http://schemas.microsoft.com/office/drawing/2014/main" val="3674227604"/>
-                  </a:ext>
-                </a:extLst>
-              </a:tr>
-              <a:tr h="338674">
-                <a:tc vMerge="1">
-                  <a:txBody>
-                    <a:bodyPr/>
-                    <a:lstStyle/>
-                    <a:p>
-                      <a:endParaRPr lang="en-GB"/>
-                    </a:p>
-                  </a:txBody>
-                  <a:tcPr/>
-                </a:tc>
-                <a:tc>
-                  <a:txBody>
-                    <a:bodyPr/>
-                    <a:lstStyle/>
-                    <a:p>
-                      <a:pPr algn="l" fontAlgn="ctr"/>
-                      <a:r>
-                        <a:rPr lang="en-GB" sz="1400" b="1">
-                          <a:effectLst/>
-                          <a:latin typeface="Open Sans" panose="020B0606030504020204" pitchFamily="34" charset="0"/>
-                        </a:rPr>
-                        <a:t>geom_col()</a:t>
-                      </a:r>
-                      <a:endParaRPr lang="en-GB" sz="1400">
-                        <a:effectLst/>
-                        <a:latin typeface="Open Sans" panose="020B0606030504020204" pitchFamily="34" charset="0"/>
-                      </a:endParaRPr>
-                    </a:p>
-                  </a:txBody>
-                  <a:tcPr marL="28978" marR="28978" marT="40569" marB="40569" anchor="ctr">
-                    <a:lnL>
-                      <a:noFill/>
-                    </a:lnL>
-                    <a:lnR>
-                      <a:noFill/>
-                    </a:lnR>
-                    <a:lnT>
-                      <a:noFill/>
-                    </a:lnT>
-                    <a:lnB w="12700" cap="flat" cmpd="sng" algn="ctr">
-                      <a:solidFill>
-                        <a:schemeClr val="tx1"/>
-                      </a:solidFill>
-                      <a:prstDash val="solid"/>
-                      <a:round/>
-                      <a:headEnd type="none" w="med" len="med"/>
-                      <a:tailEnd type="none" w="med" len="med"/>
-                    </a:lnB>
-                  </a:tcPr>
-                </a:tc>
-                <a:tc>
-                  <a:txBody>
-                    <a:bodyPr/>
-                    <a:lstStyle/>
-                    <a:p>
-                      <a:pPr algn="l" fontAlgn="ctr"/>
-                      <a:r>
-                        <a:rPr lang="en-GB" sz="1400" dirty="0">
-                          <a:effectLst/>
-                          <a:latin typeface="Open Sans" panose="020B0606030504020204" pitchFamily="34" charset="0"/>
-                        </a:rPr>
-                        <a:t>A bar with the height representing values in the data.</a:t>
-                      </a:r>
-                    </a:p>
-                  </a:txBody>
-                  <a:tcPr marL="28978" marR="28978" marT="40569" marB="40569" anchor="ctr">
-                    <a:lnL>
-                      <a:noFill/>
-                    </a:lnL>
-                    <a:lnR>
-                      <a:noFill/>
-                    </a:lnR>
-                    <a:lnT>
-                      <a:noFill/>
-                    </a:lnT>
-                    <a:lnB w="12700" cap="flat" cmpd="sng" algn="ctr">
-                      <a:solidFill>
-                        <a:schemeClr val="tx1"/>
-                      </a:solidFill>
-                      <a:prstDash val="solid"/>
-                      <a:round/>
-                      <a:headEnd type="none" w="med" len="med"/>
-                      <a:tailEnd type="none" w="med" len="med"/>
-                    </a:lnB>
-                  </a:tcPr>
-                </a:tc>
-                <a:extLst>
-                  <a:ext uri="{0D108BD9-81ED-4DB2-BD59-A6C34878D82A}">
-                    <a16:rowId xmlns:a16="http://schemas.microsoft.com/office/drawing/2014/main" val="3722422891"/>
-                  </a:ext>
-                </a:extLst>
-              </a:tr>
-              <a:tr h="285193">
-                <a:tc rowSpan="2">
-                  <a:txBody>
-                    <a:bodyPr/>
-                    <a:lstStyle/>
-                    <a:p>
-                      <a:pPr algn="l" fontAlgn="ctr"/>
-                      <a:r>
-                        <a:rPr lang="en-GB" sz="1400" dirty="0">
-                          <a:effectLst/>
-                          <a:latin typeface="Open Sans" panose="020B0606030504020204" pitchFamily="34" charset="0"/>
-                        </a:rPr>
-                        <a:t>Line</a:t>
-                      </a:r>
-                    </a:p>
-                  </a:txBody>
-                  <a:tcPr marL="28978" marR="28978" marT="40569" marB="40569" anchor="ctr">
-                    <a:lnL>
-                      <a:noFill/>
-                    </a:lnL>
-                    <a:lnR>
-                      <a:noFill/>
-                    </a:lnR>
-                    <a:lnT>
-                      <a:noFill/>
-                    </a:lnT>
-                    <a:lnB>
-                      <a:noFill/>
-                    </a:lnB>
-                  </a:tcPr>
-                </a:tc>
-                <a:tc>
-                  <a:txBody>
-                    <a:bodyPr/>
-                    <a:lstStyle/>
-                    <a:p>
-                      <a:pPr algn="l" fontAlgn="ctr"/>
-                      <a:r>
-                        <a:rPr lang="en-GB" sz="1400" b="1" dirty="0" err="1">
-                          <a:effectLst/>
-                          <a:latin typeface="Open Sans" panose="020B0606030504020204" pitchFamily="34" charset="0"/>
-                        </a:rPr>
-                        <a:t>geom_line</a:t>
-                      </a:r>
-                      <a:r>
-                        <a:rPr lang="en-GB" sz="1400" b="1" dirty="0">
-                          <a:effectLst/>
-                          <a:latin typeface="Open Sans" panose="020B0606030504020204" pitchFamily="34" charset="0"/>
-                        </a:rPr>
-                        <a:t>()</a:t>
-                      </a:r>
-                      <a:endParaRPr lang="en-GB" sz="1400" dirty="0">
-                        <a:effectLst/>
-                        <a:latin typeface="Open Sans" panose="020B0606030504020204" pitchFamily="34" charset="0"/>
-                      </a:endParaRPr>
-                    </a:p>
-                  </a:txBody>
-                  <a:tcPr marL="28978" marR="28978" marT="40569" marB="40569" anchor="ctr">
-                    <a:lnL>
-                      <a:noFill/>
-                    </a:lnL>
-                    <a:lnR>
-                      <a:noFill/>
-                    </a:lnR>
-                    <a:lnT w="12700" cap="flat" cmpd="sng" algn="ctr">
-                      <a:solidFill>
-                        <a:schemeClr val="tx1"/>
-                      </a:solidFill>
-                      <a:prstDash val="solid"/>
-                      <a:round/>
-                      <a:headEnd type="none" w="med" len="med"/>
-                      <a:tailEnd type="none" w="med" len="med"/>
-                    </a:lnT>
-                    <a:lnB>
-                      <a:noFill/>
-                    </a:lnB>
-                  </a:tcPr>
-                </a:tc>
-                <a:tc>
-                  <a:txBody>
-                    <a:bodyPr/>
-                    <a:lstStyle/>
-                    <a:p>
-                      <a:pPr algn="l" fontAlgn="ctr"/>
-                      <a:r>
-                        <a:rPr lang="en-GB" sz="1400">
-                          <a:effectLst/>
-                          <a:latin typeface="Open Sans" panose="020B0606030504020204" pitchFamily="34" charset="0"/>
-                        </a:rPr>
-                        <a:t>Connect observations based on the order on the x-axis.</a:t>
-                      </a:r>
-                    </a:p>
-                  </a:txBody>
-                  <a:tcPr marL="28978" marR="28978" marT="40569" marB="40569" anchor="ctr">
-                    <a:lnL>
-                      <a:noFill/>
-                    </a:lnL>
-                    <a:lnR>
-                      <a:noFill/>
-                    </a:lnR>
-                    <a:lnT w="12700" cap="flat" cmpd="sng" algn="ctr">
-                      <a:solidFill>
-                        <a:schemeClr val="tx1"/>
-                      </a:solidFill>
-                      <a:prstDash val="solid"/>
-                      <a:round/>
-                      <a:headEnd type="none" w="med" len="med"/>
-                      <a:tailEnd type="none" w="med" len="med"/>
-                    </a:lnT>
-                    <a:lnB>
-                      <a:noFill/>
-                    </a:lnB>
-                  </a:tcPr>
-                </a:tc>
-                <a:extLst>
-                  <a:ext uri="{0D108BD9-81ED-4DB2-BD59-A6C34878D82A}">
-                    <a16:rowId xmlns:a16="http://schemas.microsoft.com/office/drawing/2014/main" val="2573069041"/>
-                  </a:ext>
-                </a:extLst>
-              </a:tr>
-              <a:tr h="285193">
-                <a:tc vMerge="1">
-                  <a:txBody>
-                    <a:bodyPr/>
-                    <a:lstStyle/>
-                    <a:p>
-                      <a:endParaRPr lang="en-GB"/>
-                    </a:p>
-                  </a:txBody>
-                  <a:tcPr/>
-                </a:tc>
-                <a:tc>
-                  <a:txBody>
-                    <a:bodyPr/>
-                    <a:lstStyle/>
-                    <a:p>
-                      <a:pPr algn="l" fontAlgn="ctr"/>
-                      <a:r>
-                        <a:rPr lang="en-GB" sz="1400" b="1" dirty="0" err="1">
-                          <a:effectLst/>
-                          <a:latin typeface="Open Sans" panose="020B0606030504020204" pitchFamily="34" charset="0"/>
-                        </a:rPr>
-                        <a:t>geom_path</a:t>
-                      </a:r>
-                      <a:r>
-                        <a:rPr lang="en-GB" sz="1400" b="1" dirty="0">
-                          <a:effectLst/>
-                          <a:latin typeface="Open Sans" panose="020B0606030504020204" pitchFamily="34" charset="0"/>
-                        </a:rPr>
-                        <a:t>()</a:t>
-                      </a:r>
-                      <a:endParaRPr lang="en-GB" sz="1400" dirty="0">
-                        <a:effectLst/>
-                        <a:latin typeface="Open Sans" panose="020B0606030504020204" pitchFamily="34" charset="0"/>
-                      </a:endParaRPr>
-                    </a:p>
-                  </a:txBody>
-                  <a:tcPr marL="28978" marR="28978" marT="40569" marB="40569" anchor="ctr">
-                    <a:lnL>
-                      <a:noFill/>
-                    </a:lnL>
-                    <a:lnR>
-                      <a:noFill/>
-                    </a:lnR>
-                    <a:lnT>
-                      <a:noFill/>
-                    </a:lnT>
-                    <a:lnB w="12700" cap="flat" cmpd="sng" algn="ctr">
-                      <a:solidFill>
-                        <a:schemeClr val="tx1"/>
-                      </a:solidFill>
-                      <a:prstDash val="solid"/>
-                      <a:round/>
-                      <a:headEnd type="none" w="med" len="med"/>
-                      <a:tailEnd type="none" w="med" len="med"/>
-                    </a:lnB>
-                  </a:tcPr>
-                </a:tc>
-                <a:tc>
-                  <a:txBody>
-                    <a:bodyPr/>
-                    <a:lstStyle/>
-                    <a:p>
-                      <a:pPr algn="l" fontAlgn="ctr"/>
-                      <a:r>
-                        <a:rPr lang="en-GB" sz="1400" dirty="0">
-                          <a:effectLst/>
-                          <a:latin typeface="Open Sans" panose="020B0606030504020204" pitchFamily="34" charset="0"/>
-                        </a:rPr>
-                        <a:t>Connect observations based on the order which they appear in the data.</a:t>
-                      </a:r>
-                    </a:p>
-                  </a:txBody>
-                  <a:tcPr marL="28978" marR="28978" marT="40569" marB="40569" anchor="ctr">
-                    <a:lnL>
-                      <a:noFill/>
-                    </a:lnL>
-                    <a:lnR>
-                      <a:noFill/>
-                    </a:lnR>
-                    <a:lnT>
-                      <a:noFill/>
-                    </a:lnT>
-                    <a:lnB w="12700" cap="flat" cmpd="sng" algn="ctr">
-                      <a:solidFill>
-                        <a:schemeClr val="tx1"/>
-                      </a:solidFill>
-                      <a:prstDash val="solid"/>
-                      <a:round/>
-                      <a:headEnd type="none" w="med" len="med"/>
-                      <a:tailEnd type="none" w="med" len="med"/>
-                    </a:lnB>
-                  </a:tcPr>
-                </a:tc>
-                <a:extLst>
-                  <a:ext uri="{0D108BD9-81ED-4DB2-BD59-A6C34878D82A}">
-                    <a16:rowId xmlns:a16="http://schemas.microsoft.com/office/drawing/2014/main" val="2122322100"/>
-                  </a:ext>
-                </a:extLst>
-              </a:tr>
-              <a:tr h="813630">
-                <a:tc>
-                  <a:txBody>
-                    <a:bodyPr/>
-                    <a:lstStyle/>
-                    <a:p>
-                      <a:pPr algn="l" fontAlgn="ctr"/>
-                      <a:r>
-                        <a:rPr lang="en-GB" sz="1400">
-                          <a:effectLst/>
-                          <a:latin typeface="Open Sans" panose="020B0606030504020204" pitchFamily="34" charset="0"/>
-                        </a:rPr>
-                        <a:t>Other</a:t>
-                      </a:r>
-                    </a:p>
-                  </a:txBody>
-                  <a:tcPr marL="28978" marR="28978" marT="40569" marB="40569" anchor="ctr">
-                    <a:lnL>
-                      <a:noFill/>
-                    </a:lnL>
-                    <a:lnR>
-                      <a:noFill/>
-                    </a:lnR>
-                    <a:lnT>
-                      <a:noFill/>
-                    </a:lnT>
-                    <a:lnB>
-                      <a:noFill/>
-                    </a:lnB>
-                  </a:tcPr>
-                </a:tc>
-                <a:tc>
-                  <a:txBody>
-                    <a:bodyPr/>
-                    <a:lstStyle/>
-                    <a:p>
-                      <a:pPr algn="l" fontAlgn="ctr"/>
-                      <a:r>
-                        <a:rPr lang="en-GB" sz="1400" b="1" dirty="0" err="1">
-                          <a:effectLst/>
-                          <a:latin typeface="Open Sans" panose="020B0606030504020204" pitchFamily="34" charset="0"/>
-                        </a:rPr>
-                        <a:t>geom_smooth</a:t>
-                      </a:r>
-                      <a:r>
-                        <a:rPr lang="en-GB" sz="1400" b="1" dirty="0">
-                          <a:effectLst/>
-                          <a:latin typeface="Open Sans" panose="020B0606030504020204" pitchFamily="34" charset="0"/>
-                        </a:rPr>
-                        <a:t>()</a:t>
-                      </a:r>
-                      <a:endParaRPr lang="en-GB" sz="1400" dirty="0">
-                        <a:effectLst/>
-                        <a:latin typeface="Open Sans" panose="020B0606030504020204" pitchFamily="34" charset="0"/>
-                      </a:endParaRPr>
-                    </a:p>
-                  </a:txBody>
-                  <a:tcPr marL="28978" marR="28978" marT="40569" marB="40569" anchor="ctr">
-                    <a:lnL>
-                      <a:noFill/>
-                    </a:lnL>
-                    <a:lnR>
-                      <a:noFill/>
-                    </a:lnR>
-                    <a:lnT w="12700" cap="flat" cmpd="sng" algn="ctr">
-                      <a:solidFill>
-                        <a:schemeClr val="tx1"/>
-                      </a:solidFill>
-                      <a:prstDash val="solid"/>
-                      <a:round/>
-                      <a:headEnd type="none" w="med" len="med"/>
-                      <a:tailEnd type="none" w="med" len="med"/>
-                    </a:lnT>
-                    <a:lnB>
-                      <a:noFill/>
-                    </a:lnB>
-                  </a:tcPr>
-                </a:tc>
-                <a:tc>
-                  <a:txBody>
-                    <a:bodyPr/>
-                    <a:lstStyle/>
-                    <a:p>
-                      <a:pPr algn="l" fontAlgn="ctr"/>
-                      <a:r>
-                        <a:rPr lang="en-GB" sz="1400" dirty="0">
-                          <a:effectLst/>
-                          <a:latin typeface="Open Sans" panose="020B0606030504020204" pitchFamily="34" charset="0"/>
-                        </a:rPr>
-                        <a:t>Aiding in the visualisation of patterns/smoothed models where overplotting (large numbers of data points overlapping in a single area) is an issue.</a:t>
-                      </a:r>
-                    </a:p>
-                  </a:txBody>
-                  <a:tcPr marL="28978" marR="28978" marT="40569" marB="40569" anchor="ctr">
-                    <a:lnL>
-                      <a:noFill/>
-                    </a:lnL>
-                    <a:lnR>
-                      <a:noFill/>
-                    </a:lnR>
-                    <a:lnT w="12700" cap="flat" cmpd="sng" algn="ctr">
-                      <a:solidFill>
-                        <a:schemeClr val="tx1"/>
-                      </a:solidFill>
-                      <a:prstDash val="solid"/>
-                      <a:round/>
-                      <a:headEnd type="none" w="med" len="med"/>
-                      <a:tailEnd type="none" w="med" len="med"/>
-                    </a:lnT>
-                    <a:lnB>
-                      <a:noFill/>
-                    </a:lnB>
-                  </a:tcPr>
-                </a:tc>
-                <a:extLst>
-                  <a:ext uri="{0D108BD9-81ED-4DB2-BD59-A6C34878D82A}">
-                    <a16:rowId xmlns:a16="http://schemas.microsoft.com/office/drawing/2014/main" val="1081080904"/>
-                  </a:ext>
-                </a:extLst>
-              </a:tr>
-            </a:tbl>
-          </a:graphicData>
-        </a:graphic>
-      </p:graphicFrame>
-    </p:spTree>
-    <p:extLst>
-      <p:ext uri="{BB962C8B-B14F-4D97-AF65-F5344CB8AC3E}">
-        <p14:creationId xmlns:p14="http://schemas.microsoft.com/office/powerpoint/2010/main" val="2359373971"/>
-      </p:ext>
-    </p:extLst>
-  </p:cSld>
-  <p:clrMapOvr>
-    <a:masterClrMapping/>
-  </p:clrMapOvr>
-</p:sld>
-</file>
-
-<file path=ppt/slides/slide13.xml><?xml version="1.0" encoding="utf-8"?>
-<p:sld xmlns:a="http://schemas.openxmlformats.org/drawingml/2006/main" xmlns:r="http://schemas.openxmlformats.org/officeDocument/2006/relationships" xmlns:p="http://schemas.openxmlformats.org/presentationml/2006/main">
-  <p:cSld>
-    <p:spTree>
-      <p:nvGrpSpPr>
-        <p:cNvPr id="1" name=""/>
-        <p:cNvGrpSpPr/>
-        <p:nvPr/>
-      </p:nvGrpSpPr>
-      <p:grpSpPr>
-        <a:xfrm>
-          <a:off x="0" y="0"/>
-          <a:ext cx="0" cy="0"/>
-          <a:chOff x="0" y="0"/>
-          <a:chExt cx="0" cy="0"/>
-        </a:xfrm>
-      </p:grpSpPr>
-      <p:sp>
-        <p:nvSpPr>
-          <p:cNvPr id="2" name="Title 1">
-            <a:extLst>
-              <a:ext uri="{FF2B5EF4-FFF2-40B4-BE49-F238E27FC236}">
-                <a16:creationId xmlns:a16="http://schemas.microsoft.com/office/drawing/2014/main" id="{DC6C9B58-EE8B-43B7-9EA7-4FB5C0C89F6C}"/>
-              </a:ext>
-            </a:extLst>
-          </p:cNvPr>
-          <p:cNvSpPr>
-            <a:spLocks noGrp="1"/>
-          </p:cNvSpPr>
-          <p:nvPr>
-            <p:ph type="title"/>
-          </p:nvPr>
-        </p:nvSpPr>
-        <p:spPr/>
-        <p:txBody>
-          <a:bodyPr/>
-          <a:lstStyle/>
-          <a:p>
-            <a:r>
-              <a:rPr lang="en-GB" dirty="0"/>
               <a:t>Geometry layers</a:t>
             </a:r>
           </a:p>
@@ -3986,7 +2845,7 @@
           <a:p>
             <a:r>
               <a:rPr lang="en-GB" dirty="0"/>
-              <a:t>Can add multiple </a:t>
+              <a:t>Adding multiple </a:t>
             </a:r>
             <a:r>
               <a:rPr lang="en-GB" dirty="0" err="1"/>
@@ -4494,7 +3353,7 @@
 </p:sld>
 </file>
 
-<file path=ppt/slides/slide14.xml><?xml version="1.0" encoding="utf-8"?>
+<file path=ppt/slides/slide13.xml><?xml version="1.0" encoding="utf-8"?>
 <p:sld xmlns:a="http://schemas.openxmlformats.org/drawingml/2006/main" xmlns:r="http://schemas.openxmlformats.org/officeDocument/2006/relationships" xmlns:p="http://schemas.openxmlformats.org/presentationml/2006/main">
   <p:cSld>
     <p:spTree>
@@ -4921,7 +3780,7 @@
 </p:sld>
 </file>
 
-<file path=ppt/slides/slide15.xml><?xml version="1.0" encoding="utf-8"?>
+<file path=ppt/slides/slide14.xml><?xml version="1.0" encoding="utf-8"?>
 <p:sld xmlns:a="http://schemas.openxmlformats.org/drawingml/2006/main" xmlns:r="http://schemas.openxmlformats.org/officeDocument/2006/relationships" xmlns:p="http://schemas.openxmlformats.org/presentationml/2006/main">
   <p:cSld>
     <p:spTree>
@@ -5829,7 +4688,7 @@
 </p:sld>
 </file>
 
-<file path=ppt/slides/slide16.xml><?xml version="1.0" encoding="utf-8"?>
+<file path=ppt/slides/slide15.xml><?xml version="1.0" encoding="utf-8"?>
 <p:sld xmlns:a="http://schemas.openxmlformats.org/drawingml/2006/main" xmlns:r="http://schemas.openxmlformats.org/officeDocument/2006/relationships" xmlns:p="http://schemas.openxmlformats.org/presentationml/2006/main">
   <p:cSld>
     <p:spTree>
@@ -6439,7 +5298,7 @@
 </p:sld>
 </file>
 
-<file path=ppt/slides/slide17.xml><?xml version="1.0" encoding="utf-8"?>
+<file path=ppt/slides/slide16.xml><?xml version="1.0" encoding="utf-8"?>
 <p:sld xmlns:a="http://schemas.openxmlformats.org/drawingml/2006/main" xmlns:r="http://schemas.openxmlformats.org/officeDocument/2006/relationships" xmlns:p="http://schemas.openxmlformats.org/presentationml/2006/main">
   <p:cSld>
     <p:spTree>
@@ -6589,7 +5448,7 @@
 </p:sld>
 </file>
 
-<file path=ppt/slides/slide18.xml><?xml version="1.0" encoding="utf-8"?>
+<file path=ppt/slides/slide17.xml><?xml version="1.0" encoding="utf-8"?>
 <p:sld xmlns:a="http://schemas.openxmlformats.org/drawingml/2006/main" xmlns:r="http://schemas.openxmlformats.org/officeDocument/2006/relationships" xmlns:p="http://schemas.openxmlformats.org/presentationml/2006/main">
   <p:cSld>
     <p:spTree>
@@ -7384,7 +6243,7 @@
 </p:sld>
 </file>
 
-<file path=ppt/slides/slide19.xml><?xml version="1.0" encoding="utf-8"?>
+<file path=ppt/slides/slide18.xml><?xml version="1.0" encoding="utf-8"?>
 <p:sld xmlns:a="http://schemas.openxmlformats.org/drawingml/2006/main" xmlns:r="http://schemas.openxmlformats.org/officeDocument/2006/relationships" xmlns:p="http://schemas.openxmlformats.org/presentationml/2006/main">
   <p:cSld>
     <p:spTree>
@@ -7461,6 +6320,194 @@
     <p:extLst>
       <p:ext uri="{BB962C8B-B14F-4D97-AF65-F5344CB8AC3E}">
         <p14:creationId xmlns:p14="http://schemas.microsoft.com/office/powerpoint/2010/main" val="1045435317"/>
+      </p:ext>
+    </p:extLst>
+  </p:cSld>
+  <p:clrMapOvr>
+    <a:masterClrMapping/>
+  </p:clrMapOvr>
+</p:sld>
+</file>
+
+<file path=ppt/slides/slide19.xml><?xml version="1.0" encoding="utf-8"?>
+<p:sld xmlns:a="http://schemas.openxmlformats.org/drawingml/2006/main" xmlns:r="http://schemas.openxmlformats.org/officeDocument/2006/relationships" xmlns:p="http://schemas.openxmlformats.org/presentationml/2006/main">
+  <p:cSld>
+    <p:spTree>
+      <p:nvGrpSpPr>
+        <p:cNvPr id="1" name=""/>
+        <p:cNvGrpSpPr/>
+        <p:nvPr/>
+      </p:nvGrpSpPr>
+      <p:grpSpPr>
+        <a:xfrm>
+          <a:off x="0" y="0"/>
+          <a:ext cx="0" cy="0"/>
+          <a:chOff x="0" y="0"/>
+          <a:chExt cx="0" cy="0"/>
+        </a:xfrm>
+      </p:grpSpPr>
+      <p:sp>
+        <p:nvSpPr>
+          <p:cNvPr id="2" name="Title 1">
+            <a:extLst>
+              <a:ext uri="{FF2B5EF4-FFF2-40B4-BE49-F238E27FC236}">
+                <a16:creationId xmlns:a16="http://schemas.microsoft.com/office/drawing/2014/main" id="{FA02A8F9-B3BA-44FB-8EFA-4C5746D380BA}"/>
+              </a:ext>
+            </a:extLst>
+          </p:cNvPr>
+          <p:cNvSpPr>
+            <a:spLocks noGrp="1"/>
+          </p:cNvSpPr>
+          <p:nvPr>
+            <p:ph type="title"/>
+          </p:nvPr>
+        </p:nvSpPr>
+        <p:spPr/>
+        <p:txBody>
+          <a:bodyPr/>
+          <a:lstStyle/>
+          <a:p>
+            <a:r>
+              <a:rPr lang="en-GB" dirty="0"/>
+              <a:t>Scales and axes</a:t>
+            </a:r>
+          </a:p>
+        </p:txBody>
+      </p:sp>
+      <p:sp>
+        <p:nvSpPr>
+          <p:cNvPr id="3" name="Content Placeholder 2">
+            <a:extLst>
+              <a:ext uri="{FF2B5EF4-FFF2-40B4-BE49-F238E27FC236}">
+                <a16:creationId xmlns:a16="http://schemas.microsoft.com/office/drawing/2014/main" id="{392C7B0E-C3AC-474A-AFE5-18A8C2D91E35}"/>
+              </a:ext>
+            </a:extLst>
+          </p:cNvPr>
+          <p:cNvSpPr>
+            <a:spLocks noGrp="1"/>
+          </p:cNvSpPr>
+          <p:nvPr>
+            <p:ph idx="1"/>
+          </p:nvPr>
+        </p:nvSpPr>
+        <p:spPr/>
+        <p:txBody>
+          <a:bodyPr/>
+          <a:lstStyle/>
+          <a:p>
+            <a:r>
+              <a:rPr lang="en-GB" dirty="0"/>
+              <a:t>Scales affect how the aesthetics are set up and control visual properties of the data values.</a:t>
+            </a:r>
+          </a:p>
+          <a:p>
+            <a:r>
+              <a:rPr lang="en-GB" dirty="0"/>
+              <a:t>Functions of the type scale_&lt;name&gt;_&lt;</a:t>
+            </a:r>
+            <a:r>
+              <a:rPr lang="en-GB" dirty="0" err="1"/>
+              <a:t>data_type</a:t>
+            </a:r>
+            <a:r>
+              <a:rPr lang="en-GB" dirty="0"/>
+              <a:t>&gt;</a:t>
+            </a:r>
+          </a:p>
+          <a:p>
+            <a:pPr lvl="1"/>
+            <a:r>
+              <a:rPr lang="en-GB" dirty="0"/>
+              <a:t>E.g. </a:t>
+            </a:r>
+            <a:r>
+              <a:rPr lang="en-GB" dirty="0" err="1">
+                <a:highlight>
+                  <a:srgbClr val="C0C0C0"/>
+                </a:highlight>
+                <a:latin typeface="Consolas" panose="020B0609020204030204" pitchFamily="49" charset="0"/>
+              </a:rPr>
+              <a:t>scale_x_contiuous</a:t>
+            </a:r>
+            <a:r>
+              <a:rPr lang="en-GB" dirty="0">
+                <a:highlight>
+                  <a:srgbClr val="C0C0C0"/>
+                </a:highlight>
+                <a:latin typeface="Consolas" panose="020B0609020204030204" pitchFamily="49" charset="0"/>
+              </a:rPr>
+              <a:t>()</a:t>
+            </a:r>
+            <a:r>
+              <a:rPr lang="en-GB" dirty="0"/>
+              <a:t>,  </a:t>
+            </a:r>
+            <a:r>
+              <a:rPr lang="en-GB" dirty="0" err="1">
+                <a:highlight>
+                  <a:srgbClr val="C0C0C0"/>
+                </a:highlight>
+                <a:latin typeface="Consolas" panose="020B0609020204030204" pitchFamily="49" charset="0"/>
+              </a:rPr>
+              <a:t>scale_y_discrete</a:t>
+            </a:r>
+            <a:r>
+              <a:rPr lang="en-GB" dirty="0">
+                <a:highlight>
+                  <a:srgbClr val="C0C0C0"/>
+                </a:highlight>
+                <a:latin typeface="Consolas" panose="020B0609020204030204" pitchFamily="49" charset="0"/>
+              </a:rPr>
+              <a:t>(), </a:t>
+            </a:r>
+            <a:r>
+              <a:rPr lang="en-GB" dirty="0" err="1">
+                <a:highlight>
+                  <a:srgbClr val="C0C0C0"/>
+                </a:highlight>
+                <a:latin typeface="Consolas" panose="020B0609020204030204" pitchFamily="49" charset="0"/>
+              </a:rPr>
+              <a:t>scale_colour_continuous</a:t>
+            </a:r>
+            <a:r>
+              <a:rPr lang="en-GB" dirty="0">
+                <a:highlight>
+                  <a:srgbClr val="C0C0C0"/>
+                </a:highlight>
+                <a:latin typeface="Consolas" panose="020B0609020204030204" pitchFamily="49" charset="0"/>
+              </a:rPr>
+              <a:t>()</a:t>
+            </a:r>
+          </a:p>
+          <a:p>
+            <a:r>
+              <a:rPr lang="en-GB" dirty="0"/>
+              <a:t>Within these you can define things such as: limits of the axes, labels and axis titles, colour palette, </a:t>
+            </a:r>
+          </a:p>
+          <a:p>
+            <a:endParaRPr lang="en-GB" dirty="0"/>
+          </a:p>
+          <a:p>
+            <a:r>
+              <a:rPr lang="en-GB" dirty="0"/>
+              <a:t>There are </a:t>
+            </a:r>
+            <a:r>
+              <a:rPr lang="en-GB" i="1" dirty="0"/>
+              <a:t>many, many</a:t>
+            </a:r>
+            <a:r>
+              <a:rPr lang="en-GB" dirty="0"/>
+              <a:t> scale options/ functions – do not try and memorise them all, just be aware that they are available!</a:t>
+            </a:r>
+          </a:p>
+        </p:txBody>
+      </p:sp>
+    </p:spTree>
+    <p:extLst>
+      <p:ext uri="{BB962C8B-B14F-4D97-AF65-F5344CB8AC3E}">
+        <p14:creationId xmlns:p14="http://schemas.microsoft.com/office/powerpoint/2010/main" val="3295144012"/>
       </p:ext>
     </p:extLst>
   </p:cSld>
@@ -7609,194 +6656,6 @@
           <p:cNvPr id="2" name="Title 1">
             <a:extLst>
               <a:ext uri="{FF2B5EF4-FFF2-40B4-BE49-F238E27FC236}">
-                <a16:creationId xmlns:a16="http://schemas.microsoft.com/office/drawing/2014/main" id="{FA02A8F9-B3BA-44FB-8EFA-4C5746D380BA}"/>
-              </a:ext>
-            </a:extLst>
-          </p:cNvPr>
-          <p:cNvSpPr>
-            <a:spLocks noGrp="1"/>
-          </p:cNvSpPr>
-          <p:nvPr>
-            <p:ph type="title"/>
-          </p:nvPr>
-        </p:nvSpPr>
-        <p:spPr/>
-        <p:txBody>
-          <a:bodyPr/>
-          <a:lstStyle/>
-          <a:p>
-            <a:r>
-              <a:rPr lang="en-GB" dirty="0"/>
-              <a:t>Scales and axes</a:t>
-            </a:r>
-          </a:p>
-        </p:txBody>
-      </p:sp>
-      <p:sp>
-        <p:nvSpPr>
-          <p:cNvPr id="3" name="Content Placeholder 2">
-            <a:extLst>
-              <a:ext uri="{FF2B5EF4-FFF2-40B4-BE49-F238E27FC236}">
-                <a16:creationId xmlns:a16="http://schemas.microsoft.com/office/drawing/2014/main" id="{392C7B0E-C3AC-474A-AFE5-18A8C2D91E35}"/>
-              </a:ext>
-            </a:extLst>
-          </p:cNvPr>
-          <p:cNvSpPr>
-            <a:spLocks noGrp="1"/>
-          </p:cNvSpPr>
-          <p:nvPr>
-            <p:ph idx="1"/>
-          </p:nvPr>
-        </p:nvSpPr>
-        <p:spPr/>
-        <p:txBody>
-          <a:bodyPr/>
-          <a:lstStyle/>
-          <a:p>
-            <a:r>
-              <a:rPr lang="en-GB" dirty="0"/>
-              <a:t>Scales affect how the aesthetics are set up and control visual properties of the data values.</a:t>
-            </a:r>
-          </a:p>
-          <a:p>
-            <a:r>
-              <a:rPr lang="en-GB" dirty="0"/>
-              <a:t>Functions of the type scale_&lt;name&gt;_&lt;</a:t>
-            </a:r>
-            <a:r>
-              <a:rPr lang="en-GB" dirty="0" err="1"/>
-              <a:t>data_type</a:t>
-            </a:r>
-            <a:r>
-              <a:rPr lang="en-GB" dirty="0"/>
-              <a:t>&gt;</a:t>
-            </a:r>
-          </a:p>
-          <a:p>
-            <a:pPr lvl="1"/>
-            <a:r>
-              <a:rPr lang="en-GB" dirty="0"/>
-              <a:t>E.g. </a:t>
-            </a:r>
-            <a:r>
-              <a:rPr lang="en-GB" dirty="0" err="1">
-                <a:highlight>
-                  <a:srgbClr val="C0C0C0"/>
-                </a:highlight>
-                <a:latin typeface="Consolas" panose="020B0609020204030204" pitchFamily="49" charset="0"/>
-              </a:rPr>
-              <a:t>scale_x_contiuous</a:t>
-            </a:r>
-            <a:r>
-              <a:rPr lang="en-GB" dirty="0">
-                <a:highlight>
-                  <a:srgbClr val="C0C0C0"/>
-                </a:highlight>
-                <a:latin typeface="Consolas" panose="020B0609020204030204" pitchFamily="49" charset="0"/>
-              </a:rPr>
-              <a:t>()</a:t>
-            </a:r>
-            <a:r>
-              <a:rPr lang="en-GB" dirty="0"/>
-              <a:t>,  </a:t>
-            </a:r>
-            <a:r>
-              <a:rPr lang="en-GB" dirty="0" err="1">
-                <a:highlight>
-                  <a:srgbClr val="C0C0C0"/>
-                </a:highlight>
-                <a:latin typeface="Consolas" panose="020B0609020204030204" pitchFamily="49" charset="0"/>
-              </a:rPr>
-              <a:t>scale_y_discrete</a:t>
-            </a:r>
-            <a:r>
-              <a:rPr lang="en-GB" dirty="0">
-                <a:highlight>
-                  <a:srgbClr val="C0C0C0"/>
-                </a:highlight>
-                <a:latin typeface="Consolas" panose="020B0609020204030204" pitchFamily="49" charset="0"/>
-              </a:rPr>
-              <a:t>(), </a:t>
-            </a:r>
-            <a:r>
-              <a:rPr lang="en-GB" dirty="0" err="1">
-                <a:highlight>
-                  <a:srgbClr val="C0C0C0"/>
-                </a:highlight>
-                <a:latin typeface="Consolas" panose="020B0609020204030204" pitchFamily="49" charset="0"/>
-              </a:rPr>
-              <a:t>scale_colour_continuous</a:t>
-            </a:r>
-            <a:r>
-              <a:rPr lang="en-GB" dirty="0">
-                <a:highlight>
-                  <a:srgbClr val="C0C0C0"/>
-                </a:highlight>
-                <a:latin typeface="Consolas" panose="020B0609020204030204" pitchFamily="49" charset="0"/>
-              </a:rPr>
-              <a:t>()</a:t>
-            </a:r>
-          </a:p>
-          <a:p>
-            <a:r>
-              <a:rPr lang="en-GB" dirty="0"/>
-              <a:t>Within these you can define things such as: limits of the axes, labels and axis titles, colour palette, </a:t>
-            </a:r>
-          </a:p>
-          <a:p>
-            <a:endParaRPr lang="en-GB" dirty="0"/>
-          </a:p>
-          <a:p>
-            <a:r>
-              <a:rPr lang="en-GB" dirty="0"/>
-              <a:t>There are </a:t>
-            </a:r>
-            <a:r>
-              <a:rPr lang="en-GB" i="1" dirty="0"/>
-              <a:t>many, many</a:t>
-            </a:r>
-            <a:r>
-              <a:rPr lang="en-GB" dirty="0"/>
-              <a:t> scale options/ functions – do not try and memorise them all, just be aware that they are available!</a:t>
-            </a:r>
-          </a:p>
-        </p:txBody>
-      </p:sp>
-    </p:spTree>
-    <p:extLst>
-      <p:ext uri="{BB962C8B-B14F-4D97-AF65-F5344CB8AC3E}">
-        <p14:creationId xmlns:p14="http://schemas.microsoft.com/office/powerpoint/2010/main" val="3295144012"/>
-      </p:ext>
-    </p:extLst>
-  </p:cSld>
-  <p:clrMapOvr>
-    <a:masterClrMapping/>
-  </p:clrMapOvr>
-</p:sld>
-</file>
-
-<file path=ppt/slides/slide21.xml><?xml version="1.0" encoding="utf-8"?>
-<p:sld xmlns:a="http://schemas.openxmlformats.org/drawingml/2006/main" xmlns:r="http://schemas.openxmlformats.org/officeDocument/2006/relationships" xmlns:p="http://schemas.openxmlformats.org/presentationml/2006/main">
-  <p:cSld>
-    <p:spTree>
-      <p:nvGrpSpPr>
-        <p:cNvPr id="1" name=""/>
-        <p:cNvGrpSpPr/>
-        <p:nvPr/>
-      </p:nvGrpSpPr>
-      <p:grpSpPr>
-        <a:xfrm>
-          <a:off x="0" y="0"/>
-          <a:ext cx="0" cy="0"/>
-          <a:chOff x="0" y="0"/>
-          <a:chExt cx="0" cy="0"/>
-        </a:xfrm>
-      </p:grpSpPr>
-      <p:sp>
-        <p:nvSpPr>
-          <p:cNvPr id="2" name="Title 1">
-            <a:extLst>
-              <a:ext uri="{FF2B5EF4-FFF2-40B4-BE49-F238E27FC236}">
                 <a16:creationId xmlns:a16="http://schemas.microsoft.com/office/drawing/2014/main" id="{17BE9EC1-77AE-48E9-993B-FE6712862D5B}"/>
               </a:ext>
             </a:extLst>
@@ -7861,7 +6720,7 @@
 </p:sld>
 </file>
 
-<file path=ppt/slides/slide22.xml><?xml version="1.0" encoding="utf-8"?>
+<file path=ppt/slides/slide21.xml><?xml version="1.0" encoding="utf-8"?>
 <p:sld xmlns:a="http://schemas.openxmlformats.org/drawingml/2006/main" xmlns:r="http://schemas.openxmlformats.org/officeDocument/2006/relationships" xmlns:p="http://schemas.openxmlformats.org/presentationml/2006/main">
   <p:cSld>
     <p:spTree>
@@ -8048,7 +6907,7 @@
 </p:sld>
 </file>
 
-<file path=ppt/slides/slide23.xml><?xml version="1.0" encoding="utf-8"?>
+<file path=ppt/slides/slide22.xml><?xml version="1.0" encoding="utf-8"?>
 <p:sld xmlns:a="http://schemas.openxmlformats.org/drawingml/2006/main" xmlns:r="http://schemas.openxmlformats.org/officeDocument/2006/relationships" xmlns:p="http://schemas.openxmlformats.org/presentationml/2006/main">
   <p:cSld>
     <p:spTree>
@@ -9855,6 +8714,236 @@
 </p:sld>
 </file>
 
+<file path=ppt/slides/slide23.xml><?xml version="1.0" encoding="utf-8"?>
+<p:sld xmlns:a="http://schemas.openxmlformats.org/drawingml/2006/main" xmlns:r="http://schemas.openxmlformats.org/officeDocument/2006/relationships" xmlns:p="http://schemas.openxmlformats.org/presentationml/2006/main">
+  <p:cSld>
+    <p:spTree>
+      <p:nvGrpSpPr>
+        <p:cNvPr id="1" name=""/>
+        <p:cNvGrpSpPr/>
+        <p:nvPr/>
+      </p:nvGrpSpPr>
+      <p:grpSpPr>
+        <a:xfrm>
+          <a:off x="0" y="0"/>
+          <a:ext cx="0" cy="0"/>
+          <a:chOff x="0" y="0"/>
+          <a:chExt cx="0" cy="0"/>
+        </a:xfrm>
+      </p:grpSpPr>
+      <p:sp>
+        <p:nvSpPr>
+          <p:cNvPr id="2" name="Title 1">
+            <a:extLst>
+              <a:ext uri="{FF2B5EF4-FFF2-40B4-BE49-F238E27FC236}">
+                <a16:creationId xmlns:a16="http://schemas.microsoft.com/office/drawing/2014/main" id="{E1BC343E-497F-413D-8A05-8F6319857A99}"/>
+              </a:ext>
+            </a:extLst>
+          </p:cNvPr>
+          <p:cNvSpPr>
+            <a:spLocks noGrp="1"/>
+          </p:cNvSpPr>
+          <p:nvPr>
+            <p:ph type="title"/>
+          </p:nvPr>
+        </p:nvSpPr>
+        <p:spPr/>
+        <p:txBody>
+          <a:bodyPr/>
+          <a:lstStyle/>
+          <a:p>
+            <a:r>
+              <a:rPr lang="en-GB" dirty="0"/>
+              <a:t>Themes</a:t>
+            </a:r>
+          </a:p>
+        </p:txBody>
+      </p:sp>
+      <p:sp>
+        <p:nvSpPr>
+          <p:cNvPr id="3" name="Content Placeholder 2">
+            <a:extLst>
+              <a:ext uri="{FF2B5EF4-FFF2-40B4-BE49-F238E27FC236}">
+                <a16:creationId xmlns:a16="http://schemas.microsoft.com/office/drawing/2014/main" id="{59922AFD-6058-464E-9E59-79680CD5743F}"/>
+              </a:ext>
+            </a:extLst>
+          </p:cNvPr>
+          <p:cNvSpPr>
+            <a:spLocks noGrp="1"/>
+          </p:cNvSpPr>
+          <p:nvPr>
+            <p:ph idx="1"/>
+          </p:nvPr>
+        </p:nvSpPr>
+        <p:spPr>
+          <a:xfrm>
+            <a:off x="838200" y="1825625"/>
+            <a:ext cx="9072716" cy="4351338"/>
+          </a:xfrm>
+        </p:spPr>
+        <p:txBody>
+          <a:bodyPr>
+            <a:normAutofit/>
+          </a:bodyPr>
+          <a:lstStyle/>
+          <a:p>
+            <a:r>
+              <a:rPr lang="en-GB" dirty="0">
+                <a:hlinkClick r:id="rId2"/>
+              </a:rPr>
+              <a:t>https://github.com/Public-Health-Scotland/phsstyles</a:t>
+            </a:r>
+            <a:r>
+              <a:rPr lang="en-GB" dirty="0"/>
+              <a:t> </a:t>
+            </a:r>
+          </a:p>
+          <a:p>
+            <a:endParaRPr lang="en-GB" dirty="0">
+              <a:highlight>
+                <a:srgbClr val="C0C0C0"/>
+              </a:highlight>
+            </a:endParaRPr>
+          </a:p>
+          <a:p>
+            <a:r>
+              <a:rPr lang="en-GB" dirty="0" err="1">
+                <a:highlight>
+                  <a:srgbClr val="C0C0C0"/>
+                </a:highlight>
+              </a:rPr>
+              <a:t>phstheme</a:t>
+            </a:r>
+            <a:r>
+              <a:rPr lang="en-GB" dirty="0">
+                <a:highlight>
+                  <a:srgbClr val="C0C0C0"/>
+                </a:highlight>
+              </a:rPr>
+              <a:t>()</a:t>
+            </a:r>
+          </a:p>
+        </p:txBody>
+      </p:sp>
+      <p:sp>
+        <p:nvSpPr>
+          <p:cNvPr id="5" name="Rectangle 1">
+            <a:extLst>
+              <a:ext uri="{FF2B5EF4-FFF2-40B4-BE49-F238E27FC236}">
+                <a16:creationId xmlns:a16="http://schemas.microsoft.com/office/drawing/2014/main" id="{6E9A4091-557D-4E09-A992-E1C0F8077E6A}"/>
+              </a:ext>
+            </a:extLst>
+          </p:cNvPr>
+          <p:cNvSpPr>
+            <a:spLocks noChangeArrowheads="1"/>
+          </p:cNvSpPr>
+          <p:nvPr/>
+        </p:nvSpPr>
+        <p:spPr bwMode="auto">
+          <a:xfrm>
+            <a:off x="1922463" y="1696135"/>
+            <a:ext cx="9673335" cy="646331"/>
+          </a:xfrm>
+          <a:prstGeom prst="rect">
+            <a:avLst/>
+          </a:prstGeom>
+          <a:noFill/>
+          <a:ln>
+            <a:noFill/>
+          </a:ln>
+          <a:effectLst/>
+          <a:extLst>
+            <a:ext uri="{909E8E84-426E-40DD-AFC4-6F175D3DCCD1}">
+              <a14:hiddenFill xmlns:a14="http://schemas.microsoft.com/office/drawing/2010/main">
+                <a:solidFill>
+                  <a:schemeClr val="accent1"/>
+                </a:solidFill>
+              </a14:hiddenFill>
+            </a:ext>
+            <a:ext uri="{91240B29-F687-4F45-9708-019B960494DF}">
+              <a14:hiddenLine xmlns:a14="http://schemas.microsoft.com/office/drawing/2010/main" w="9525">
+                <a:solidFill>
+                  <a:schemeClr val="tx1"/>
+                </a:solidFill>
+                <a:miter lim="800000"/>
+                <a:headEnd/>
+                <a:tailEnd/>
+              </a14:hiddenLine>
+            </a:ext>
+            <a:ext uri="{AF507438-7753-43E0-B8FC-AC1667EBCBE1}">
+              <a14:hiddenEffects xmlns:a14="http://schemas.microsoft.com/office/drawing/2010/main">
+                <a:effectLst>
+                  <a:outerShdw dist="35921" dir="2700000" algn="ctr" rotWithShape="0">
+                    <a:schemeClr val="bg2"/>
+                  </a:outerShdw>
+                </a:effectLst>
+              </a14:hiddenEffects>
+            </a:ext>
+          </a:extLst>
+        </p:spPr>
+        <p:txBody>
+          <a:bodyPr vert="horz" wrap="square" lIns="91440" tIns="45720" rIns="91440" bIns="45720" numCol="1" anchor="ctr" anchorCtr="0" compatLnSpc="1">
+            <a:prstTxWarp prst="textNoShape">
+              <a:avLst/>
+            </a:prstTxWarp>
+            <a:spAutoFit/>
+          </a:bodyPr>
+          <a:lstStyle/>
+          <a:p>
+            <a:pPr marL="0" marR="0" lvl="0" indent="0" algn="l" defTabSz="914400" rtl="0" eaLnBrk="0" fontAlgn="base" latinLnBrk="0" hangingPunct="0">
+              <a:lnSpc>
+                <a:spcPct val="100000"/>
+              </a:lnSpc>
+              <a:spcBef>
+                <a:spcPct val="0"/>
+              </a:spcBef>
+              <a:spcAft>
+                <a:spcPct val="0"/>
+              </a:spcAft>
+              <a:buClrTx/>
+              <a:buSzTx/>
+              <a:buFontTx/>
+              <a:buNone/>
+              <a:tabLst/>
+            </a:pPr>
+            <a:br>
+              <a:rPr kumimoji="0" lang="en-US" altLang="en-US" sz="1800" b="0" i="0" u="none" strike="noStrike" cap="none" normalizeH="0" baseline="0">
+                <a:ln>
+                  <a:noFill/>
+                </a:ln>
+                <a:solidFill>
+                  <a:schemeClr val="tx1"/>
+                </a:solidFill>
+                <a:effectLst/>
+                <a:latin typeface="Open Sans" panose="020B0606030504020204" pitchFamily="34" charset="0"/>
+              </a:rPr>
+            </a:br>
+            <a:endParaRPr kumimoji="0" lang="en-US" altLang="en-US" sz="1800" b="0" i="0" u="none" strike="noStrike" cap="none" normalizeH="0" baseline="0">
+              <a:ln>
+                <a:noFill/>
+              </a:ln>
+              <a:solidFill>
+                <a:schemeClr val="tx1"/>
+              </a:solidFill>
+              <a:effectLst/>
+              <a:latin typeface="Arial" panose="020B0604020202020204" pitchFamily="34" charset="0"/>
+            </a:endParaRPr>
+          </a:p>
+        </p:txBody>
+      </p:sp>
+    </p:spTree>
+    <p:extLst>
+      <p:ext uri="{BB962C8B-B14F-4D97-AF65-F5344CB8AC3E}">
+        <p14:creationId xmlns:p14="http://schemas.microsoft.com/office/powerpoint/2010/main" val="3821166661"/>
+      </p:ext>
+    </p:extLst>
+  </p:cSld>
+  <p:clrMapOvr>
+    <a:masterClrMapping/>
+  </p:clrMapOvr>
+</p:sld>
+</file>
+
 <file path=ppt/slides/slide24.xml><?xml version="1.0" encoding="utf-8"?>
 <p:sld xmlns:a="http://schemas.openxmlformats.org/drawingml/2006/main" xmlns:r="http://schemas.openxmlformats.org/officeDocument/2006/relationships" xmlns:p="http://schemas.openxmlformats.org/presentationml/2006/main">
   <p:cSld>
@@ -9942,6 +9031,790 @@
 </file>
 
 <file path=ppt/slides/slide25.xml><?xml version="1.0" encoding="utf-8"?>
+<p:sld xmlns:a="http://schemas.openxmlformats.org/drawingml/2006/main" xmlns:r="http://schemas.openxmlformats.org/officeDocument/2006/relationships" xmlns:p="http://schemas.openxmlformats.org/presentationml/2006/main">
+  <p:cSld>
+    <p:spTree>
+      <p:nvGrpSpPr>
+        <p:cNvPr id="1" name=""/>
+        <p:cNvGrpSpPr/>
+        <p:nvPr/>
+      </p:nvGrpSpPr>
+      <p:grpSpPr>
+        <a:xfrm>
+          <a:off x="0" y="0"/>
+          <a:ext cx="0" cy="0"/>
+          <a:chOff x="0" y="0"/>
+          <a:chExt cx="0" cy="0"/>
+        </a:xfrm>
+      </p:grpSpPr>
+      <p:sp>
+        <p:nvSpPr>
+          <p:cNvPr id="2" name="Title 1">
+            <a:extLst>
+              <a:ext uri="{FF2B5EF4-FFF2-40B4-BE49-F238E27FC236}">
+                <a16:creationId xmlns:a16="http://schemas.microsoft.com/office/drawing/2014/main" id="{6B1E6439-F092-4DD7-115F-3E6600F4B508}"/>
+              </a:ext>
+            </a:extLst>
+          </p:cNvPr>
+          <p:cNvSpPr>
+            <a:spLocks noGrp="1"/>
+          </p:cNvSpPr>
+          <p:nvPr>
+            <p:ph type="title"/>
+          </p:nvPr>
+        </p:nvSpPr>
+        <p:spPr/>
+        <p:txBody>
+          <a:bodyPr/>
+          <a:lstStyle/>
+          <a:p>
+            <a:r>
+              <a:rPr lang="en-GB" dirty="0"/>
+              <a:t>Summary – building up a </a:t>
+            </a:r>
+            <a:r>
+              <a:rPr lang="en-GB" dirty="0" err="1"/>
+              <a:t>ggplot</a:t>
+            </a:r>
+            <a:endParaRPr lang="en-GB" dirty="0"/>
+          </a:p>
+        </p:txBody>
+      </p:sp>
+      <p:sp>
+        <p:nvSpPr>
+          <p:cNvPr id="4" name="Content Placeholder 3">
+            <a:extLst>
+              <a:ext uri="{FF2B5EF4-FFF2-40B4-BE49-F238E27FC236}">
+                <a16:creationId xmlns:a16="http://schemas.microsoft.com/office/drawing/2014/main" id="{7334930E-3C4B-8D2F-ADF0-D07A47935800}"/>
+              </a:ext>
+            </a:extLst>
+          </p:cNvPr>
+          <p:cNvSpPr txBox="1">
+            <a:spLocks noGrp="1"/>
+          </p:cNvSpPr>
+          <p:nvPr>
+            <p:ph idx="1"/>
+          </p:nvPr>
+        </p:nvSpPr>
+        <p:spPr>
+          <a:xfrm>
+            <a:off x="806245" y="1864954"/>
+            <a:ext cx="4247536" cy="1045414"/>
+          </a:xfrm>
+          <a:prstGeom prst="rect">
+            <a:avLst/>
+          </a:prstGeom>
+          <a:solidFill>
+            <a:schemeClr val="bg1">
+              <a:lumMod val="95000"/>
+            </a:schemeClr>
+          </a:solidFill>
+        </p:spPr>
+        <p:txBody>
+          <a:bodyPr wrap="square">
+            <a:spAutoFit/>
+          </a:bodyPr>
+          <a:lstStyle/>
+          <a:p>
+            <a:pPr marL="0" indent="0">
+              <a:buNone/>
+            </a:pPr>
+            <a:r>
+              <a:rPr lang="en-GB" sz="1800" dirty="0" err="1">
+                <a:latin typeface="Consolas" panose="020B0609020204030204" pitchFamily="49" charset="0"/>
+              </a:rPr>
+              <a:t>ggplot</a:t>
+            </a:r>
+            <a:r>
+              <a:rPr lang="en-GB" sz="1800" dirty="0">
+                <a:latin typeface="Consolas" panose="020B0609020204030204" pitchFamily="49" charset="0"/>
+              </a:rPr>
+              <a:t>(data, </a:t>
+            </a:r>
+            <a:r>
+              <a:rPr lang="en-GB" sz="1800" dirty="0" err="1">
+                <a:latin typeface="Consolas" panose="020B0609020204030204" pitchFamily="49" charset="0"/>
+              </a:rPr>
+              <a:t>aes</a:t>
+            </a:r>
+            <a:r>
+              <a:rPr lang="en-GB" sz="1800" dirty="0">
+                <a:latin typeface="Consolas" panose="020B0609020204030204" pitchFamily="49" charset="0"/>
+              </a:rPr>
+              <a:t>(x=</a:t>
+            </a:r>
+            <a:r>
+              <a:rPr lang="en-GB" sz="1800" dirty="0" err="1">
+                <a:latin typeface="Consolas" panose="020B0609020204030204" pitchFamily="49" charset="0"/>
+              </a:rPr>
+              <a:t>wt</a:t>
+            </a:r>
+            <a:r>
+              <a:rPr lang="en-GB" sz="1800" dirty="0">
+                <a:latin typeface="Consolas" panose="020B0609020204030204" pitchFamily="49" charset="0"/>
+              </a:rPr>
+              <a:t>, y=mpg)) +</a:t>
+            </a:r>
+          </a:p>
+          <a:p>
+            <a:pPr marL="0" indent="0">
+              <a:buNone/>
+            </a:pPr>
+            <a:r>
+              <a:rPr lang="en-GB" sz="1800" dirty="0">
+                <a:latin typeface="Consolas" panose="020B0609020204030204" pitchFamily="49" charset="0"/>
+              </a:rPr>
+              <a:t> </a:t>
+            </a:r>
+            <a:r>
+              <a:rPr lang="en-GB" sz="1800" dirty="0" err="1">
+                <a:latin typeface="Consolas" panose="020B0609020204030204" pitchFamily="49" charset="0"/>
+              </a:rPr>
+              <a:t>geom_point</a:t>
+            </a:r>
+            <a:r>
+              <a:rPr lang="en-GB" sz="1800" dirty="0">
+                <a:latin typeface="Consolas" panose="020B0609020204030204" pitchFamily="49" charset="0"/>
+              </a:rPr>
+              <a:t>(colour=“red”) +</a:t>
+            </a:r>
+          </a:p>
+          <a:p>
+            <a:pPr marL="0" indent="0">
+              <a:buNone/>
+            </a:pPr>
+            <a:r>
+              <a:rPr lang="en-GB" sz="1800" dirty="0">
+                <a:latin typeface="Consolas" panose="020B0609020204030204" pitchFamily="49" charset="0"/>
+              </a:rPr>
+              <a:t> </a:t>
+            </a:r>
+            <a:r>
+              <a:rPr lang="en-GB" sz="1800" dirty="0" err="1">
+                <a:latin typeface="Consolas" panose="020B0609020204030204" pitchFamily="49" charset="0"/>
+              </a:rPr>
+              <a:t>theme_phs</a:t>
+            </a:r>
+            <a:r>
+              <a:rPr lang="en-GB" sz="1800" dirty="0">
+                <a:latin typeface="Consolas" panose="020B0609020204030204" pitchFamily="49" charset="0"/>
+              </a:rPr>
+              <a:t>()</a:t>
+            </a:r>
+          </a:p>
+        </p:txBody>
+      </p:sp>
+      <p:sp>
+        <p:nvSpPr>
+          <p:cNvPr id="5" name="Content Placeholder 3">
+            <a:extLst>
+              <a:ext uri="{FF2B5EF4-FFF2-40B4-BE49-F238E27FC236}">
+                <a16:creationId xmlns:a16="http://schemas.microsoft.com/office/drawing/2014/main" id="{04F6753E-40B5-1590-C8B0-251DE6BBFE8A}"/>
+              </a:ext>
+            </a:extLst>
+          </p:cNvPr>
+          <p:cNvSpPr txBox="1">
+            <a:spLocks/>
+          </p:cNvSpPr>
+          <p:nvPr/>
+        </p:nvSpPr>
+        <p:spPr>
+          <a:xfrm>
+            <a:off x="6213987" y="1852334"/>
+            <a:ext cx="5338916" cy="1294713"/>
+          </a:xfrm>
+          <a:prstGeom prst="rect">
+            <a:avLst/>
+          </a:prstGeom>
+          <a:solidFill>
+            <a:schemeClr val="bg1">
+              <a:lumMod val="95000"/>
+            </a:schemeClr>
+          </a:solidFill>
+        </p:spPr>
+        <p:txBody>
+          <a:bodyPr vert="horz" wrap="square" lIns="91440" tIns="45720" rIns="91440" bIns="45720" rtlCol="0">
+            <a:spAutoFit/>
+          </a:bodyPr>
+          <a:lstStyle>
+            <a:lvl1pPr marL="171450" indent="-171450" algn="l" defTabSz="685800" rtl="0" eaLnBrk="1" latinLnBrk="0" hangingPunct="1">
+              <a:lnSpc>
+                <a:spcPct val="90000"/>
+              </a:lnSpc>
+              <a:spcBef>
+                <a:spcPts val="750"/>
+              </a:spcBef>
+              <a:buFont typeface="Arial" panose="020B0604020202020204" pitchFamily="34" charset="0"/>
+              <a:buChar char="•"/>
+              <a:defRPr sz="2400" kern="1200">
+                <a:solidFill>
+                  <a:schemeClr val="tx1"/>
+                </a:solidFill>
+                <a:latin typeface="Arial" panose="020B0604020202020204" pitchFamily="34" charset="0"/>
+                <a:ea typeface="+mn-ea"/>
+                <a:cs typeface="Arial" panose="020B0604020202020204" pitchFamily="34" charset="0"/>
+              </a:defRPr>
+            </a:lvl1pPr>
+            <a:lvl2pPr marL="514350" indent="-171450" algn="l" defTabSz="685800" rtl="0" eaLnBrk="1" latinLnBrk="0" hangingPunct="1">
+              <a:lnSpc>
+                <a:spcPct val="90000"/>
+              </a:lnSpc>
+              <a:spcBef>
+                <a:spcPts val="375"/>
+              </a:spcBef>
+              <a:buFont typeface="Arial" panose="020B0604020202020204" pitchFamily="34" charset="0"/>
+              <a:buChar char="•"/>
+              <a:defRPr sz="2100" kern="1200">
+                <a:solidFill>
+                  <a:schemeClr val="tx1"/>
+                </a:solidFill>
+                <a:latin typeface="Arial" panose="020B0604020202020204" pitchFamily="34" charset="0"/>
+                <a:ea typeface="+mn-ea"/>
+                <a:cs typeface="Arial" panose="020B0604020202020204" pitchFamily="34" charset="0"/>
+              </a:defRPr>
+            </a:lvl2pPr>
+            <a:lvl3pPr marL="857250" indent="-171450" algn="l" defTabSz="685800" rtl="0" eaLnBrk="1" latinLnBrk="0" hangingPunct="1">
+              <a:lnSpc>
+                <a:spcPct val="90000"/>
+              </a:lnSpc>
+              <a:spcBef>
+                <a:spcPts val="375"/>
+              </a:spcBef>
+              <a:buFont typeface="Arial" panose="020B0604020202020204" pitchFamily="34" charset="0"/>
+              <a:buChar char="•"/>
+              <a:defRPr sz="1500" kern="1200">
+                <a:solidFill>
+                  <a:schemeClr val="tx1"/>
+                </a:solidFill>
+                <a:latin typeface="+mn-lt"/>
+                <a:ea typeface="+mn-ea"/>
+                <a:cs typeface="+mn-cs"/>
+              </a:defRPr>
+            </a:lvl3pPr>
+            <a:lvl4pPr marL="1200150" indent="-171450" algn="l" defTabSz="685800" rtl="0" eaLnBrk="1" latinLnBrk="0" hangingPunct="1">
+              <a:lnSpc>
+                <a:spcPct val="90000"/>
+              </a:lnSpc>
+              <a:spcBef>
+                <a:spcPts val="375"/>
+              </a:spcBef>
+              <a:buFont typeface="Arial" panose="020B0604020202020204" pitchFamily="34" charset="0"/>
+              <a:buChar char="•"/>
+              <a:defRPr sz="1350" kern="1200">
+                <a:solidFill>
+                  <a:schemeClr val="tx1"/>
+                </a:solidFill>
+                <a:latin typeface="+mn-lt"/>
+                <a:ea typeface="+mn-ea"/>
+                <a:cs typeface="+mn-cs"/>
+              </a:defRPr>
+            </a:lvl4pPr>
+            <a:lvl5pPr marL="1543050" indent="-171450" algn="l" defTabSz="685800" rtl="0" eaLnBrk="1" latinLnBrk="0" hangingPunct="1">
+              <a:lnSpc>
+                <a:spcPct val="90000"/>
+              </a:lnSpc>
+              <a:spcBef>
+                <a:spcPts val="375"/>
+              </a:spcBef>
+              <a:buFont typeface="Arial" panose="020B0604020202020204" pitchFamily="34" charset="0"/>
+              <a:buChar char="•"/>
+              <a:defRPr sz="1350" kern="1200">
+                <a:solidFill>
+                  <a:schemeClr val="tx1"/>
+                </a:solidFill>
+                <a:latin typeface="+mn-lt"/>
+                <a:ea typeface="+mn-ea"/>
+                <a:cs typeface="+mn-cs"/>
+              </a:defRPr>
+            </a:lvl5pPr>
+            <a:lvl6pPr marL="1885950" indent="-171450" algn="l" defTabSz="685800" rtl="0" eaLnBrk="1" latinLnBrk="0" hangingPunct="1">
+              <a:lnSpc>
+                <a:spcPct val="90000"/>
+              </a:lnSpc>
+              <a:spcBef>
+                <a:spcPts val="375"/>
+              </a:spcBef>
+              <a:buFont typeface="Arial" panose="020B0604020202020204" pitchFamily="34" charset="0"/>
+              <a:buChar char="•"/>
+              <a:defRPr sz="1350" kern="1200">
+                <a:solidFill>
+                  <a:schemeClr val="tx1"/>
+                </a:solidFill>
+                <a:latin typeface="+mn-lt"/>
+                <a:ea typeface="+mn-ea"/>
+                <a:cs typeface="+mn-cs"/>
+              </a:defRPr>
+            </a:lvl6pPr>
+            <a:lvl7pPr marL="2228850" indent="-171450" algn="l" defTabSz="685800" rtl="0" eaLnBrk="1" latinLnBrk="0" hangingPunct="1">
+              <a:lnSpc>
+                <a:spcPct val="90000"/>
+              </a:lnSpc>
+              <a:spcBef>
+                <a:spcPts val="375"/>
+              </a:spcBef>
+              <a:buFont typeface="Arial" panose="020B0604020202020204" pitchFamily="34" charset="0"/>
+              <a:buChar char="•"/>
+              <a:defRPr sz="1350" kern="1200">
+                <a:solidFill>
+                  <a:schemeClr val="tx1"/>
+                </a:solidFill>
+                <a:latin typeface="+mn-lt"/>
+                <a:ea typeface="+mn-ea"/>
+                <a:cs typeface="+mn-cs"/>
+              </a:defRPr>
+            </a:lvl7pPr>
+            <a:lvl8pPr marL="2571750" indent="-171450" algn="l" defTabSz="685800" rtl="0" eaLnBrk="1" latinLnBrk="0" hangingPunct="1">
+              <a:lnSpc>
+                <a:spcPct val="90000"/>
+              </a:lnSpc>
+              <a:spcBef>
+                <a:spcPts val="375"/>
+              </a:spcBef>
+              <a:buFont typeface="Arial" panose="020B0604020202020204" pitchFamily="34" charset="0"/>
+              <a:buChar char="•"/>
+              <a:defRPr sz="1350" kern="1200">
+                <a:solidFill>
+                  <a:schemeClr val="tx1"/>
+                </a:solidFill>
+                <a:latin typeface="+mn-lt"/>
+                <a:ea typeface="+mn-ea"/>
+                <a:cs typeface="+mn-cs"/>
+              </a:defRPr>
+            </a:lvl8pPr>
+            <a:lvl9pPr marL="2914650" indent="-171450" algn="l" defTabSz="685800" rtl="0" eaLnBrk="1" latinLnBrk="0" hangingPunct="1">
+              <a:lnSpc>
+                <a:spcPct val="90000"/>
+              </a:lnSpc>
+              <a:spcBef>
+                <a:spcPts val="375"/>
+              </a:spcBef>
+              <a:buFont typeface="Arial" panose="020B0604020202020204" pitchFamily="34" charset="0"/>
+              <a:buChar char="•"/>
+              <a:defRPr sz="1350" kern="1200">
+                <a:solidFill>
+                  <a:schemeClr val="tx1"/>
+                </a:solidFill>
+                <a:latin typeface="+mn-lt"/>
+                <a:ea typeface="+mn-ea"/>
+                <a:cs typeface="+mn-cs"/>
+              </a:defRPr>
+            </a:lvl9pPr>
+          </a:lstStyle>
+          <a:p>
+            <a:pPr marL="0" indent="0">
+              <a:buFont typeface="Arial" panose="020B0604020202020204" pitchFamily="34" charset="0"/>
+              <a:buNone/>
+            </a:pPr>
+            <a:r>
+              <a:rPr lang="en-GB" sz="1800" dirty="0" err="1">
+                <a:latin typeface="Consolas" panose="020B0609020204030204" pitchFamily="49" charset="0"/>
+              </a:rPr>
+              <a:t>ggplot</a:t>
+            </a:r>
+            <a:r>
+              <a:rPr lang="en-GB" sz="1800" dirty="0">
+                <a:latin typeface="Consolas" panose="020B0609020204030204" pitchFamily="49" charset="0"/>
+              </a:rPr>
+              <a:t>() +</a:t>
+            </a:r>
+          </a:p>
+          <a:p>
+            <a:pPr marL="0" indent="0">
+              <a:buFont typeface="Arial" panose="020B0604020202020204" pitchFamily="34" charset="0"/>
+              <a:buNone/>
+            </a:pPr>
+            <a:r>
+              <a:rPr lang="en-GB" sz="1800" dirty="0">
+                <a:latin typeface="Consolas" panose="020B0609020204030204" pitchFamily="49" charset="0"/>
+              </a:rPr>
+              <a:t> </a:t>
+            </a:r>
+            <a:r>
+              <a:rPr lang="en-GB" sz="1800" dirty="0" err="1">
+                <a:latin typeface="Consolas" panose="020B0609020204030204" pitchFamily="49" charset="0"/>
+              </a:rPr>
+              <a:t>geom_point</a:t>
+            </a:r>
+            <a:r>
+              <a:rPr lang="en-GB" sz="1800" dirty="0">
+                <a:latin typeface="Consolas" panose="020B0609020204030204" pitchFamily="49" charset="0"/>
+              </a:rPr>
+              <a:t>(data, </a:t>
+            </a:r>
+            <a:r>
+              <a:rPr lang="en-GB" sz="1800" dirty="0" err="1">
+                <a:latin typeface="Consolas" panose="020B0609020204030204" pitchFamily="49" charset="0"/>
+              </a:rPr>
+              <a:t>aes</a:t>
+            </a:r>
+            <a:r>
+              <a:rPr lang="en-GB" sz="1800" dirty="0">
+                <a:latin typeface="Consolas" panose="020B0609020204030204" pitchFamily="49" charset="0"/>
+              </a:rPr>
+              <a:t>(x=</a:t>
+            </a:r>
+            <a:r>
+              <a:rPr lang="en-GB" sz="1800" dirty="0" err="1">
+                <a:latin typeface="Consolas" panose="020B0609020204030204" pitchFamily="49" charset="0"/>
+              </a:rPr>
+              <a:t>wt</a:t>
+            </a:r>
+            <a:r>
+              <a:rPr lang="en-GB" sz="1800" dirty="0">
+                <a:latin typeface="Consolas" panose="020B0609020204030204" pitchFamily="49" charset="0"/>
+              </a:rPr>
+              <a:t>, y=mpg), colour=“red”) +</a:t>
+            </a:r>
+          </a:p>
+          <a:p>
+            <a:pPr marL="0" indent="0">
+              <a:buFont typeface="Arial" panose="020B0604020202020204" pitchFamily="34" charset="0"/>
+              <a:buNone/>
+            </a:pPr>
+            <a:r>
+              <a:rPr lang="en-GB" sz="1800" dirty="0">
+                <a:latin typeface="Consolas" panose="020B0609020204030204" pitchFamily="49" charset="0"/>
+              </a:rPr>
+              <a:t> </a:t>
+            </a:r>
+            <a:r>
+              <a:rPr lang="en-GB" sz="1800" dirty="0" err="1">
+                <a:latin typeface="Consolas" panose="020B0609020204030204" pitchFamily="49" charset="0"/>
+              </a:rPr>
+              <a:t>theme_phs</a:t>
+            </a:r>
+            <a:r>
+              <a:rPr lang="en-GB" sz="1800" dirty="0">
+                <a:latin typeface="Consolas" panose="020B0609020204030204" pitchFamily="49" charset="0"/>
+              </a:rPr>
+              <a:t>()</a:t>
+            </a:r>
+          </a:p>
+        </p:txBody>
+      </p:sp>
+      <p:sp>
+        <p:nvSpPr>
+          <p:cNvPr id="6" name="TextBox 5">
+            <a:extLst>
+              <a:ext uri="{FF2B5EF4-FFF2-40B4-BE49-F238E27FC236}">
+                <a16:creationId xmlns:a16="http://schemas.microsoft.com/office/drawing/2014/main" id="{E8FB5065-23F9-71D9-37EE-D2486B57B28C}"/>
+              </a:ext>
+            </a:extLst>
+          </p:cNvPr>
+          <p:cNvSpPr txBox="1"/>
+          <p:nvPr/>
+        </p:nvSpPr>
+        <p:spPr>
+          <a:xfrm>
+            <a:off x="4483510" y="1339496"/>
+            <a:ext cx="3018503" cy="369332"/>
+          </a:xfrm>
+          <a:prstGeom prst="rect">
+            <a:avLst/>
+          </a:prstGeom>
+          <a:noFill/>
+        </p:spPr>
+        <p:txBody>
+          <a:bodyPr wrap="square" rtlCol="0">
+            <a:spAutoFit/>
+          </a:bodyPr>
+          <a:lstStyle/>
+          <a:p>
+            <a:r>
+              <a:rPr lang="en-GB" dirty="0"/>
+              <a:t>Always starts with </a:t>
+            </a:r>
+            <a:r>
+              <a:rPr lang="en-GB" dirty="0" err="1"/>
+              <a:t>ggplot</a:t>
+            </a:r>
+            <a:r>
+              <a:rPr lang="en-GB" dirty="0"/>
+              <a:t>()</a:t>
+            </a:r>
+          </a:p>
+        </p:txBody>
+      </p:sp>
+      <p:cxnSp>
+        <p:nvCxnSpPr>
+          <p:cNvPr id="8" name="Straight Arrow Connector 7">
+            <a:extLst>
+              <a:ext uri="{FF2B5EF4-FFF2-40B4-BE49-F238E27FC236}">
+                <a16:creationId xmlns:a16="http://schemas.microsoft.com/office/drawing/2014/main" id="{06B46BED-14F2-7997-13EE-B7E15C2A3593}"/>
+              </a:ext>
+            </a:extLst>
+          </p:cNvPr>
+          <p:cNvCxnSpPr/>
+          <p:nvPr/>
+        </p:nvCxnSpPr>
+        <p:spPr>
+          <a:xfrm flipH="1">
+            <a:off x="1641987" y="1592826"/>
+            <a:ext cx="2753032" cy="272128"/>
+          </a:xfrm>
+          <a:prstGeom prst="straightConnector1">
+            <a:avLst/>
+          </a:prstGeom>
+          <a:ln>
+            <a:tailEnd type="triangle"/>
+          </a:ln>
+        </p:spPr>
+        <p:style>
+          <a:lnRef idx="1">
+            <a:schemeClr val="accent1"/>
+          </a:lnRef>
+          <a:fillRef idx="0">
+            <a:schemeClr val="accent1"/>
+          </a:fillRef>
+          <a:effectRef idx="0">
+            <a:schemeClr val="accent1"/>
+          </a:effectRef>
+          <a:fontRef idx="minor">
+            <a:schemeClr val="tx1"/>
+          </a:fontRef>
+        </p:style>
+      </p:cxnSp>
+      <p:cxnSp>
+        <p:nvCxnSpPr>
+          <p:cNvPr id="9" name="Straight Arrow Connector 8">
+            <a:extLst>
+              <a:ext uri="{FF2B5EF4-FFF2-40B4-BE49-F238E27FC236}">
+                <a16:creationId xmlns:a16="http://schemas.microsoft.com/office/drawing/2014/main" id="{706E6282-807A-7E11-1C52-E580902429E1}"/>
+              </a:ext>
+            </a:extLst>
+          </p:cNvPr>
+          <p:cNvCxnSpPr>
+            <a:cxnSpLocks/>
+          </p:cNvCxnSpPr>
+          <p:nvPr/>
+        </p:nvCxnSpPr>
+        <p:spPr>
+          <a:xfrm>
+            <a:off x="7076769" y="1539661"/>
+            <a:ext cx="90947" cy="338334"/>
+          </a:xfrm>
+          <a:prstGeom prst="straightConnector1">
+            <a:avLst/>
+          </a:prstGeom>
+          <a:ln>
+            <a:tailEnd type="triangle"/>
+          </a:ln>
+        </p:spPr>
+        <p:style>
+          <a:lnRef idx="1">
+            <a:schemeClr val="accent1"/>
+          </a:lnRef>
+          <a:fillRef idx="0">
+            <a:schemeClr val="accent1"/>
+          </a:fillRef>
+          <a:effectRef idx="0">
+            <a:schemeClr val="accent1"/>
+          </a:effectRef>
+          <a:fontRef idx="minor">
+            <a:schemeClr val="tx1"/>
+          </a:fontRef>
+        </p:style>
+      </p:cxnSp>
+      <p:sp>
+        <p:nvSpPr>
+          <p:cNvPr id="12" name="TextBox 11">
+            <a:extLst>
+              <a:ext uri="{FF2B5EF4-FFF2-40B4-BE49-F238E27FC236}">
+                <a16:creationId xmlns:a16="http://schemas.microsoft.com/office/drawing/2014/main" id="{84DF5299-6580-C54A-566B-3EC6FC82EECE}"/>
+              </a:ext>
+            </a:extLst>
+          </p:cNvPr>
+          <p:cNvSpPr txBox="1"/>
+          <p:nvPr/>
+        </p:nvSpPr>
+        <p:spPr>
+          <a:xfrm>
+            <a:off x="4483510" y="3434397"/>
+            <a:ext cx="3018503" cy="369332"/>
+          </a:xfrm>
+          <a:prstGeom prst="rect">
+            <a:avLst/>
+          </a:prstGeom>
+          <a:noFill/>
+        </p:spPr>
+        <p:txBody>
+          <a:bodyPr wrap="square" rtlCol="0">
+            <a:spAutoFit/>
+          </a:bodyPr>
+          <a:lstStyle/>
+          <a:p>
+            <a:r>
+              <a:rPr lang="en-GB" dirty="0"/>
+              <a:t>Need at least one </a:t>
+            </a:r>
+            <a:r>
+              <a:rPr lang="en-GB" dirty="0" err="1"/>
+              <a:t>geom</a:t>
+            </a:r>
+            <a:r>
+              <a:rPr lang="en-GB" dirty="0"/>
+              <a:t>_ layer</a:t>
+            </a:r>
+          </a:p>
+        </p:txBody>
+      </p:sp>
+      <p:sp>
+        <p:nvSpPr>
+          <p:cNvPr id="13" name="TextBox 12">
+            <a:extLst>
+              <a:ext uri="{FF2B5EF4-FFF2-40B4-BE49-F238E27FC236}">
+                <a16:creationId xmlns:a16="http://schemas.microsoft.com/office/drawing/2014/main" id="{6C4EDC0E-EFE6-4A01-29B7-E1D97285AE67}"/>
+              </a:ext>
+            </a:extLst>
+          </p:cNvPr>
+          <p:cNvSpPr txBox="1"/>
+          <p:nvPr/>
+        </p:nvSpPr>
+        <p:spPr>
+          <a:xfrm>
+            <a:off x="4483510" y="3848016"/>
+            <a:ext cx="3018503" cy="2031325"/>
+          </a:xfrm>
+          <a:prstGeom prst="rect">
+            <a:avLst/>
+          </a:prstGeom>
+          <a:noFill/>
+        </p:spPr>
+        <p:txBody>
+          <a:bodyPr wrap="square" rtlCol="0">
+            <a:spAutoFit/>
+          </a:bodyPr>
+          <a:lstStyle/>
+          <a:p>
+            <a:r>
+              <a:rPr lang="en-GB" dirty="0"/>
+              <a:t>Always need data and </a:t>
+            </a:r>
+            <a:r>
+              <a:rPr lang="en-GB" dirty="0" err="1"/>
+              <a:t>aes</a:t>
+            </a:r>
+            <a:r>
+              <a:rPr lang="en-GB" dirty="0"/>
+              <a:t>() …..</a:t>
+            </a:r>
+          </a:p>
+          <a:p>
+            <a:r>
+              <a:rPr lang="en-GB" dirty="0"/>
+              <a:t>These can go in </a:t>
+            </a:r>
+            <a:r>
+              <a:rPr lang="en-GB" dirty="0" err="1"/>
+              <a:t>ggplot</a:t>
+            </a:r>
+            <a:r>
+              <a:rPr lang="en-GB" dirty="0"/>
+              <a:t>() and be applied to all layers (unless specified otherwise), or be added to each </a:t>
+            </a:r>
+            <a:r>
+              <a:rPr lang="en-GB" dirty="0" err="1"/>
+              <a:t>geom</a:t>
+            </a:r>
+            <a:r>
+              <a:rPr lang="en-GB" dirty="0"/>
+              <a:t>_ (useful in more complex plots)</a:t>
+            </a:r>
+          </a:p>
+        </p:txBody>
+      </p:sp>
+      <p:sp>
+        <p:nvSpPr>
+          <p:cNvPr id="14" name="TextBox 13">
+            <a:extLst>
+              <a:ext uri="{FF2B5EF4-FFF2-40B4-BE49-F238E27FC236}">
+                <a16:creationId xmlns:a16="http://schemas.microsoft.com/office/drawing/2014/main" id="{1949F971-AB71-5EB0-FF17-AD2958DB95FB}"/>
+              </a:ext>
+            </a:extLst>
+          </p:cNvPr>
+          <p:cNvSpPr txBox="1"/>
+          <p:nvPr/>
+        </p:nvSpPr>
+        <p:spPr>
+          <a:xfrm>
+            <a:off x="8185354" y="3524850"/>
+            <a:ext cx="3018503" cy="646331"/>
+          </a:xfrm>
+          <a:prstGeom prst="rect">
+            <a:avLst/>
+          </a:prstGeom>
+          <a:noFill/>
+        </p:spPr>
+        <p:txBody>
+          <a:bodyPr wrap="square" rtlCol="0">
+            <a:spAutoFit/>
+          </a:bodyPr>
+          <a:lstStyle/>
+          <a:p>
+            <a:r>
+              <a:rPr lang="en-GB" dirty="0"/>
+              <a:t>The “+” goes at the </a:t>
+            </a:r>
+            <a:r>
+              <a:rPr lang="en-GB" i="1" dirty="0"/>
+              <a:t>end </a:t>
+            </a:r>
+            <a:r>
+              <a:rPr lang="en-GB" dirty="0"/>
+              <a:t> of the line, always</a:t>
+            </a:r>
+          </a:p>
+        </p:txBody>
+      </p:sp>
+      <p:sp>
+        <p:nvSpPr>
+          <p:cNvPr id="15" name="TextBox 14">
+            <a:extLst>
+              <a:ext uri="{FF2B5EF4-FFF2-40B4-BE49-F238E27FC236}">
+                <a16:creationId xmlns:a16="http://schemas.microsoft.com/office/drawing/2014/main" id="{61FE9F8C-E222-3B5D-5336-4D98DDD5A623}"/>
+              </a:ext>
+            </a:extLst>
+          </p:cNvPr>
+          <p:cNvSpPr txBox="1"/>
+          <p:nvPr/>
+        </p:nvSpPr>
+        <p:spPr>
+          <a:xfrm>
+            <a:off x="294967" y="4080373"/>
+            <a:ext cx="3018503" cy="646331"/>
+          </a:xfrm>
+          <a:prstGeom prst="rect">
+            <a:avLst/>
+          </a:prstGeom>
+          <a:noFill/>
+        </p:spPr>
+        <p:txBody>
+          <a:bodyPr wrap="square" rtlCol="0">
+            <a:spAutoFit/>
+          </a:bodyPr>
+          <a:lstStyle/>
+          <a:p>
+            <a:r>
+              <a:rPr lang="en-GB" dirty="0"/>
+              <a:t>Add titles, labels to make your plot more easily readable</a:t>
+            </a:r>
+          </a:p>
+        </p:txBody>
+      </p:sp>
+    </p:spTree>
+    <p:extLst>
+      <p:ext uri="{BB962C8B-B14F-4D97-AF65-F5344CB8AC3E}">
+        <p14:creationId xmlns:p14="http://schemas.microsoft.com/office/powerpoint/2010/main" val="2181244061"/>
+      </p:ext>
+    </p:extLst>
+  </p:cSld>
+  <p:clrMapOvr>
+    <a:masterClrMapping/>
+  </p:clrMapOvr>
+</p:sld>
+</file>
+
+<file path=ppt/slides/slide26.xml><?xml version="1.0" encoding="utf-8"?>
 <p:sld xmlns:a="http://schemas.openxmlformats.org/drawingml/2006/main" xmlns:r="http://schemas.openxmlformats.org/officeDocument/2006/relationships" xmlns:p="http://schemas.openxmlformats.org/presentationml/2006/main">
   <p:cSld>
     <p:spTree>
@@ -13039,6 +12912,21 @@
 </file>
 
 <file path=customXml/item1.xml><?xml version="1.0" encoding="utf-8"?>
+<?mso-contentType ?>
+<FormTemplates xmlns="http://schemas.microsoft.com/sharepoint/v3/contenttype/forms">
+  <Display>DocumentLibraryForm</Display>
+  <Edit>DocumentLibraryForm</Edit>
+  <New>DocumentLibraryForm</New>
+</FormTemplates>
+</file>
+
+<file path=customXml/item2.xml><?xml version="1.0" encoding="utf-8"?>
+<p:properties xmlns:p="http://schemas.microsoft.com/office/2006/metadata/properties" xmlns:xsi="http://www.w3.org/2001/XMLSchema-instance" xmlns:pc="http://schemas.microsoft.com/office/infopath/2007/PartnerControls">
+  <documentManagement/>
+</p:properties>
+</file>
+
+<file path=customXml/item3.xml><?xml version="1.0" encoding="utf-8"?>
 <ct:contentTypeSchema xmlns:ct="http://schemas.microsoft.com/office/2006/metadata/contentType" xmlns:ma="http://schemas.microsoft.com/office/2006/metadata/properties/metaAttributes" ct:_="" ma:_="" ma:contentTypeName="Document" ma:contentTypeID="0x010100349E360D75DDE845BD31B7204E9B8E6D" ma:contentTypeVersion="0" ma:contentTypeDescription="Create a new document." ma:contentTypeScope="" ma:versionID="659fdf77c7da3dae286546a3338ab112">
   <xsd:schema xmlns:xsd="http://www.w3.org/2001/XMLSchema" xmlns:xs="http://www.w3.org/2001/XMLSchema" xmlns:p="http://schemas.microsoft.com/office/2006/metadata/properties" targetNamespace="http://schemas.microsoft.com/office/2006/metadata/properties" ma:root="true" ma:fieldsID="7be2570776fbcaa7c7a71900390d2141">
     <xsd:element name="properties">
@@ -13152,33 +13040,10 @@
 </ct:contentTypeSchema>
 </file>
 
-<file path=customXml/item2.xml><?xml version="1.0" encoding="utf-8"?>
-<p:properties xmlns:p="http://schemas.microsoft.com/office/2006/metadata/properties" xmlns:xsi="http://www.w3.org/2001/XMLSchema-instance" xmlns:pc="http://schemas.microsoft.com/office/infopath/2007/PartnerControls">
-  <documentManagement/>
-</p:properties>
-</file>
-
-<file path=customXml/item3.xml><?xml version="1.0" encoding="utf-8"?>
-<?mso-contentType ?>
-<FormTemplates xmlns="http://schemas.microsoft.com/sharepoint/v3/contenttype/forms">
-  <Display>DocumentLibraryForm</Display>
-  <Edit>DocumentLibraryForm</Edit>
-  <New>DocumentLibraryForm</New>
-</FormTemplates>
-</file>
-
 <file path=customXml/itemProps1.xml><?xml version="1.0" encoding="utf-8"?>
-<ds:datastoreItem xmlns:ds="http://schemas.openxmlformats.org/officeDocument/2006/customXml" ds:itemID="{1F1E5AA6-C6AF-4367-93A3-EFA43BF19798}">
+<ds:datastoreItem xmlns:ds="http://schemas.openxmlformats.org/officeDocument/2006/customXml" ds:itemID="{AD6B120D-A0FB-4DD8-992E-3D48283A8AF5}">
   <ds:schemaRefs>
-    <ds:schemaRef ds:uri="http://schemas.microsoft.com/office/2006/metadata/contentType"/>
-    <ds:schemaRef ds:uri="http://schemas.microsoft.com/office/2006/metadata/properties/metaAttributes"/>
-    <ds:schemaRef ds:uri="http://www.w3.org/2001/XMLSchema"/>
-    <ds:schemaRef ds:uri="http://schemas.microsoft.com/office/2006/metadata/properties"/>
-    <ds:schemaRef ds:uri="http://schemas.openxmlformats.org/package/2006/metadata/core-properties"/>
-    <ds:schemaRef ds:uri="http://purl.org/dc/elements/1.1/"/>
-    <ds:schemaRef ds:uri="http://purl.org/dc/terms/"/>
-    <ds:schemaRef ds:uri="http://schemas.microsoft.com/internal/obd"/>
-    <ds:schemaRef ds:uri="http://schemas.microsoft.com/office/infopath/2007/PartnerControls"/>
+    <ds:schemaRef ds:uri="http://schemas.microsoft.com/sharepoint/v3/contenttype/forms"/>
   </ds:schemaRefs>
 </ds:datastoreItem>
 </file>
@@ -13199,9 +13064,17 @@
 </file>
 
 <file path=customXml/itemProps3.xml><?xml version="1.0" encoding="utf-8"?>
-<ds:datastoreItem xmlns:ds="http://schemas.openxmlformats.org/officeDocument/2006/customXml" ds:itemID="{AD6B120D-A0FB-4DD8-992E-3D48283A8AF5}">
+<ds:datastoreItem xmlns:ds="http://schemas.openxmlformats.org/officeDocument/2006/customXml" ds:itemID="{1F1E5AA6-C6AF-4367-93A3-EFA43BF19798}">
   <ds:schemaRefs>
-    <ds:schemaRef ds:uri="http://schemas.microsoft.com/sharepoint/v3/contenttype/forms"/>
+    <ds:schemaRef ds:uri="http://schemas.microsoft.com/office/2006/metadata/contentType"/>
+    <ds:schemaRef ds:uri="http://schemas.microsoft.com/office/2006/metadata/properties/metaAttributes"/>
+    <ds:schemaRef ds:uri="http://www.w3.org/2001/XMLSchema"/>
+    <ds:schemaRef ds:uri="http://schemas.microsoft.com/office/2006/metadata/properties"/>
+    <ds:schemaRef ds:uri="http://schemas.openxmlformats.org/package/2006/metadata/core-properties"/>
+    <ds:schemaRef ds:uri="http://purl.org/dc/elements/1.1/"/>
+    <ds:schemaRef ds:uri="http://purl.org/dc/terms/"/>
+    <ds:schemaRef ds:uri="http://schemas.microsoft.com/internal/obd"/>
+    <ds:schemaRef ds:uri="http://schemas.microsoft.com/office/infopath/2007/PartnerControls"/>
   </ds:schemaRefs>
 </ds:datastoreItem>
 </file>
</xml_diff>

<commit_message>
add summary slide to powerpoint
</commit_message>
<xml_diff>
--- a/Introduction to ggplot.pptx
+++ b/Introduction to ggplot.pptx
@@ -222,7 +222,7 @@
           <a:p>
             <a:fld id="{E326FCFE-7176-4740-B8A4-BE7D6F546224}" type="datetimeFigureOut">
               <a:rPr lang="en-GB" smtClean="0"/>
-              <a:t>17/02/2023</a:t>
+              <a:t>22/02/2023</a:t>
             </a:fld>
             <a:endParaRPr lang="en-GB"/>
           </a:p>
@@ -535,16 +535,28 @@
           <a:lstStyle/>
           <a:p>
             <a:r>
+              <a:rPr lang="en-GB" dirty="0" err="1"/>
+              <a:t>Ggplot</a:t>
+            </a:r>
+            <a:r>
               <a:rPr lang="en-GB" dirty="0"/>
-              <a:t>Enough talking – time to look at what </a:t>
+              <a:t> is not the only available package for plots by any means. However, it covers most common plot types and many options to modify. Only likely to need another package if doing specific </a:t>
             </a:r>
             <a:r>
               <a:rPr lang="en-GB" dirty="0" err="1"/>
-              <a:t>ggplot</a:t>
+              <a:t>specilised</a:t>
             </a:r>
             <a:r>
               <a:rPr lang="en-GB" dirty="0"/>
-              <a:t> can do</a:t>
+              <a:t> types of plot – </a:t>
+            </a:r>
+            <a:r>
+              <a:rPr lang="en-GB" dirty="0" err="1"/>
+              <a:t>eg</a:t>
+            </a:r>
+            <a:r>
+              <a:rPr lang="en-GB" dirty="0"/>
+              <a:t> heatmaps , Sankey diagrams</a:t>
             </a:r>
           </a:p>
         </p:txBody>
@@ -566,7 +578,7 @@
           <a:p>
             <a:fld id="{32F30A6C-8B7B-4BC2-B46E-03E01B6F7999}" type="slidenum">
               <a:rPr lang="en-GB" smtClean="0"/>
-              <a:t>10</a:t>
+              <a:t>6</a:t>
             </a:fld>
             <a:endParaRPr lang="en-GB"/>
           </a:p>
@@ -575,7 +587,7 @@
     </p:spTree>
     <p:extLst>
       <p:ext uri="{BB962C8B-B14F-4D97-AF65-F5344CB8AC3E}">
-        <p14:creationId xmlns:p14="http://schemas.microsoft.com/office/powerpoint/2010/main" val="2875891407"/>
+        <p14:creationId xmlns:p14="http://schemas.microsoft.com/office/powerpoint/2010/main" val="2101970443"/>
       </p:ext>
     </p:extLst>
   </p:cSld>
@@ -661,6 +673,101 @@
           <a:p>
             <a:fld id="{32F30A6C-8B7B-4BC2-B46E-03E01B6F7999}" type="slidenum">
               <a:rPr lang="en-GB" smtClean="0"/>
+              <a:t>10</a:t>
+            </a:fld>
+            <a:endParaRPr lang="en-GB"/>
+          </a:p>
+        </p:txBody>
+      </p:sp>
+    </p:spTree>
+    <p:extLst>
+      <p:ext uri="{BB962C8B-B14F-4D97-AF65-F5344CB8AC3E}">
+        <p14:creationId xmlns:p14="http://schemas.microsoft.com/office/powerpoint/2010/main" val="2875891407"/>
+      </p:ext>
+    </p:extLst>
+  </p:cSld>
+  <p:clrMapOvr>
+    <a:masterClrMapping/>
+  </p:clrMapOvr>
+</p:notes>
+</file>
+
+<file path=ppt/notesSlides/notesSlide3.xml><?xml version="1.0" encoding="utf-8"?>
+<p:notes xmlns:a="http://schemas.openxmlformats.org/drawingml/2006/main" xmlns:r="http://schemas.openxmlformats.org/officeDocument/2006/relationships" xmlns:p="http://schemas.openxmlformats.org/presentationml/2006/main">
+  <p:cSld>
+    <p:spTree>
+      <p:nvGrpSpPr>
+        <p:cNvPr id="1" name=""/>
+        <p:cNvGrpSpPr/>
+        <p:nvPr/>
+      </p:nvGrpSpPr>
+      <p:grpSpPr>
+        <a:xfrm>
+          <a:off x="0" y="0"/>
+          <a:ext cx="0" cy="0"/>
+          <a:chOff x="0" y="0"/>
+          <a:chExt cx="0" cy="0"/>
+        </a:xfrm>
+      </p:grpSpPr>
+      <p:sp>
+        <p:nvSpPr>
+          <p:cNvPr id="2" name="Slide Image Placeholder 1"/>
+          <p:cNvSpPr>
+            <a:spLocks noGrp="1" noRot="1" noChangeAspect="1"/>
+          </p:cNvSpPr>
+          <p:nvPr>
+            <p:ph type="sldImg"/>
+          </p:nvPr>
+        </p:nvSpPr>
+        <p:spPr/>
+      </p:sp>
+      <p:sp>
+        <p:nvSpPr>
+          <p:cNvPr id="3" name="Notes Placeholder 2"/>
+          <p:cNvSpPr>
+            <a:spLocks noGrp="1"/>
+          </p:cNvSpPr>
+          <p:nvPr>
+            <p:ph type="body" idx="1"/>
+          </p:nvPr>
+        </p:nvSpPr>
+        <p:spPr/>
+        <p:txBody>
+          <a:bodyPr/>
+          <a:lstStyle/>
+          <a:p>
+            <a:r>
+              <a:rPr lang="en-GB" dirty="0"/>
+              <a:t>Enough talking – time to look at what </a:t>
+            </a:r>
+            <a:r>
+              <a:rPr lang="en-GB" dirty="0" err="1"/>
+              <a:t>ggplot</a:t>
+            </a:r>
+            <a:r>
+              <a:rPr lang="en-GB" dirty="0"/>
+              <a:t> can do</a:t>
+            </a:r>
+          </a:p>
+        </p:txBody>
+      </p:sp>
+      <p:sp>
+        <p:nvSpPr>
+          <p:cNvPr id="4" name="Slide Number Placeholder 3"/>
+          <p:cNvSpPr>
+            <a:spLocks noGrp="1"/>
+          </p:cNvSpPr>
+          <p:nvPr>
+            <p:ph type="sldNum" sz="quarter" idx="5"/>
+          </p:nvPr>
+        </p:nvSpPr>
+        <p:spPr/>
+        <p:txBody>
+          <a:bodyPr/>
+          <a:lstStyle/>
+          <a:p>
+            <a:fld id="{32F30A6C-8B7B-4BC2-B46E-03E01B6F7999}" type="slidenum">
+              <a:rPr lang="en-GB" smtClean="0"/>
               <a:t>18</a:t>
             </a:fld>
             <a:endParaRPr lang="en-GB"/>
@@ -680,7 +787,7 @@
 </p:notes>
 </file>
 
-<file path=ppt/notesSlides/notesSlide3.xml><?xml version="1.0" encoding="utf-8"?>
+<file path=ppt/notesSlides/notesSlide4.xml><?xml version="1.0" encoding="utf-8"?>
 <p:notes xmlns:a="http://schemas.openxmlformats.org/drawingml/2006/main" xmlns:r="http://schemas.openxmlformats.org/officeDocument/2006/relationships" xmlns:p="http://schemas.openxmlformats.org/presentationml/2006/main">
   <p:cSld>
     <p:spTree>
@@ -8812,7 +8919,7 @@
                   <a:srgbClr val="C0C0C0"/>
                 </a:highlight>
               </a:rPr>
-              <a:t>phstheme</a:t>
+              <a:t>theme_phs</a:t>
             </a:r>
             <a:r>
               <a:rPr lang="en-GB" dirty="0">
@@ -9070,13 +9177,16 @@
           <a:p>
             <a:r>
               <a:rPr lang="en-GB" dirty="0"/>
-              <a:t>Summary – building up a </a:t>
+              <a:t>Summary – key points for </a:t>
             </a:r>
             <a:r>
               <a:rPr lang="en-GB" dirty="0" err="1"/>
               <a:t>ggplot</a:t>
             </a:r>
-            <a:endParaRPr lang="en-GB" dirty="0"/>
+            <a:r>
+              <a:rPr lang="en-GB" dirty="0"/>
+              <a:t> code</a:t>
+            </a:r>
           </a:p>
         </p:txBody>
       </p:sp>
@@ -9506,7 +9616,7 @@
         </p:nvSpPr>
         <p:spPr>
           <a:xfrm>
-            <a:off x="4483510" y="1339496"/>
+            <a:off x="983225" y="1325941"/>
             <a:ext cx="3018503" cy="369332"/>
           </a:xfrm>
           <a:prstGeom prst="rect">
@@ -9521,15 +9631,15 @@
           <a:lstStyle/>
           <a:p>
             <a:r>
-              <a:rPr lang="en-GB" dirty="0"/>
+              <a:rPr lang="en-GB" b="1" dirty="0"/>
               <a:t>Always starts with </a:t>
             </a:r>
             <a:r>
-              <a:rPr lang="en-GB" dirty="0" err="1"/>
+              <a:rPr lang="en-GB" b="1" dirty="0" err="1"/>
               <a:t>ggplot</a:t>
             </a:r>
             <a:r>
-              <a:rPr lang="en-GB" dirty="0"/>
+              <a:rPr lang="en-GB" b="1" dirty="0"/>
               <a:t>()</a:t>
             </a:r>
           </a:p>
@@ -9544,54 +9654,15 @@
               </a:ext>
             </a:extLst>
           </p:cNvPr>
-          <p:cNvCxnSpPr/>
-          <p:nvPr/>
-        </p:nvCxnSpPr>
-        <p:spPr>
-          <a:xfrm flipH="1">
-            <a:off x="1641987" y="1592826"/>
-            <a:ext cx="2753032" cy="272128"/>
-          </a:xfrm>
-          <a:prstGeom prst="straightConnector1">
-            <a:avLst/>
-          </a:prstGeom>
-          <a:ln>
-            <a:tailEnd type="triangle"/>
-          </a:ln>
-        </p:spPr>
-        <p:style>
-          <a:lnRef idx="1">
-            <a:schemeClr val="accent1"/>
-          </a:lnRef>
-          <a:fillRef idx="0">
-            <a:schemeClr val="accent1"/>
-          </a:fillRef>
-          <a:effectRef idx="0">
-            <a:schemeClr val="accent1"/>
-          </a:effectRef>
-          <a:fontRef idx="minor">
-            <a:schemeClr val="tx1"/>
-          </a:fontRef>
-        </p:style>
-      </p:cxnSp>
-      <p:cxnSp>
-        <p:nvCxnSpPr>
-          <p:cNvPr id="9" name="Straight Arrow Connector 8">
-            <a:extLst>
-              <a:ext uri="{FF2B5EF4-FFF2-40B4-BE49-F238E27FC236}">
-                <a16:creationId xmlns:a16="http://schemas.microsoft.com/office/drawing/2014/main" id="{706E6282-807A-7E11-1C52-E580902429E1}"/>
-              </a:ext>
-            </a:extLst>
-          </p:cNvPr>
           <p:cNvCxnSpPr>
             <a:cxnSpLocks/>
           </p:cNvCxnSpPr>
           <p:nvPr/>
         </p:nvCxnSpPr>
         <p:spPr>
-          <a:xfrm>
-            <a:off x="7076769" y="1539661"/>
-            <a:ext cx="90947" cy="338334"/>
+          <a:xfrm flipH="1">
+            <a:off x="1641987" y="1739293"/>
+            <a:ext cx="247773" cy="125661"/>
           </a:xfrm>
           <a:prstGeom prst="straightConnector1">
             <a:avLst/>
@@ -9629,7 +9700,7 @@
         </p:nvSpPr>
         <p:spPr>
           <a:xfrm>
-            <a:off x="4483510" y="3434397"/>
+            <a:off x="1642576" y="3371678"/>
             <a:ext cx="3018503" cy="369332"/>
           </a:xfrm>
           <a:prstGeom prst="rect">
@@ -9648,12 +9719,16 @@
               <a:t>Need at least one </a:t>
             </a:r>
             <a:r>
-              <a:rPr lang="en-GB" dirty="0" err="1"/>
+              <a:rPr lang="en-GB" b="1" dirty="0" err="1"/>
               <a:t>geom</a:t>
             </a:r>
             <a:r>
+              <a:rPr lang="en-GB" b="1" dirty="0"/>
+              <a:t>_ </a:t>
+            </a:r>
+            <a:r>
               <a:rPr lang="en-GB" dirty="0"/>
-              <a:t>_ layer</a:t>
+              <a:t>layer</a:t>
             </a:r>
           </a:p>
         </p:txBody>
@@ -9672,8 +9747,8 @@
         </p:nvSpPr>
         <p:spPr>
           <a:xfrm>
-            <a:off x="4483510" y="3848016"/>
-            <a:ext cx="3018503" cy="2031325"/>
+            <a:off x="5053781" y="3429000"/>
+            <a:ext cx="4553515" cy="1477328"/>
           </a:xfrm>
           <a:prstGeom prst="rect">
             <a:avLst/>
@@ -9687,16 +9762,20 @@
           <a:lstStyle/>
           <a:p>
             <a:r>
+              <a:rPr lang="en-GB" b="1" dirty="0"/>
+              <a:t>Always need data and </a:t>
+            </a:r>
+            <a:r>
+              <a:rPr lang="en-GB" b="1" dirty="0" err="1"/>
+              <a:t>aes</a:t>
+            </a:r>
+            <a:r>
+              <a:rPr lang="en-GB" b="1" dirty="0"/>
+              <a:t>() </a:t>
+            </a:r>
+            <a:r>
               <a:rPr lang="en-GB" dirty="0"/>
-              <a:t>Always need data and </a:t>
-            </a:r>
-            <a:r>
-              <a:rPr lang="en-GB" dirty="0" err="1"/>
-              <a:t>aes</a:t>
-            </a:r>
-            <a:r>
-              <a:rPr lang="en-GB" dirty="0"/>
-              <a:t>() …..</a:t>
+              <a:t>…..</a:t>
             </a:r>
           </a:p>
           <a:p>
@@ -9737,7 +9816,7 @@
         </p:nvSpPr>
         <p:spPr>
           <a:xfrm>
-            <a:off x="8185354" y="3524850"/>
+            <a:off x="8335297" y="1511031"/>
             <a:ext cx="3018503" cy="646331"/>
           </a:xfrm>
           <a:prstGeom prst="rect">
@@ -9752,16 +9831,12 @@
           <a:lstStyle/>
           <a:p>
             <a:r>
-              <a:rPr lang="en-GB" dirty="0"/>
-              <a:t>The “+” goes at the </a:t>
-            </a:r>
-            <a:r>
-              <a:rPr lang="en-GB" i="1" dirty="0"/>
-              <a:t>end </a:t>
-            </a:r>
-            <a:r>
-              <a:rPr lang="en-GB" dirty="0"/>
-              <a:t> of the line, always</a:t>
+              <a:rPr lang="en-GB" b="1" dirty="0">
+                <a:solidFill>
+                  <a:schemeClr val="tx2"/>
+                </a:solidFill>
+              </a:rPr>
+              <a:t>The “+” goes at the end  of the line, always</a:t>
             </a:r>
           </a:p>
         </p:txBody>
@@ -9780,8 +9855,8 @@
         </p:nvSpPr>
         <p:spPr>
           <a:xfrm>
-            <a:off x="294967" y="4080373"/>
-            <a:ext cx="3018503" cy="646331"/>
+            <a:off x="838199" y="4411279"/>
+            <a:ext cx="3402650" cy="646331"/>
           </a:xfrm>
           <a:prstGeom prst="rect">
             <a:avLst/>
@@ -9797,6 +9872,230 @@
             <a:r>
               <a:rPr lang="en-GB" dirty="0"/>
               <a:t>Add titles, labels to make your plot more easily readable</a:t>
+            </a:r>
+          </a:p>
+        </p:txBody>
+      </p:sp>
+      <p:cxnSp>
+        <p:nvCxnSpPr>
+          <p:cNvPr id="3" name="Straight Arrow Connector 2">
+            <a:extLst>
+              <a:ext uri="{FF2B5EF4-FFF2-40B4-BE49-F238E27FC236}">
+                <a16:creationId xmlns:a16="http://schemas.microsoft.com/office/drawing/2014/main" id="{FF6E32F7-9CBA-22CF-DE2D-5B92956C9FEC}"/>
+              </a:ext>
+            </a:extLst>
+          </p:cNvPr>
+          <p:cNvCxnSpPr>
+            <a:cxnSpLocks/>
+          </p:cNvCxnSpPr>
+          <p:nvPr/>
+        </p:nvCxnSpPr>
+        <p:spPr>
+          <a:xfrm flipH="1" flipV="1">
+            <a:off x="2267712" y="2499690"/>
+            <a:ext cx="280416" cy="871988"/>
+          </a:xfrm>
+          <a:prstGeom prst="straightConnector1">
+            <a:avLst/>
+          </a:prstGeom>
+          <a:ln>
+            <a:tailEnd type="triangle"/>
+          </a:ln>
+        </p:spPr>
+        <p:style>
+          <a:lnRef idx="1">
+            <a:schemeClr val="accent1"/>
+          </a:lnRef>
+          <a:fillRef idx="0">
+            <a:schemeClr val="accent1"/>
+          </a:fillRef>
+          <a:effectRef idx="0">
+            <a:schemeClr val="accent1"/>
+          </a:effectRef>
+          <a:fontRef idx="minor">
+            <a:schemeClr val="tx1"/>
+          </a:fontRef>
+        </p:style>
+      </p:cxnSp>
+      <p:cxnSp>
+        <p:nvCxnSpPr>
+          <p:cNvPr id="17" name="Straight Arrow Connector 16">
+            <a:extLst>
+              <a:ext uri="{FF2B5EF4-FFF2-40B4-BE49-F238E27FC236}">
+                <a16:creationId xmlns:a16="http://schemas.microsoft.com/office/drawing/2014/main" id="{90467F9F-A63F-938C-602D-EF2395CFD64C}"/>
+              </a:ext>
+            </a:extLst>
+          </p:cNvPr>
+          <p:cNvCxnSpPr>
+            <a:cxnSpLocks/>
+          </p:cNvCxnSpPr>
+          <p:nvPr/>
+        </p:nvCxnSpPr>
+        <p:spPr>
+          <a:xfrm flipH="1" flipV="1">
+            <a:off x="4240849" y="2157362"/>
+            <a:ext cx="1438068" cy="1271638"/>
+          </a:xfrm>
+          <a:prstGeom prst="straightConnector1">
+            <a:avLst/>
+          </a:prstGeom>
+          <a:ln w="19050">
+            <a:tailEnd type="triangle"/>
+          </a:ln>
+        </p:spPr>
+        <p:style>
+          <a:lnRef idx="1">
+            <a:schemeClr val="accent1"/>
+          </a:lnRef>
+          <a:fillRef idx="0">
+            <a:schemeClr val="accent1"/>
+          </a:fillRef>
+          <a:effectRef idx="0">
+            <a:schemeClr val="accent1"/>
+          </a:effectRef>
+          <a:fontRef idx="minor">
+            <a:schemeClr val="tx1"/>
+          </a:fontRef>
+        </p:style>
+      </p:cxnSp>
+      <p:cxnSp>
+        <p:nvCxnSpPr>
+          <p:cNvPr id="22" name="Connector: Curved 21">
+            <a:extLst>
+              <a:ext uri="{FF2B5EF4-FFF2-40B4-BE49-F238E27FC236}">
+                <a16:creationId xmlns:a16="http://schemas.microsoft.com/office/drawing/2014/main" id="{F6B04590-E16E-E055-420B-D5240947A620}"/>
+              </a:ext>
+            </a:extLst>
+          </p:cNvPr>
+          <p:cNvCxnSpPr>
+            <a:cxnSpLocks/>
+          </p:cNvCxnSpPr>
+          <p:nvPr/>
+        </p:nvCxnSpPr>
+        <p:spPr>
+          <a:xfrm flipV="1">
+            <a:off x="7857353" y="2498665"/>
+            <a:ext cx="1260000" cy="1167014"/>
+          </a:xfrm>
+          <a:prstGeom prst="curvedConnector3">
+            <a:avLst>
+              <a:gd name="adj1" fmla="val 135150"/>
+            </a:avLst>
+          </a:prstGeom>
+          <a:ln w="28575">
+            <a:tailEnd type="triangle"/>
+          </a:ln>
+        </p:spPr>
+        <p:style>
+          <a:lnRef idx="1">
+            <a:schemeClr val="accent1"/>
+          </a:lnRef>
+          <a:fillRef idx="0">
+            <a:schemeClr val="accent1"/>
+          </a:fillRef>
+          <a:effectRef idx="0">
+            <a:schemeClr val="accent1"/>
+          </a:effectRef>
+          <a:fontRef idx="minor">
+            <a:schemeClr val="tx1"/>
+          </a:fontRef>
+        </p:style>
+      </p:cxnSp>
+      <p:sp>
+        <p:nvSpPr>
+          <p:cNvPr id="29" name="Oval 28">
+            <a:extLst>
+              <a:ext uri="{FF2B5EF4-FFF2-40B4-BE49-F238E27FC236}">
+                <a16:creationId xmlns:a16="http://schemas.microsoft.com/office/drawing/2014/main" id="{B86ECA16-86D8-849F-2EFF-964813F4B450}"/>
+              </a:ext>
+            </a:extLst>
+          </p:cNvPr>
+          <p:cNvSpPr/>
+          <p:nvPr/>
+        </p:nvSpPr>
+        <p:spPr>
+          <a:xfrm>
+            <a:off x="7330538" y="1852334"/>
+            <a:ext cx="321516" cy="356989"/>
+          </a:xfrm>
+          <a:prstGeom prst="ellipse">
+            <a:avLst/>
+          </a:prstGeom>
+          <a:noFill/>
+          <a:ln w="22225">
+            <a:solidFill>
+              <a:srgbClr val="FF0000"/>
+            </a:solidFill>
+          </a:ln>
+        </p:spPr>
+        <p:style>
+          <a:lnRef idx="2">
+            <a:schemeClr val="accent1">
+              <a:shade val="50000"/>
+            </a:schemeClr>
+          </a:lnRef>
+          <a:fillRef idx="1">
+            <a:schemeClr val="accent1"/>
+          </a:fillRef>
+          <a:effectRef idx="0">
+            <a:schemeClr val="accent1"/>
+          </a:effectRef>
+          <a:fontRef idx="minor">
+            <a:schemeClr val="lt1"/>
+          </a:fontRef>
+        </p:style>
+        <p:txBody>
+          <a:bodyPr rtlCol="0" anchor="ctr"/>
+          <a:lstStyle/>
+          <a:p>
+            <a:pPr algn="ctr"/>
+            <a:endParaRPr lang="en-GB"/>
+          </a:p>
+        </p:txBody>
+      </p:sp>
+      <p:sp>
+        <p:nvSpPr>
+          <p:cNvPr id="30" name="TextBox 29">
+            <a:extLst>
+              <a:ext uri="{FF2B5EF4-FFF2-40B4-BE49-F238E27FC236}">
+                <a16:creationId xmlns:a16="http://schemas.microsoft.com/office/drawing/2014/main" id="{312537D0-9F02-059C-F906-A78C3A96237E}"/>
+              </a:ext>
+            </a:extLst>
+          </p:cNvPr>
+          <p:cNvSpPr txBox="1"/>
+          <p:nvPr/>
+        </p:nvSpPr>
+        <p:spPr>
+          <a:xfrm>
+            <a:off x="838199" y="5208893"/>
+            <a:ext cx="9012937" cy="646331"/>
+          </a:xfrm>
+          <a:prstGeom prst="rect">
+            <a:avLst/>
+          </a:prstGeom>
+          <a:noFill/>
+        </p:spPr>
+        <p:txBody>
+          <a:bodyPr wrap="square" rtlCol="0">
+            <a:spAutoFit/>
+          </a:bodyPr>
+          <a:lstStyle/>
+          <a:p>
+            <a:r>
+              <a:rPr lang="en-GB" b="1" dirty="0"/>
+              <a:t>Lots</a:t>
+            </a:r>
+            <a:r>
+              <a:rPr lang="en-GB" dirty="0"/>
+              <a:t> of options to modify the appearance…. Use </a:t>
+            </a:r>
+            <a:r>
+              <a:rPr lang="en-GB" dirty="0" err="1"/>
+              <a:t>cheatsheets</a:t>
+            </a:r>
+            <a:r>
+              <a:rPr lang="en-GB" dirty="0"/>
+              <a:t>, resources on next slide, google and ?help in R to find the functions you need and how to use them</a:t>
             </a:r>
           </a:p>
         </p:txBody>
@@ -9811,6 +10110,374 @@
   <p:clrMapOvr>
     <a:masterClrMapping/>
   </p:clrMapOvr>
+  <p:timing>
+    <p:tnLst>
+      <p:par>
+        <p:cTn id="1" dur="indefinite" restart="never" nodeType="tmRoot">
+          <p:childTnLst>
+            <p:seq concurrent="1" nextAc="seek">
+              <p:cTn id="2" dur="indefinite" nodeType="mainSeq">
+                <p:childTnLst>
+                  <p:par>
+                    <p:cTn id="3" fill="hold">
+                      <p:stCondLst>
+                        <p:cond delay="indefinite"/>
+                      </p:stCondLst>
+                      <p:childTnLst>
+                        <p:par>
+                          <p:cTn id="4" fill="hold">
+                            <p:stCondLst>
+                              <p:cond delay="0"/>
+                            </p:stCondLst>
+                            <p:childTnLst>
+                              <p:par>
+                                <p:cTn id="5" presetID="1" presetClass="entr" presetSubtype="0" fill="hold" grpId="0" nodeType="clickEffect">
+                                  <p:stCondLst>
+                                    <p:cond delay="0"/>
+                                  </p:stCondLst>
+                                  <p:childTnLst>
+                                    <p:set>
+                                      <p:cBhvr>
+                                        <p:cTn id="6" dur="1" fill="hold">
+                                          <p:stCondLst>
+                                            <p:cond delay="0"/>
+                                          </p:stCondLst>
+                                        </p:cTn>
+                                        <p:tgtEl>
+                                          <p:spTgt spid="6"/>
+                                        </p:tgtEl>
+                                        <p:attrNameLst>
+                                          <p:attrName>style.visibility</p:attrName>
+                                        </p:attrNameLst>
+                                      </p:cBhvr>
+                                      <p:to>
+                                        <p:strVal val="visible"/>
+                                      </p:to>
+                                    </p:set>
+                                  </p:childTnLst>
+                                </p:cTn>
+                              </p:par>
+                              <p:par>
+                                <p:cTn id="7" presetID="1" presetClass="entr" presetSubtype="0" fill="hold" nodeType="withEffect">
+                                  <p:stCondLst>
+                                    <p:cond delay="0"/>
+                                  </p:stCondLst>
+                                  <p:childTnLst>
+                                    <p:set>
+                                      <p:cBhvr>
+                                        <p:cTn id="8" dur="1" fill="hold">
+                                          <p:stCondLst>
+                                            <p:cond delay="0"/>
+                                          </p:stCondLst>
+                                        </p:cTn>
+                                        <p:tgtEl>
+                                          <p:spTgt spid="8"/>
+                                        </p:tgtEl>
+                                        <p:attrNameLst>
+                                          <p:attrName>style.visibility</p:attrName>
+                                        </p:attrNameLst>
+                                      </p:cBhvr>
+                                      <p:to>
+                                        <p:strVal val="visible"/>
+                                      </p:to>
+                                    </p:set>
+                                  </p:childTnLst>
+                                </p:cTn>
+                              </p:par>
+                              <p:par>
+                                <p:cTn id="9" presetID="1" presetClass="entr" presetSubtype="0" fill="hold" nodeType="withEffect">
+                                  <p:stCondLst>
+                                    <p:cond delay="0"/>
+                                  </p:stCondLst>
+                                  <p:childTnLst>
+                                    <p:set>
+                                      <p:cBhvr>
+                                        <p:cTn id="10" dur="1" fill="hold">
+                                          <p:stCondLst>
+                                            <p:cond delay="0"/>
+                                          </p:stCondLst>
+                                        </p:cTn>
+                                        <p:tgtEl>
+                                          <p:spTgt spid="3"/>
+                                        </p:tgtEl>
+                                        <p:attrNameLst>
+                                          <p:attrName>style.visibility</p:attrName>
+                                        </p:attrNameLst>
+                                      </p:cBhvr>
+                                      <p:to>
+                                        <p:strVal val="visible"/>
+                                      </p:to>
+                                    </p:set>
+                                  </p:childTnLst>
+                                </p:cTn>
+                              </p:par>
+                            </p:childTnLst>
+                          </p:cTn>
+                        </p:par>
+                      </p:childTnLst>
+                    </p:cTn>
+                  </p:par>
+                  <p:par>
+                    <p:cTn id="11" fill="hold">
+                      <p:stCondLst>
+                        <p:cond delay="indefinite"/>
+                      </p:stCondLst>
+                      <p:childTnLst>
+                        <p:par>
+                          <p:cTn id="12" fill="hold">
+                            <p:stCondLst>
+                              <p:cond delay="0"/>
+                            </p:stCondLst>
+                            <p:childTnLst>
+                              <p:par>
+                                <p:cTn id="13" presetID="1" presetClass="entr" presetSubtype="0" fill="hold" grpId="0" nodeType="clickEffect">
+                                  <p:stCondLst>
+                                    <p:cond delay="0"/>
+                                  </p:stCondLst>
+                                  <p:childTnLst>
+                                    <p:set>
+                                      <p:cBhvr>
+                                        <p:cTn id="14" dur="1" fill="hold">
+                                          <p:stCondLst>
+                                            <p:cond delay="0"/>
+                                          </p:stCondLst>
+                                        </p:cTn>
+                                        <p:tgtEl>
+                                          <p:spTgt spid="12"/>
+                                        </p:tgtEl>
+                                        <p:attrNameLst>
+                                          <p:attrName>style.visibility</p:attrName>
+                                        </p:attrNameLst>
+                                      </p:cBhvr>
+                                      <p:to>
+                                        <p:strVal val="visible"/>
+                                      </p:to>
+                                    </p:set>
+                                  </p:childTnLst>
+                                </p:cTn>
+                              </p:par>
+                            </p:childTnLst>
+                          </p:cTn>
+                        </p:par>
+                      </p:childTnLst>
+                    </p:cTn>
+                  </p:par>
+                  <p:par>
+                    <p:cTn id="15" fill="hold">
+                      <p:stCondLst>
+                        <p:cond delay="indefinite"/>
+                      </p:stCondLst>
+                      <p:childTnLst>
+                        <p:par>
+                          <p:cTn id="16" fill="hold">
+                            <p:stCondLst>
+                              <p:cond delay="0"/>
+                            </p:stCondLst>
+                            <p:childTnLst>
+                              <p:par>
+                                <p:cTn id="17" presetID="1" presetClass="entr" presetSubtype="0" fill="hold" nodeType="clickEffect">
+                                  <p:stCondLst>
+                                    <p:cond delay="0"/>
+                                  </p:stCondLst>
+                                  <p:childTnLst>
+                                    <p:set>
+                                      <p:cBhvr>
+                                        <p:cTn id="18" dur="1" fill="hold">
+                                          <p:stCondLst>
+                                            <p:cond delay="0"/>
+                                          </p:stCondLst>
+                                        </p:cTn>
+                                        <p:tgtEl>
+                                          <p:spTgt spid="17"/>
+                                        </p:tgtEl>
+                                        <p:attrNameLst>
+                                          <p:attrName>style.visibility</p:attrName>
+                                        </p:attrNameLst>
+                                      </p:cBhvr>
+                                      <p:to>
+                                        <p:strVal val="visible"/>
+                                      </p:to>
+                                    </p:set>
+                                  </p:childTnLst>
+                                </p:cTn>
+                              </p:par>
+                              <p:par>
+                                <p:cTn id="19" presetID="1" presetClass="entr" presetSubtype="0" fill="hold" grpId="0" nodeType="withEffect">
+                                  <p:stCondLst>
+                                    <p:cond delay="0"/>
+                                  </p:stCondLst>
+                                  <p:childTnLst>
+                                    <p:set>
+                                      <p:cBhvr>
+                                        <p:cTn id="20" dur="1" fill="hold">
+                                          <p:stCondLst>
+                                            <p:cond delay="0"/>
+                                          </p:stCondLst>
+                                        </p:cTn>
+                                        <p:tgtEl>
+                                          <p:spTgt spid="13"/>
+                                        </p:tgtEl>
+                                        <p:attrNameLst>
+                                          <p:attrName>style.visibility</p:attrName>
+                                        </p:attrNameLst>
+                                      </p:cBhvr>
+                                      <p:to>
+                                        <p:strVal val="visible"/>
+                                      </p:to>
+                                    </p:set>
+                                  </p:childTnLst>
+                                </p:cTn>
+                              </p:par>
+                            </p:childTnLst>
+                          </p:cTn>
+                        </p:par>
+                      </p:childTnLst>
+                    </p:cTn>
+                  </p:par>
+                  <p:par>
+                    <p:cTn id="21" fill="hold">
+                      <p:stCondLst>
+                        <p:cond delay="indefinite"/>
+                      </p:stCondLst>
+                      <p:childTnLst>
+                        <p:par>
+                          <p:cTn id="22" fill="hold">
+                            <p:stCondLst>
+                              <p:cond delay="0"/>
+                            </p:stCondLst>
+                            <p:childTnLst>
+                              <p:par>
+                                <p:cTn id="23" presetID="1" presetClass="entr" presetSubtype="0" fill="hold" nodeType="clickEffect">
+                                  <p:stCondLst>
+                                    <p:cond delay="0"/>
+                                  </p:stCondLst>
+                                  <p:childTnLst>
+                                    <p:set>
+                                      <p:cBhvr>
+                                        <p:cTn id="24" dur="1" fill="hold">
+                                          <p:stCondLst>
+                                            <p:cond delay="0"/>
+                                          </p:stCondLst>
+                                        </p:cTn>
+                                        <p:tgtEl>
+                                          <p:spTgt spid="22"/>
+                                        </p:tgtEl>
+                                        <p:attrNameLst>
+                                          <p:attrName>style.visibility</p:attrName>
+                                        </p:attrNameLst>
+                                      </p:cBhvr>
+                                      <p:to>
+                                        <p:strVal val="visible"/>
+                                      </p:to>
+                                    </p:set>
+                                  </p:childTnLst>
+                                </p:cTn>
+                              </p:par>
+                            </p:childTnLst>
+                          </p:cTn>
+                        </p:par>
+                      </p:childTnLst>
+                    </p:cTn>
+                  </p:par>
+                  <p:par>
+                    <p:cTn id="25" fill="hold">
+                      <p:stCondLst>
+                        <p:cond delay="indefinite"/>
+                      </p:stCondLst>
+                      <p:childTnLst>
+                        <p:par>
+                          <p:cTn id="26" fill="hold">
+                            <p:stCondLst>
+                              <p:cond delay="0"/>
+                            </p:stCondLst>
+                            <p:childTnLst>
+                              <p:par>
+                                <p:cTn id="27" presetID="26" presetClass="emph" presetSubtype="0" fill="hold" grpId="0" nodeType="clickEffect">
+                                  <p:stCondLst>
+                                    <p:cond delay="0"/>
+                                  </p:stCondLst>
+                                  <p:childTnLst>
+                                    <p:animEffect transition="out" filter="fade">
+                                      <p:cBhvr>
+                                        <p:cTn id="28" dur="500" tmFilter="0, 0; .2, .5; .8, .5; 1, 0"/>
+                                        <p:tgtEl>
+                                          <p:spTgt spid="14"/>
+                                        </p:tgtEl>
+                                      </p:cBhvr>
+                                    </p:animEffect>
+                                    <p:animScale>
+                                      <p:cBhvr>
+                                        <p:cTn id="29" dur="250" autoRev="1" fill="hold"/>
+                                        <p:tgtEl>
+                                          <p:spTgt spid="14"/>
+                                        </p:tgtEl>
+                                      </p:cBhvr>
+                                      <p:by x="105000" y="105000"/>
+                                    </p:animScale>
+                                  </p:childTnLst>
+                                </p:cTn>
+                              </p:par>
+                              <p:par>
+                                <p:cTn id="30" presetID="26" presetClass="emph" presetSubtype="0" fill="hold" grpId="0" nodeType="withEffect">
+                                  <p:stCondLst>
+                                    <p:cond delay="0"/>
+                                  </p:stCondLst>
+                                  <p:childTnLst>
+                                    <p:animEffect transition="out" filter="fade">
+                                      <p:cBhvr>
+                                        <p:cTn id="31" dur="500" tmFilter="0, 0; .2, .5; .8, .5; 1, 0"/>
+                                        <p:tgtEl>
+                                          <p:spTgt spid="29"/>
+                                        </p:tgtEl>
+                                      </p:cBhvr>
+                                    </p:animEffect>
+                                    <p:animScale>
+                                      <p:cBhvr>
+                                        <p:cTn id="32" dur="250" autoRev="1" fill="hold"/>
+                                        <p:tgtEl>
+                                          <p:spTgt spid="29"/>
+                                        </p:tgtEl>
+                                      </p:cBhvr>
+                                      <p:by x="105000" y="105000"/>
+                                    </p:animScale>
+                                  </p:childTnLst>
+                                </p:cTn>
+                              </p:par>
+                            </p:childTnLst>
+                          </p:cTn>
+                        </p:par>
+                      </p:childTnLst>
+                    </p:cTn>
+                  </p:par>
+                </p:childTnLst>
+              </p:cTn>
+              <p:prevCondLst>
+                <p:cond evt="onPrev" delay="0">
+                  <p:tgtEl>
+                    <p:sldTgt/>
+                  </p:tgtEl>
+                </p:cond>
+              </p:prevCondLst>
+              <p:nextCondLst>
+                <p:cond evt="onNext" delay="0">
+                  <p:tgtEl>
+                    <p:sldTgt/>
+                  </p:tgtEl>
+                </p:cond>
+              </p:nextCondLst>
+            </p:seq>
+          </p:childTnLst>
+        </p:cTn>
+      </p:par>
+    </p:tnLst>
+    <p:bldLst>
+      <p:bldP spid="6" grpId="0"/>
+      <p:bldP spid="12" grpId="0"/>
+      <p:bldP spid="13" grpId="0"/>
+      <p:bldP spid="14" grpId="0"/>
+      <p:bldP spid="29" grpId="0" animBg="1"/>
+    </p:bldLst>
+  </p:timing>
 </p:sld>
 </file>
 
@@ -9875,17 +10542,50 @@
             <p:ph idx="1"/>
           </p:nvPr>
         </p:nvSpPr>
-        <p:spPr/>
+        <p:spPr>
+          <a:xfrm>
+            <a:off x="838200" y="1377696"/>
+            <a:ext cx="10515600" cy="4799267"/>
+          </a:xfrm>
+        </p:spPr>
         <p:txBody>
-          <a:bodyPr/>
+          <a:bodyPr>
+            <a:normAutofit/>
+          </a:bodyPr>
           <a:lstStyle/>
+          <a:p>
+            <a:r>
+              <a:rPr lang="en-GB" dirty="0">
+                <a:hlinkClick r:id="rId2"/>
+              </a:rPr>
+              <a:t>https://ggplot2.tidyverse.org/</a:t>
+            </a:r>
+            <a:r>
+              <a:rPr lang="en-GB" dirty="0"/>
+              <a:t> overview and cheat sheets</a:t>
+            </a:r>
+          </a:p>
+          <a:p>
+            <a:endParaRPr lang="en-GB" dirty="0">
+              <a:solidFill>
+                <a:srgbClr val="0563C1"/>
+              </a:solidFill>
+              <a:hlinkClick r:id="rId3">
+                <a:extLst>
+                  <a:ext uri="{A12FA001-AC4F-418D-AE19-62706E023703}">
+                    <ahyp:hlinkClr xmlns:ahyp="http://schemas.microsoft.com/office/drawing/2018/hyperlinkcolor" val="tx"/>
+                  </a:ext>
+                </a:extLst>
+              </a:hlinkClick>
+            </a:endParaRPr>
+          </a:p>
           <a:p>
             <a:r>
               <a:rPr lang="en-GB" dirty="0">
                 <a:solidFill>
                   <a:srgbClr val="0563C1"/>
                 </a:solidFill>
-                <a:hlinkClick r:id="rId2">
+                <a:hlinkClick r:id="rId3">
                   <a:extLst>
                     <a:ext uri="{A12FA001-AC4F-418D-AE19-62706E023703}">
                       <ahyp:hlinkClr xmlns:ahyp="http://schemas.microsoft.com/office/drawing/2018/hyperlinkcolor" val="tx"/>
@@ -9911,7 +10611,7 @@
                 <a:solidFill>
                   <a:srgbClr val="0563C1"/>
                 </a:solidFill>
-                <a:hlinkClick r:id="rId2">
+                <a:hlinkClick r:id="rId3">
                   <a:extLst>
                     <a:ext uri="{A12FA001-AC4F-418D-AE19-62706E023703}">
                       <ahyp:hlinkClr xmlns:ahyp="http://schemas.microsoft.com/office/drawing/2018/hyperlinkcolor" val="tx"/>
@@ -9942,15 +10642,9 @@
             <a:pPr marL="0" indent="0">
               <a:buNone/>
             </a:pPr>
-            <a:endParaRPr lang="en-GB" dirty="0"/>
-          </a:p>
-          <a:p>
-            <a:pPr marL="0" indent="0">
-              <a:buNone/>
-            </a:pPr>
             <a:r>
               <a:rPr lang="en-GB" dirty="0">
-                <a:hlinkClick r:id="rId3"/>
+                <a:hlinkClick r:id="rId4"/>
               </a:rPr>
               <a:t>R for Data Science (2e) - 2  Data visualization (hadley.nz)</a:t>
             </a:r>
@@ -10215,6 +10909,9 @@
               <a:t> - this means a framework following a layered approach to construct visualisations of data</a:t>
             </a:r>
           </a:p>
+          <a:p>
+            <a:endParaRPr lang="en-GB" dirty="0"/>
+          </a:p>
         </p:txBody>
       </p:sp>
     </p:spTree>
@@ -10699,7 +11396,7 @@
             </a:pPr>
             <a:r>
               <a:rPr lang="en-GB" dirty="0">
-                <a:hlinkClick r:id="rId2"/>
+                <a:hlinkClick r:id="rId3"/>
               </a:rPr>
               <a:t>https://r-graph-gallery.com/ggplot2-package.html</a:t>
             </a:r>
@@ -10719,11 +11416,14 @@
               <a:buNone/>
             </a:pPr>
             <a:r>
-              <a:rPr lang="en-GB" dirty="0">
-                <a:hlinkClick r:id="rId3"/>
-              </a:rPr>
-              <a:t>R for Data Science (2e) - 2  Data visualization (hadley.nz)</a:t>
-            </a:r>
+              <a:rPr lang="en-GB" dirty="0"/>
+              <a:t>It is not the only package available for graphs, but cover</a:t>
+            </a:r>
+          </a:p>
+          <a:p>
+            <a:pPr marL="0" indent="0">
+              <a:buNone/>
+            </a:pPr>
             <a:endParaRPr lang="en-GB" dirty="0"/>
           </a:p>
           <a:p>
@@ -12912,21 +13612,6 @@
 </file>
 
 <file path=customXml/item1.xml><?xml version="1.0" encoding="utf-8"?>
-<?mso-contentType ?>
-<FormTemplates xmlns="http://schemas.microsoft.com/sharepoint/v3/contenttype/forms">
-  <Display>DocumentLibraryForm</Display>
-  <Edit>DocumentLibraryForm</Edit>
-  <New>DocumentLibraryForm</New>
-</FormTemplates>
-</file>
-
-<file path=customXml/item2.xml><?xml version="1.0" encoding="utf-8"?>
-<p:properties xmlns:p="http://schemas.microsoft.com/office/2006/metadata/properties" xmlns:xsi="http://www.w3.org/2001/XMLSchema-instance" xmlns:pc="http://schemas.microsoft.com/office/infopath/2007/PartnerControls">
-  <documentManagement/>
-</p:properties>
-</file>
-
-<file path=customXml/item3.xml><?xml version="1.0" encoding="utf-8"?>
 <ct:contentTypeSchema xmlns:ct="http://schemas.microsoft.com/office/2006/metadata/contentType" xmlns:ma="http://schemas.microsoft.com/office/2006/metadata/properties/metaAttributes" ct:_="" ma:_="" ma:contentTypeName="Document" ma:contentTypeID="0x010100349E360D75DDE845BD31B7204E9B8E6D" ma:contentTypeVersion="0" ma:contentTypeDescription="Create a new document." ma:contentTypeScope="" ma:versionID="659fdf77c7da3dae286546a3338ab112">
   <xsd:schema xmlns:xsd="http://www.w3.org/2001/XMLSchema" xmlns:xs="http://www.w3.org/2001/XMLSchema" xmlns:p="http://schemas.microsoft.com/office/2006/metadata/properties" targetNamespace="http://schemas.microsoft.com/office/2006/metadata/properties" ma:root="true" ma:fieldsID="7be2570776fbcaa7c7a71900390d2141">
     <xsd:element name="properties">
@@ -13040,10 +13725,33 @@
 </ct:contentTypeSchema>
 </file>
 
+<file path=customXml/item2.xml><?xml version="1.0" encoding="utf-8"?>
+<p:properties xmlns:p="http://schemas.microsoft.com/office/2006/metadata/properties" xmlns:xsi="http://www.w3.org/2001/XMLSchema-instance" xmlns:pc="http://schemas.microsoft.com/office/infopath/2007/PartnerControls">
+  <documentManagement/>
+</p:properties>
+</file>
+
+<file path=customXml/item3.xml><?xml version="1.0" encoding="utf-8"?>
+<?mso-contentType ?>
+<FormTemplates xmlns="http://schemas.microsoft.com/sharepoint/v3/contenttype/forms">
+  <Display>DocumentLibraryForm</Display>
+  <Edit>DocumentLibraryForm</Edit>
+  <New>DocumentLibraryForm</New>
+</FormTemplates>
+</file>
+
 <file path=customXml/itemProps1.xml><?xml version="1.0" encoding="utf-8"?>
-<ds:datastoreItem xmlns:ds="http://schemas.openxmlformats.org/officeDocument/2006/customXml" ds:itemID="{AD6B120D-A0FB-4DD8-992E-3D48283A8AF5}">
+<ds:datastoreItem xmlns:ds="http://schemas.openxmlformats.org/officeDocument/2006/customXml" ds:itemID="{1F1E5AA6-C6AF-4367-93A3-EFA43BF19798}">
   <ds:schemaRefs>
-    <ds:schemaRef ds:uri="http://schemas.microsoft.com/sharepoint/v3/contenttype/forms"/>
+    <ds:schemaRef ds:uri="http://schemas.microsoft.com/office/2006/metadata/contentType"/>
+    <ds:schemaRef ds:uri="http://schemas.microsoft.com/office/2006/metadata/properties/metaAttributes"/>
+    <ds:schemaRef ds:uri="http://www.w3.org/2001/XMLSchema"/>
+    <ds:schemaRef ds:uri="http://schemas.microsoft.com/office/2006/metadata/properties"/>
+    <ds:schemaRef ds:uri="http://schemas.openxmlformats.org/package/2006/metadata/core-properties"/>
+    <ds:schemaRef ds:uri="http://purl.org/dc/elements/1.1/"/>
+    <ds:schemaRef ds:uri="http://purl.org/dc/terms/"/>
+    <ds:schemaRef ds:uri="http://schemas.microsoft.com/internal/obd"/>
+    <ds:schemaRef ds:uri="http://schemas.microsoft.com/office/infopath/2007/PartnerControls"/>
   </ds:schemaRefs>
 </ds:datastoreItem>
 </file>
@@ -13064,17 +13772,9 @@
 </file>
 
 <file path=customXml/itemProps3.xml><?xml version="1.0" encoding="utf-8"?>
-<ds:datastoreItem xmlns:ds="http://schemas.openxmlformats.org/officeDocument/2006/customXml" ds:itemID="{1F1E5AA6-C6AF-4367-93A3-EFA43BF19798}">
+<ds:datastoreItem xmlns:ds="http://schemas.openxmlformats.org/officeDocument/2006/customXml" ds:itemID="{AD6B120D-A0FB-4DD8-992E-3D48283A8AF5}">
   <ds:schemaRefs>
-    <ds:schemaRef ds:uri="http://schemas.microsoft.com/office/2006/metadata/contentType"/>
-    <ds:schemaRef ds:uri="http://schemas.microsoft.com/office/2006/metadata/properties/metaAttributes"/>
-    <ds:schemaRef ds:uri="http://www.w3.org/2001/XMLSchema"/>
-    <ds:schemaRef ds:uri="http://schemas.microsoft.com/office/2006/metadata/properties"/>
-    <ds:schemaRef ds:uri="http://schemas.openxmlformats.org/package/2006/metadata/core-properties"/>
-    <ds:schemaRef ds:uri="http://purl.org/dc/elements/1.1/"/>
-    <ds:schemaRef ds:uri="http://purl.org/dc/terms/"/>
-    <ds:schemaRef ds:uri="http://schemas.microsoft.com/internal/obd"/>
-    <ds:schemaRef ds:uri="http://schemas.microsoft.com/office/infopath/2007/PartnerControls"/>
+    <ds:schemaRef ds:uri="http://schemas.microsoft.com/sharepoint/v3/contenttype/forms"/>
   </ds:schemaRefs>
 </ds:datastoreItem>
 </file>
</xml_diff>